<commit_message>
This is to update main branch
</commit_message>
<xml_diff>
--- a/Project Presentation visiuals/Team5_Updated_Prototype_Design.pptx
+++ b/Project Presentation visiuals/Team5_Updated_Prototype_Design.pptx
@@ -17,6 +17,9 @@
     <p:sldId id="267" r:id="rId11"/>
     <p:sldId id="266" r:id="rId12"/>
     <p:sldId id="268" r:id="rId13"/>
+    <p:sldId id="270" r:id="rId14"/>
+    <p:sldId id="271" r:id="rId15"/>
+    <p:sldId id="269" r:id="rId16"/>
   </p:sldIdLst>
   <p:sldSz cx="12192000" cy="6858000"/>
   <p:notesSz cx="6858000" cy="9144000"/>
@@ -145,6 +148,30 @@
 
 <file path=ppt/changesInfos/changesInfo1.xml><?xml version="1.0" encoding="utf-8"?>
 <pc:chgInfo xmlns:a="http://schemas.openxmlformats.org/drawingml/2006/main" xmlns:r="http://schemas.openxmlformats.org/officeDocument/2006/relationships" xmlns:ac="http://schemas.microsoft.com/office/drawing/2013/main/command" xmlns:pc="http://schemas.microsoft.com/office/powerpoint/2013/main/command">
+  <pc:docChgLst>
+    <pc:chgData name="C18424946 Nicolas Condrea" userId="S::c18424946@mytudublin.ie::1a47466e-ddb2-4308-94b0-03075875c83d" providerId="AD" clId="Web-{52B3B1A7-E250-4BDB-9FB1-6A65179F95D4}"/>
+    <pc:docChg chg="modSld">
+      <pc:chgData name="C18424946 Nicolas Condrea" userId="S::c18424946@mytudublin.ie::1a47466e-ddb2-4308-94b0-03075875c83d" providerId="AD" clId="Web-{52B3B1A7-E250-4BDB-9FB1-6A65179F95D4}" dt="2021-02-04T18:19:13.199" v="48" actId="20577"/>
+      <pc:docMkLst>
+        <pc:docMk/>
+      </pc:docMkLst>
+      <pc:sldChg chg="modSp delCm">
+        <pc:chgData name="C18424946 Nicolas Condrea" userId="S::c18424946@mytudublin.ie::1a47466e-ddb2-4308-94b0-03075875c83d" providerId="AD" clId="Web-{52B3B1A7-E250-4BDB-9FB1-6A65179F95D4}" dt="2021-02-04T18:19:13.199" v="48" actId="20577"/>
+        <pc:sldMkLst>
+          <pc:docMk/>
+          <pc:sldMk cId="116466386" sldId="265"/>
+        </pc:sldMkLst>
+        <pc:spChg chg="mod">
+          <ac:chgData name="C18424946 Nicolas Condrea" userId="S::c18424946@mytudublin.ie::1a47466e-ddb2-4308-94b0-03075875c83d" providerId="AD" clId="Web-{52B3B1A7-E250-4BDB-9FB1-6A65179F95D4}" dt="2021-02-04T18:19:13.199" v="48" actId="20577"/>
+          <ac:spMkLst>
+            <pc:docMk/>
+            <pc:sldMk cId="116466386" sldId="265"/>
+            <ac:spMk id="4" creationId="{BD032285-390E-42AD-9AC3-77D430633F7B}"/>
+          </ac:spMkLst>
+        </pc:spChg>
+      </pc:sldChg>
+    </pc:docChg>
+  </pc:docChgLst>
   <pc:docChgLst>
     <pc:chgData name="Nicolas Condrea" userId="dda0f74ab98f5c4d" providerId="LiveId" clId="{6354BBB5-6DDE-4092-8E7B-028B1BFD9147}"/>
     <pc:docChg chg="undo custSel addSld delSld modSld sldOrd">
@@ -974,30 +1001,6 @@
       </pc:sldChg>
     </pc:docChg>
   </pc:docChgLst>
-  <pc:docChgLst>
-    <pc:chgData name="C18424946 Nicolas Condrea" userId="S::c18424946@mytudublin.ie::1a47466e-ddb2-4308-94b0-03075875c83d" providerId="AD" clId="Web-{52B3B1A7-E250-4BDB-9FB1-6A65179F95D4}"/>
-    <pc:docChg chg="modSld">
-      <pc:chgData name="C18424946 Nicolas Condrea" userId="S::c18424946@mytudublin.ie::1a47466e-ddb2-4308-94b0-03075875c83d" providerId="AD" clId="Web-{52B3B1A7-E250-4BDB-9FB1-6A65179F95D4}" dt="2021-02-04T18:19:13.199" v="48" actId="20577"/>
-      <pc:docMkLst>
-        <pc:docMk/>
-      </pc:docMkLst>
-      <pc:sldChg chg="modSp delCm">
-        <pc:chgData name="C18424946 Nicolas Condrea" userId="S::c18424946@mytudublin.ie::1a47466e-ddb2-4308-94b0-03075875c83d" providerId="AD" clId="Web-{52B3B1A7-E250-4BDB-9FB1-6A65179F95D4}" dt="2021-02-04T18:19:13.199" v="48" actId="20577"/>
-        <pc:sldMkLst>
-          <pc:docMk/>
-          <pc:sldMk cId="116466386" sldId="265"/>
-        </pc:sldMkLst>
-        <pc:spChg chg="mod">
-          <ac:chgData name="C18424946 Nicolas Condrea" userId="S::c18424946@mytudublin.ie::1a47466e-ddb2-4308-94b0-03075875c83d" providerId="AD" clId="Web-{52B3B1A7-E250-4BDB-9FB1-6A65179F95D4}" dt="2021-02-04T18:19:13.199" v="48" actId="20577"/>
-          <ac:spMkLst>
-            <pc:docMk/>
-            <pc:sldMk cId="116466386" sldId="265"/>
-            <ac:spMk id="4" creationId="{BD032285-390E-42AD-9AC3-77D430633F7B}"/>
-          </ac:spMkLst>
-        </pc:spChg>
-      </pc:sldChg>
-    </pc:docChg>
-  </pc:docChgLst>
 </pc:chgInfo>
 </file>
 
@@ -1150,7 +1153,7 @@
           <a:p>
             <a:fld id="{5B7D90F4-3035-4CBD-8B6D-0897C0398A94}" type="datetimeFigureOut">
               <a:rPr lang="en-GB" smtClean="0"/>
-              <a:t>25/02/2021</a:t>
+              <a:t>26/02/2021</a:t>
             </a:fld>
             <a:endParaRPr lang="en-GB"/>
           </a:p>
@@ -1350,7 +1353,7 @@
           <a:p>
             <a:fld id="{5B7D90F4-3035-4CBD-8B6D-0897C0398A94}" type="datetimeFigureOut">
               <a:rPr lang="en-GB" smtClean="0"/>
-              <a:t>25/02/2021</a:t>
+              <a:t>26/02/2021</a:t>
             </a:fld>
             <a:endParaRPr lang="en-GB"/>
           </a:p>
@@ -1560,7 +1563,7 @@
           <a:p>
             <a:fld id="{5B7D90F4-3035-4CBD-8B6D-0897C0398A94}" type="datetimeFigureOut">
               <a:rPr lang="en-GB" smtClean="0"/>
-              <a:t>25/02/2021</a:t>
+              <a:t>26/02/2021</a:t>
             </a:fld>
             <a:endParaRPr lang="en-GB"/>
           </a:p>
@@ -1760,7 +1763,7 @@
           <a:p>
             <a:fld id="{5B7D90F4-3035-4CBD-8B6D-0897C0398A94}" type="datetimeFigureOut">
               <a:rPr lang="en-GB" smtClean="0"/>
-              <a:t>25/02/2021</a:t>
+              <a:t>26/02/2021</a:t>
             </a:fld>
             <a:endParaRPr lang="en-GB"/>
           </a:p>
@@ -2036,7 +2039,7 @@
           <a:p>
             <a:fld id="{5B7D90F4-3035-4CBD-8B6D-0897C0398A94}" type="datetimeFigureOut">
               <a:rPr lang="en-GB" smtClean="0"/>
-              <a:t>25/02/2021</a:t>
+              <a:t>26/02/2021</a:t>
             </a:fld>
             <a:endParaRPr lang="en-GB"/>
           </a:p>
@@ -2304,7 +2307,7 @@
           <a:p>
             <a:fld id="{5B7D90F4-3035-4CBD-8B6D-0897C0398A94}" type="datetimeFigureOut">
               <a:rPr lang="en-GB" smtClean="0"/>
-              <a:t>25/02/2021</a:t>
+              <a:t>26/02/2021</a:t>
             </a:fld>
             <a:endParaRPr lang="en-GB"/>
           </a:p>
@@ -2719,7 +2722,7 @@
           <a:p>
             <a:fld id="{5B7D90F4-3035-4CBD-8B6D-0897C0398A94}" type="datetimeFigureOut">
               <a:rPr lang="en-GB" smtClean="0"/>
-              <a:t>25/02/2021</a:t>
+              <a:t>26/02/2021</a:t>
             </a:fld>
             <a:endParaRPr lang="en-GB"/>
           </a:p>
@@ -2861,7 +2864,7 @@
           <a:p>
             <a:fld id="{5B7D90F4-3035-4CBD-8B6D-0897C0398A94}" type="datetimeFigureOut">
               <a:rPr lang="en-GB" smtClean="0"/>
-              <a:t>25/02/2021</a:t>
+              <a:t>26/02/2021</a:t>
             </a:fld>
             <a:endParaRPr lang="en-GB"/>
           </a:p>
@@ -2974,7 +2977,7 @@
           <a:p>
             <a:fld id="{5B7D90F4-3035-4CBD-8B6D-0897C0398A94}" type="datetimeFigureOut">
               <a:rPr lang="en-GB" smtClean="0"/>
-              <a:t>25/02/2021</a:t>
+              <a:t>26/02/2021</a:t>
             </a:fld>
             <a:endParaRPr lang="en-GB"/>
           </a:p>
@@ -3287,7 +3290,7 @@
           <a:p>
             <a:fld id="{5B7D90F4-3035-4CBD-8B6D-0897C0398A94}" type="datetimeFigureOut">
               <a:rPr lang="en-GB" smtClean="0"/>
-              <a:t>25/02/2021</a:t>
+              <a:t>26/02/2021</a:t>
             </a:fld>
             <a:endParaRPr lang="en-GB"/>
           </a:p>
@@ -3576,7 +3579,7 @@
           <a:p>
             <a:fld id="{5B7D90F4-3035-4CBD-8B6D-0897C0398A94}" type="datetimeFigureOut">
               <a:rPr lang="en-GB" smtClean="0"/>
-              <a:t>25/02/2021</a:t>
+              <a:t>26/02/2021</a:t>
             </a:fld>
             <a:endParaRPr lang="en-GB"/>
           </a:p>
@@ -3819,7 +3822,7 @@
           <a:p>
             <a:fld id="{5B7D90F4-3035-4CBD-8B6D-0897C0398A94}" type="datetimeFigureOut">
               <a:rPr lang="en-GB" smtClean="0"/>
-              <a:t>25/02/2021</a:t>
+              <a:t>26/02/2021</a:t>
             </a:fld>
             <a:endParaRPr lang="en-GB"/>
           </a:p>
@@ -8758,10 +8761,10 @@
       </p:grpSp>
       <p:pic>
         <p:nvPicPr>
-          <p:cNvPr id="3" name="Picture 2" descr="Icon&#10;&#10;Description automatically generated">
+          <p:cNvPr id="4" name="Picture 3" descr="Graphical user interface, application&#10;&#10;Description automatically generated">
             <a:extLst>
               <a:ext uri="{FF2B5EF4-FFF2-40B4-BE49-F238E27FC236}">
-                <a16:creationId xmlns:a16="http://schemas.microsoft.com/office/drawing/2014/main" id="{0D44AE64-49F2-40B0-95BA-61F405E5171D}"/>
+                <a16:creationId xmlns:a16="http://schemas.microsoft.com/office/drawing/2014/main" id="{5CBC376C-2097-4505-B6E3-5D975617F00C}"/>
               </a:ext>
             </a:extLst>
           </p:cNvPr>
@@ -8770,7 +8773,7 @@
           </p:cNvPicPr>
           <p:nvPr/>
         </p:nvPicPr>
-        <p:blipFill>
+        <p:blipFill rotWithShape="1">
           <a:blip r:embed="rId2">
             <a:extLst>
               <a:ext uri="{28A0092B-C50C-407E-A947-70E740481C1C}">
@@ -8778,45 +8781,13 @@
               </a:ext>
             </a:extLst>
           </a:blip>
-          <a:stretch>
-            <a:fillRect/>
-          </a:stretch>
+          <a:srcRect l="50000" t="-1549"/>
+          <a:stretch/>
         </p:blipFill>
         <p:spPr>
           <a:xfrm>
-            <a:off x="4475847" y="342937"/>
-            <a:ext cx="3240000" cy="6172126"/>
-          </a:xfrm>
-          <a:prstGeom prst="rect">
-            <a:avLst/>
-          </a:prstGeom>
-        </p:spPr>
-      </p:pic>
-      <p:pic>
-        <p:nvPicPr>
-          <p:cNvPr id="9" name="Picture 8">
-            <a:hlinkClick r:id="rId3" action="ppaction://hlinksldjump"/>
-            <a:extLst>
-              <a:ext uri="{FF2B5EF4-FFF2-40B4-BE49-F238E27FC236}">
-                <a16:creationId xmlns:a16="http://schemas.microsoft.com/office/drawing/2014/main" id="{8DF84D0B-91FE-44B7-B7BD-9F5CCF5A91A3}"/>
-              </a:ext>
-            </a:extLst>
-          </p:cNvPr>
-          <p:cNvPicPr>
-            <a:picLocks noChangeAspect="1"/>
-          </p:cNvPicPr>
-          <p:nvPr/>
-        </p:nvPicPr>
-        <p:blipFill>
-          <a:blip r:embed="rId4"/>
-          <a:stretch>
-            <a:fillRect/>
-          </a:stretch>
-        </p:blipFill>
-        <p:spPr>
-          <a:xfrm>
-            <a:off x="5624359" y="4305745"/>
-            <a:ext cx="942975" cy="962025"/>
+            <a:off x="3725037" y="129892"/>
+            <a:ext cx="3866130" cy="6598216"/>
           </a:xfrm>
           <a:prstGeom prst="rect">
             <a:avLst/>
@@ -10242,10 +10213,10 @@
       </p:grpSp>
       <p:pic>
         <p:nvPicPr>
-          <p:cNvPr id="3" name="Picture 2" descr="Icon&#10;&#10;Description automatically generated">
+          <p:cNvPr id="4" name="Picture 3" descr="Graphical user interface, application&#10;&#10;Description automatically generated">
             <a:extLst>
               <a:ext uri="{FF2B5EF4-FFF2-40B4-BE49-F238E27FC236}">
-                <a16:creationId xmlns:a16="http://schemas.microsoft.com/office/drawing/2014/main" id="{EE0F7BAE-3759-4FFF-B303-F1342C4F63AE}"/>
+                <a16:creationId xmlns:a16="http://schemas.microsoft.com/office/drawing/2014/main" id="{2006B569-4FB2-4CFC-95E3-D0F2591FE19F}"/>
               </a:ext>
             </a:extLst>
           </p:cNvPr>
@@ -10268,39 +10239,8 @@
         </p:blipFill>
         <p:spPr>
           <a:xfrm>
-            <a:off x="4475847" y="342936"/>
-            <a:ext cx="3240000" cy="6172128"/>
-          </a:xfrm>
-          <a:prstGeom prst="rect">
-            <a:avLst/>
-          </a:prstGeom>
-        </p:spPr>
-      </p:pic>
-      <p:pic>
-        <p:nvPicPr>
-          <p:cNvPr id="7" name="Picture 6">
-            <a:hlinkClick r:id="rId3" action="ppaction://hlinksldjump"/>
-            <a:extLst>
-              <a:ext uri="{FF2B5EF4-FFF2-40B4-BE49-F238E27FC236}">
-                <a16:creationId xmlns:a16="http://schemas.microsoft.com/office/drawing/2014/main" id="{B53EC095-7886-43A2-B680-EB487F5FBB9E}"/>
-              </a:ext>
-            </a:extLst>
-          </p:cNvPr>
-          <p:cNvPicPr>
-            <a:picLocks noChangeAspect="1"/>
-          </p:cNvPicPr>
-          <p:nvPr/>
-        </p:nvPicPr>
-        <p:blipFill>
-          <a:blip r:embed="rId4"/>
-          <a:stretch>
-            <a:fillRect/>
-          </a:stretch>
-        </p:blipFill>
-        <p:spPr>
-          <a:xfrm>
-            <a:off x="4695672" y="5354217"/>
-            <a:ext cx="2800350" cy="609600"/>
+            <a:off x="3950480" y="0"/>
+            <a:ext cx="4291039" cy="6858000"/>
           </a:xfrm>
           <a:prstGeom prst="rect">
             <a:avLst/>
@@ -11906,6 +11846,3629 @@
     <p:extLst>
       <p:ext uri="{BB962C8B-B14F-4D97-AF65-F5344CB8AC3E}">
         <p14:creationId xmlns:p14="http://schemas.microsoft.com/office/powerpoint/2010/main" val="1233216935"/>
+      </p:ext>
+    </p:extLst>
+  </p:cSld>
+  <p:clrMapOvr>
+    <a:masterClrMapping/>
+  </p:clrMapOvr>
+</p:sld>
+</file>
+
+<file path=ppt/slides/slide13.xml><?xml version="1.0" encoding="utf-8"?>
+<p:sld xmlns:a="http://schemas.openxmlformats.org/drawingml/2006/main" xmlns:r="http://schemas.openxmlformats.org/officeDocument/2006/relationships" xmlns:p="http://schemas.openxmlformats.org/presentationml/2006/main">
+  <p:cSld>
+    <p:bg>
+      <p:bgPr>
+        <a:solidFill>
+          <a:schemeClr val="bg1"/>
+        </a:solidFill>
+        <a:effectLst/>
+      </p:bgPr>
+    </p:bg>
+    <p:spTree>
+      <p:nvGrpSpPr>
+        <p:cNvPr id="1" name=""/>
+        <p:cNvGrpSpPr/>
+        <p:nvPr/>
+      </p:nvGrpSpPr>
+      <p:grpSpPr>
+        <a:xfrm>
+          <a:off x="0" y="0"/>
+          <a:ext cx="0" cy="0"/>
+          <a:chOff x="0" y="0"/>
+          <a:chExt cx="0" cy="0"/>
+        </a:xfrm>
+      </p:grpSpPr>
+      <p:sp useBgFill="1">
+        <p:nvSpPr>
+          <p:cNvPr id="24" name="Rectangle 7">
+            <a:extLst>
+              <a:ext uri="{FF2B5EF4-FFF2-40B4-BE49-F238E27FC236}">
+                <a16:creationId xmlns:a16="http://schemas.microsoft.com/office/drawing/2014/main" id="{CD758A0E-EDF3-4C8A-9AAF-B84F8014E095}"/>
+              </a:ext>
+              <a:ext uri="{C183D7F6-B498-43B3-948B-1728B52AA6E4}">
+                <adec:decorative xmlns:adec="http://schemas.microsoft.com/office/drawing/2017/decorative" val="1"/>
+              </a:ext>
+            </a:extLst>
+          </p:cNvPr>
+          <p:cNvSpPr>
+            <a:spLocks noGrp="1" noRot="1" noChangeAspect="1" noMove="1" noResize="1" noEditPoints="1" noAdjustHandles="1" noChangeArrowheads="1" noChangeShapeType="1" noTextEdit="1"/>
+          </p:cNvSpPr>
+          <p:nvPr>
+            <p:extLst>
+              <p:ext uri="{386F3935-93C4-4BCD-93E2-E3B085C9AB24}">
+                <p16:designElem xmlns:p16="http://schemas.microsoft.com/office/powerpoint/2015/main" val="1"/>
+              </p:ext>
+            </p:extLst>
+          </p:nvPr>
+        </p:nvSpPr>
+        <p:spPr>
+          <a:xfrm>
+            <a:off x="0" y="1"/>
+            <a:ext cx="12191695" cy="6858000"/>
+          </a:xfrm>
+          <a:prstGeom prst="rect">
+            <a:avLst/>
+          </a:prstGeom>
+          <a:ln>
+            <a:noFill/>
+          </a:ln>
+        </p:spPr>
+        <p:style>
+          <a:lnRef idx="2">
+            <a:schemeClr val="accent1">
+              <a:shade val="50000"/>
+            </a:schemeClr>
+          </a:lnRef>
+          <a:fillRef idx="1">
+            <a:schemeClr val="accent1"/>
+          </a:fillRef>
+          <a:effectRef idx="0">
+            <a:schemeClr val="accent1"/>
+          </a:effectRef>
+          <a:fontRef idx="minor">
+            <a:schemeClr val="lt1"/>
+          </a:fontRef>
+        </p:style>
+        <p:txBody>
+          <a:bodyPr rtlCol="0" anchor="ctr"/>
+          <a:lstStyle/>
+          <a:p>
+            <a:pPr algn="ctr"/>
+            <a:endParaRPr lang="en-US"/>
+          </a:p>
+        </p:txBody>
+      </p:sp>
+      <p:sp>
+        <p:nvSpPr>
+          <p:cNvPr id="25" name="Rectangle 9">
+            <a:extLst>
+              <a:ext uri="{FF2B5EF4-FFF2-40B4-BE49-F238E27FC236}">
+                <a16:creationId xmlns:a16="http://schemas.microsoft.com/office/drawing/2014/main" id="{32FE9855-A391-40A9-A6FA-BAC94FB5431F}"/>
+              </a:ext>
+              <a:ext uri="{C183D7F6-B498-43B3-948B-1728B52AA6E4}">
+                <adec:decorative xmlns:adec="http://schemas.microsoft.com/office/drawing/2017/decorative" val="1"/>
+              </a:ext>
+            </a:extLst>
+          </p:cNvPr>
+          <p:cNvSpPr>
+            <a:spLocks noGrp="1" noRot="1" noChangeAspect="1" noMove="1" noResize="1" noEditPoints="1" noAdjustHandles="1" noChangeArrowheads="1" noChangeShapeType="1" noTextEdit="1"/>
+          </p:cNvSpPr>
+          <p:nvPr>
+            <p:extLst>
+              <p:ext uri="{386F3935-93C4-4BCD-93E2-E3B085C9AB24}">
+                <p16:designElem xmlns:p16="http://schemas.microsoft.com/office/powerpoint/2015/main" val="1"/>
+              </p:ext>
+            </p:extLst>
+          </p:nvPr>
+        </p:nvSpPr>
+        <p:spPr>
+          <a:xfrm>
+            <a:off x="305" y="0"/>
+            <a:ext cx="12191695" cy="6858000"/>
+          </a:xfrm>
+          <a:prstGeom prst="rect">
+            <a:avLst/>
+          </a:prstGeom>
+          <a:solidFill>
+            <a:schemeClr val="bg1"/>
+          </a:solidFill>
+          <a:ln>
+            <a:noFill/>
+          </a:ln>
+        </p:spPr>
+        <p:style>
+          <a:lnRef idx="2">
+            <a:schemeClr val="accent1">
+              <a:shade val="50000"/>
+            </a:schemeClr>
+          </a:lnRef>
+          <a:fillRef idx="1">
+            <a:schemeClr val="accent1"/>
+          </a:fillRef>
+          <a:effectRef idx="0">
+            <a:schemeClr val="accent1"/>
+          </a:effectRef>
+          <a:fontRef idx="minor">
+            <a:schemeClr val="lt1"/>
+          </a:fontRef>
+        </p:style>
+        <p:txBody>
+          <a:bodyPr rtlCol="0" anchor="ctr"/>
+          <a:lstStyle/>
+          <a:p>
+            <a:pPr algn="ctr"/>
+            <a:endParaRPr lang="en-US" sz="800"/>
+          </a:p>
+        </p:txBody>
+      </p:sp>
+      <p:grpSp>
+        <p:nvGrpSpPr>
+          <p:cNvPr id="26" name="Group 11">
+            <a:extLst>
+              <a:ext uri="{FF2B5EF4-FFF2-40B4-BE49-F238E27FC236}">
+                <a16:creationId xmlns:a16="http://schemas.microsoft.com/office/drawing/2014/main" id="{13621FAC-5123-4838-A7BE-271A4095B234}"/>
+              </a:ext>
+              <a:ext uri="{C183D7F6-B498-43B3-948B-1728B52AA6E4}">
+                <adec:decorative xmlns:adec="http://schemas.microsoft.com/office/drawing/2017/decorative" val="1"/>
+              </a:ext>
+            </a:extLst>
+          </p:cNvPr>
+          <p:cNvGrpSpPr>
+            <a:grpSpLocks noGrp="1" noUngrp="1" noRot="1" noChangeAspect="1" noMove="1" noResize="1"/>
+          </p:cNvGrpSpPr>
+          <p:nvPr>
+            <p:extLst>
+              <p:ext uri="{386F3935-93C4-4BCD-93E2-E3B085C9AB24}">
+                <p16:designElem xmlns:p16="http://schemas.microsoft.com/office/powerpoint/2015/main" val="1"/>
+              </p:ext>
+            </p:extLst>
+          </p:nvPr>
+        </p:nvGrpSpPr>
+        <p:grpSpPr>
+          <a:xfrm rot="10800000">
+            <a:off x="8535970" y="4114799"/>
+            <a:ext cx="3655725" cy="2743201"/>
+            <a:chOff x="-305" y="-1"/>
+            <a:chExt cx="3832880" cy="2876136"/>
+          </a:xfrm>
+        </p:grpSpPr>
+        <p:sp>
+          <p:nvSpPr>
+            <p:cNvPr id="27" name="Freeform: Shape 12">
+              <a:extLst>
+                <a:ext uri="{FF2B5EF4-FFF2-40B4-BE49-F238E27FC236}">
+                  <a16:creationId xmlns:a16="http://schemas.microsoft.com/office/drawing/2014/main" id="{9084F7DB-2C1C-470A-A963-600DAEF0A462}"/>
+                </a:ext>
+                <a:ext uri="{C183D7F6-B498-43B3-948B-1728B52AA6E4}">
+                  <adec:decorative xmlns:adec="http://schemas.microsoft.com/office/drawing/2017/decorative" val="1"/>
+                </a:ext>
+              </a:extLst>
+            </p:cNvPr>
+            <p:cNvSpPr/>
+            <p:nvPr>
+              <p:extLst>
+                <p:ext uri="{386F3935-93C4-4BCD-93E2-E3B085C9AB24}">
+                  <p16:designElem xmlns:p16="http://schemas.microsoft.com/office/powerpoint/2015/main" val="1"/>
+                </p:ext>
+              </p:extLst>
+            </p:nvPr>
+          </p:nvSpPr>
+          <p:spPr>
+            <a:xfrm>
+              <a:off x="305" y="1"/>
+              <a:ext cx="3815424" cy="2653659"/>
+            </a:xfrm>
+            <a:custGeom>
+              <a:avLst/>
+              <a:gdLst>
+                <a:gd name="connsiteX0" fmla="*/ 3203055 w 3815424"/>
+                <a:gd name="connsiteY0" fmla="*/ 0 h 2653659"/>
+                <a:gd name="connsiteX1" fmla="*/ 3815424 w 3815424"/>
+                <a:gd name="connsiteY1" fmla="*/ 0 h 2653659"/>
+                <a:gd name="connsiteX2" fmla="*/ 3801025 w 3815424"/>
+                <a:gd name="connsiteY2" fmla="*/ 214243 h 2653659"/>
+                <a:gd name="connsiteX3" fmla="*/ 587142 w 3815424"/>
+                <a:gd name="connsiteY3" fmla="*/ 2653659 h 2653659"/>
+                <a:gd name="connsiteX4" fmla="*/ 53389 w 3815424"/>
+                <a:gd name="connsiteY4" fmla="*/ 2605041 h 2653659"/>
+                <a:gd name="connsiteX5" fmla="*/ 0 w 3815424"/>
+                <a:gd name="connsiteY5" fmla="*/ 2593136 h 2653659"/>
+                <a:gd name="connsiteX6" fmla="*/ 0 w 3815424"/>
+                <a:gd name="connsiteY6" fmla="*/ 1994836 h 2653659"/>
+                <a:gd name="connsiteX7" fmla="*/ 159710 w 3815424"/>
+                <a:gd name="connsiteY7" fmla="*/ 2035054 h 2653659"/>
+                <a:gd name="connsiteX8" fmla="*/ 587142 w 3815424"/>
+                <a:gd name="connsiteY8" fmla="*/ 2075152 h 2653659"/>
+                <a:gd name="connsiteX9" fmla="*/ 1549283 w 3815424"/>
+                <a:gd name="connsiteY9" fmla="*/ 1900153 h 2653659"/>
+                <a:gd name="connsiteX10" fmla="*/ 2406698 w 3815424"/>
+                <a:gd name="connsiteY10" fmla="*/ 1418450 h 2653659"/>
+                <a:gd name="connsiteX11" fmla="*/ 2996069 w 3815424"/>
+                <a:gd name="connsiteY11" fmla="*/ 728678 h 2653659"/>
+                <a:gd name="connsiteX12" fmla="*/ 3193967 w 3815424"/>
+                <a:gd name="connsiteY12" fmla="*/ 137719 h 2653659"/>
+              </a:gdLst>
+              <a:ahLst/>
+              <a:cxnLst>
+                <a:cxn ang="0">
+                  <a:pos x="connsiteX0" y="connsiteY0"/>
+                </a:cxn>
+                <a:cxn ang="0">
+                  <a:pos x="connsiteX1" y="connsiteY1"/>
+                </a:cxn>
+                <a:cxn ang="0">
+                  <a:pos x="connsiteX2" y="connsiteY2"/>
+                </a:cxn>
+                <a:cxn ang="0">
+                  <a:pos x="connsiteX3" y="connsiteY3"/>
+                </a:cxn>
+                <a:cxn ang="0">
+                  <a:pos x="connsiteX4" y="connsiteY4"/>
+                </a:cxn>
+                <a:cxn ang="0">
+                  <a:pos x="connsiteX5" y="connsiteY5"/>
+                </a:cxn>
+                <a:cxn ang="0">
+                  <a:pos x="connsiteX6" y="connsiteY6"/>
+                </a:cxn>
+                <a:cxn ang="0">
+                  <a:pos x="connsiteX7" y="connsiteY7"/>
+                </a:cxn>
+                <a:cxn ang="0">
+                  <a:pos x="connsiteX8" y="connsiteY8"/>
+                </a:cxn>
+                <a:cxn ang="0">
+                  <a:pos x="connsiteX9" y="connsiteY9"/>
+                </a:cxn>
+                <a:cxn ang="0">
+                  <a:pos x="connsiteX10" y="connsiteY10"/>
+                </a:cxn>
+                <a:cxn ang="0">
+                  <a:pos x="connsiteX11" y="connsiteY11"/>
+                </a:cxn>
+                <a:cxn ang="0">
+                  <a:pos x="connsiteX12" y="connsiteY12"/>
+                </a:cxn>
+              </a:cxnLst>
+              <a:rect l="l" t="t" r="r" b="b"/>
+              <a:pathLst>
+                <a:path w="3815424" h="2653659">
+                  <a:moveTo>
+                    <a:pt x="3203055" y="0"/>
+                  </a:moveTo>
+                  <a:lnTo>
+                    <a:pt x="3815424" y="0"/>
+                  </a:lnTo>
+                  <a:lnTo>
+                    <a:pt x="3801025" y="214243"/>
+                  </a:lnTo>
+                  <a:cubicBezTo>
+                    <a:pt x="3616317" y="1584467"/>
+                    <a:pt x="2091637" y="2653659"/>
+                    <a:pt x="587142" y="2653659"/>
+                  </a:cubicBezTo>
+                  <a:cubicBezTo>
+                    <a:pt x="400192" y="2653659"/>
+                    <a:pt x="222112" y="2636953"/>
+                    <a:pt x="53389" y="2605041"/>
+                  </a:cubicBezTo>
+                  <a:lnTo>
+                    <a:pt x="0" y="2593136"/>
+                  </a:lnTo>
+                  <a:lnTo>
+                    <a:pt x="0" y="1994836"/>
+                  </a:lnTo>
+                  <a:lnTo>
+                    <a:pt x="159710" y="2035054"/>
+                  </a:lnTo>
+                  <a:cubicBezTo>
+                    <a:pt x="295467" y="2061726"/>
+                    <a:pt x="438268" y="2075152"/>
+                    <a:pt x="587142" y="2075152"/>
+                  </a:cubicBezTo>
+                  <a:cubicBezTo>
+                    <a:pt x="901731" y="2075152"/>
+                    <a:pt x="1234490" y="2014697"/>
+                    <a:pt x="1549283" y="1900153"/>
+                  </a:cubicBezTo>
+                  <a:cubicBezTo>
+                    <a:pt x="1860709" y="1786959"/>
+                    <a:pt x="2157231" y="1620350"/>
+                    <a:pt x="2406698" y="1418450"/>
+                  </a:cubicBezTo>
+                  <a:cubicBezTo>
+                    <a:pt x="2655859" y="1216840"/>
+                    <a:pt x="2859596" y="978302"/>
+                    <a:pt x="2996069" y="728678"/>
+                  </a:cubicBezTo>
+                  <a:cubicBezTo>
+                    <a:pt x="3101178" y="536396"/>
+                    <a:pt x="3167417" y="338366"/>
+                    <a:pt x="3193967" y="137719"/>
+                  </a:cubicBezTo>
+                  <a:close/>
+                </a:path>
+              </a:pathLst>
+            </a:custGeom>
+            <a:gradFill>
+              <a:gsLst>
+                <a:gs pos="2000">
+                  <a:schemeClr val="bg1">
+                    <a:alpha val="10000"/>
+                  </a:schemeClr>
+                </a:gs>
+                <a:gs pos="16000">
+                  <a:schemeClr val="accent6">
+                    <a:alpha val="10000"/>
+                  </a:schemeClr>
+                </a:gs>
+                <a:gs pos="100000">
+                  <a:schemeClr val="bg1">
+                    <a:alpha val="10000"/>
+                  </a:schemeClr>
+                </a:gs>
+                <a:gs pos="85000">
+                  <a:schemeClr val="accent1">
+                    <a:alpha val="10000"/>
+                  </a:schemeClr>
+                </a:gs>
+              </a:gsLst>
+              <a:lin ang="12000000" scaled="0"/>
+            </a:gradFill>
+            <a:ln>
+              <a:noFill/>
+            </a:ln>
+          </p:spPr>
+          <p:style>
+            <a:lnRef idx="2">
+              <a:schemeClr val="accent1">
+                <a:shade val="50000"/>
+              </a:schemeClr>
+            </a:lnRef>
+            <a:fillRef idx="1">
+              <a:schemeClr val="accent1"/>
+            </a:fillRef>
+            <a:effectRef idx="0">
+              <a:schemeClr val="accent1"/>
+            </a:effectRef>
+            <a:fontRef idx="minor">
+              <a:schemeClr val="lt1"/>
+            </a:fontRef>
+          </p:style>
+          <p:txBody>
+            <a:bodyPr rtlCol="0" anchor="ctr"/>
+            <a:lstStyle/>
+            <a:p>
+              <a:pPr algn="ctr"/>
+              <a:endParaRPr lang="en-US"/>
+            </a:p>
+          </p:txBody>
+        </p:sp>
+        <p:sp>
+          <p:nvSpPr>
+            <p:cNvPr id="28" name="Freeform: Shape 13">
+              <a:extLst>
+                <a:ext uri="{FF2B5EF4-FFF2-40B4-BE49-F238E27FC236}">
+                  <a16:creationId xmlns:a16="http://schemas.microsoft.com/office/drawing/2014/main" id="{21B6B121-76D5-4D26-92B4-697EBDEE300A}"/>
+                </a:ext>
+                <a:ext uri="{C183D7F6-B498-43B3-948B-1728B52AA6E4}">
+                  <adec:decorative xmlns:adec="http://schemas.microsoft.com/office/drawing/2017/decorative" val="1"/>
+                </a:ext>
+              </a:extLst>
+            </p:cNvPr>
+            <p:cNvSpPr/>
+            <p:nvPr>
+              <p:extLst>
+                <p:ext uri="{386F3935-93C4-4BCD-93E2-E3B085C9AB24}">
+                  <p16:designElem xmlns:p16="http://schemas.microsoft.com/office/powerpoint/2015/main" val="1"/>
+                </p:ext>
+              </p:extLst>
+            </p:nvPr>
+          </p:nvSpPr>
+          <p:spPr>
+            <a:xfrm>
+              <a:off x="305" y="-1"/>
+              <a:ext cx="3815424" cy="2653660"/>
+            </a:xfrm>
+            <a:custGeom>
+              <a:avLst/>
+              <a:gdLst>
+                <a:gd name="connsiteX0" fmla="*/ 3305038 w 3815424"/>
+                <a:gd name="connsiteY0" fmla="*/ 0 h 2653660"/>
+                <a:gd name="connsiteX1" fmla="*/ 3815424 w 3815424"/>
+                <a:gd name="connsiteY1" fmla="*/ 0 h 2653660"/>
+                <a:gd name="connsiteX2" fmla="*/ 3801025 w 3815424"/>
+                <a:gd name="connsiteY2" fmla="*/ 214244 h 2653660"/>
+                <a:gd name="connsiteX3" fmla="*/ 587142 w 3815424"/>
+                <a:gd name="connsiteY3" fmla="*/ 2653660 h 2653660"/>
+                <a:gd name="connsiteX4" fmla="*/ 53389 w 3815424"/>
+                <a:gd name="connsiteY4" fmla="*/ 2605042 h 2653660"/>
+                <a:gd name="connsiteX5" fmla="*/ 0 w 3815424"/>
+                <a:gd name="connsiteY5" fmla="*/ 2593137 h 2653660"/>
+                <a:gd name="connsiteX6" fmla="*/ 0 w 3815424"/>
+                <a:gd name="connsiteY6" fmla="*/ 2094444 h 2653660"/>
+                <a:gd name="connsiteX7" fmla="*/ 137675 w 3815424"/>
+                <a:gd name="connsiteY7" fmla="*/ 2129195 h 2653660"/>
+                <a:gd name="connsiteX8" fmla="*/ 587142 w 3815424"/>
+                <a:gd name="connsiteY8" fmla="*/ 2171571 h 2653660"/>
+                <a:gd name="connsiteX9" fmla="*/ 1585826 w 3815424"/>
+                <a:gd name="connsiteY9" fmla="*/ 1990112 h 2653660"/>
+                <a:gd name="connsiteX10" fmla="*/ 2473046 w 3815424"/>
+                <a:gd name="connsiteY10" fmla="*/ 1491633 h 2653660"/>
+                <a:gd name="connsiteX11" fmla="*/ 3086710 w 3815424"/>
+                <a:gd name="connsiteY11" fmla="*/ 772838 h 2653660"/>
+                <a:gd name="connsiteX12" fmla="*/ 3295217 w 3815424"/>
+                <a:gd name="connsiteY12" fmla="*/ 149229 h 2653660"/>
+              </a:gdLst>
+              <a:ahLst/>
+              <a:cxnLst>
+                <a:cxn ang="0">
+                  <a:pos x="connsiteX0" y="connsiteY0"/>
+                </a:cxn>
+                <a:cxn ang="0">
+                  <a:pos x="connsiteX1" y="connsiteY1"/>
+                </a:cxn>
+                <a:cxn ang="0">
+                  <a:pos x="connsiteX2" y="connsiteY2"/>
+                </a:cxn>
+                <a:cxn ang="0">
+                  <a:pos x="connsiteX3" y="connsiteY3"/>
+                </a:cxn>
+                <a:cxn ang="0">
+                  <a:pos x="connsiteX4" y="connsiteY4"/>
+                </a:cxn>
+                <a:cxn ang="0">
+                  <a:pos x="connsiteX5" y="connsiteY5"/>
+                </a:cxn>
+                <a:cxn ang="0">
+                  <a:pos x="connsiteX6" y="connsiteY6"/>
+                </a:cxn>
+                <a:cxn ang="0">
+                  <a:pos x="connsiteX7" y="connsiteY7"/>
+                </a:cxn>
+                <a:cxn ang="0">
+                  <a:pos x="connsiteX8" y="connsiteY8"/>
+                </a:cxn>
+                <a:cxn ang="0">
+                  <a:pos x="connsiteX9" y="connsiteY9"/>
+                </a:cxn>
+                <a:cxn ang="0">
+                  <a:pos x="connsiteX10" y="connsiteY10"/>
+                </a:cxn>
+                <a:cxn ang="0">
+                  <a:pos x="connsiteX11" y="connsiteY11"/>
+                </a:cxn>
+                <a:cxn ang="0">
+                  <a:pos x="connsiteX12" y="connsiteY12"/>
+                </a:cxn>
+              </a:cxnLst>
+              <a:rect l="l" t="t" r="r" b="b"/>
+              <a:pathLst>
+                <a:path w="3815424" h="2653660">
+                  <a:moveTo>
+                    <a:pt x="3305038" y="0"/>
+                  </a:moveTo>
+                  <a:lnTo>
+                    <a:pt x="3815424" y="0"/>
+                  </a:lnTo>
+                  <a:lnTo>
+                    <a:pt x="3801025" y="214244"/>
+                  </a:lnTo>
+                  <a:cubicBezTo>
+                    <a:pt x="3616317" y="1584467"/>
+                    <a:pt x="2091637" y="2653660"/>
+                    <a:pt x="587142" y="2653660"/>
+                  </a:cubicBezTo>
+                  <a:cubicBezTo>
+                    <a:pt x="400192" y="2653660"/>
+                    <a:pt x="222112" y="2636954"/>
+                    <a:pt x="53389" y="2605042"/>
+                  </a:cubicBezTo>
+                  <a:lnTo>
+                    <a:pt x="0" y="2593137"/>
+                  </a:lnTo>
+                  <a:lnTo>
+                    <a:pt x="0" y="2094444"/>
+                  </a:lnTo>
+                  <a:lnTo>
+                    <a:pt x="137675" y="2129195"/>
+                  </a:lnTo>
+                  <a:cubicBezTo>
+                    <a:pt x="280616" y="2157374"/>
+                    <a:pt x="430766" y="2171571"/>
+                    <a:pt x="587142" y="2171571"/>
+                  </a:cubicBezTo>
+                  <a:cubicBezTo>
+                    <a:pt x="918879" y="2171571"/>
+                    <a:pt x="1254904" y="2110634"/>
+                    <a:pt x="1585826" y="1990112"/>
+                  </a:cubicBezTo>
+                  <a:cubicBezTo>
+                    <a:pt x="1908071" y="1873061"/>
+                    <a:pt x="2214800" y="1700666"/>
+                    <a:pt x="2473046" y="1491633"/>
+                  </a:cubicBezTo>
+                  <a:cubicBezTo>
+                    <a:pt x="2735782" y="1279031"/>
+                    <a:pt x="2942276" y="1037118"/>
+                    <a:pt x="3086710" y="772838"/>
+                  </a:cubicBezTo>
+                  <a:cubicBezTo>
+                    <a:pt x="3197408" y="570216"/>
+                    <a:pt x="3267226" y="361248"/>
+                    <a:pt x="3295217" y="149229"/>
+                  </a:cubicBezTo>
+                  <a:close/>
+                </a:path>
+              </a:pathLst>
+            </a:custGeom>
+            <a:gradFill>
+              <a:gsLst>
+                <a:gs pos="2000">
+                  <a:schemeClr val="bg1">
+                    <a:alpha val="10000"/>
+                  </a:schemeClr>
+                </a:gs>
+                <a:gs pos="16000">
+                  <a:schemeClr val="accent6">
+                    <a:alpha val="10000"/>
+                  </a:schemeClr>
+                </a:gs>
+                <a:gs pos="100000">
+                  <a:schemeClr val="bg1">
+                    <a:alpha val="10000"/>
+                  </a:schemeClr>
+                </a:gs>
+                <a:gs pos="85000">
+                  <a:schemeClr val="accent1">
+                    <a:alpha val="10000"/>
+                  </a:schemeClr>
+                </a:gs>
+              </a:gsLst>
+              <a:lin ang="12000000" scaled="0"/>
+            </a:gradFill>
+            <a:ln>
+              <a:noFill/>
+            </a:ln>
+          </p:spPr>
+          <p:style>
+            <a:lnRef idx="2">
+              <a:schemeClr val="accent1">
+                <a:shade val="50000"/>
+              </a:schemeClr>
+            </a:lnRef>
+            <a:fillRef idx="1">
+              <a:schemeClr val="accent1"/>
+            </a:fillRef>
+            <a:effectRef idx="0">
+              <a:schemeClr val="accent1"/>
+            </a:effectRef>
+            <a:fontRef idx="minor">
+              <a:schemeClr val="lt1"/>
+            </a:fontRef>
+          </p:style>
+          <p:txBody>
+            <a:bodyPr rtlCol="0" anchor="ctr"/>
+            <a:lstStyle/>
+            <a:p>
+              <a:pPr algn="ctr"/>
+              <a:endParaRPr lang="en-US"/>
+            </a:p>
+          </p:txBody>
+        </p:sp>
+        <p:sp>
+          <p:nvSpPr>
+            <p:cNvPr id="29" name="Freeform: Shape 14">
+              <a:extLst>
+                <a:ext uri="{FF2B5EF4-FFF2-40B4-BE49-F238E27FC236}">
+                  <a16:creationId xmlns:a16="http://schemas.microsoft.com/office/drawing/2014/main" id="{394B9A53-60A5-4916-BC15-DB03763D9382}"/>
+                </a:ext>
+                <a:ext uri="{C183D7F6-B498-43B3-948B-1728B52AA6E4}">
+                  <adec:decorative xmlns:adec="http://schemas.microsoft.com/office/drawing/2017/decorative" val="1"/>
+                </a:ext>
+              </a:extLst>
+            </p:cNvPr>
+            <p:cNvSpPr/>
+            <p:nvPr>
+              <p:extLst>
+                <p:ext uri="{386F3935-93C4-4BCD-93E2-E3B085C9AB24}">
+                  <p16:designElem xmlns:p16="http://schemas.microsoft.com/office/powerpoint/2015/main" val="1"/>
+                </p:ext>
+              </p:extLst>
+            </p:nvPr>
+          </p:nvSpPr>
+          <p:spPr>
+            <a:xfrm>
+              <a:off x="-305" y="1"/>
+              <a:ext cx="3815986" cy="2675935"/>
+            </a:xfrm>
+            <a:custGeom>
+              <a:avLst/>
+              <a:gdLst>
+                <a:gd name="connsiteX0" fmla="*/ 3648768 w 3815986"/>
+                <a:gd name="connsiteY0" fmla="*/ 0 h 2675935"/>
+                <a:gd name="connsiteX1" fmla="*/ 3815986 w 3815986"/>
+                <a:gd name="connsiteY1" fmla="*/ 0 h 2675935"/>
+                <a:gd name="connsiteX2" fmla="*/ 3804695 w 3815986"/>
+                <a:gd name="connsiteY2" fmla="*/ 200084 h 2675935"/>
+                <a:gd name="connsiteX3" fmla="*/ 3762590 w 3815986"/>
+                <a:gd name="connsiteY3" fmla="*/ 455543 h 2675935"/>
+                <a:gd name="connsiteX4" fmla="*/ 3592332 w 3815986"/>
+                <a:gd name="connsiteY4" fmla="*/ 947274 h 2675935"/>
+                <a:gd name="connsiteX5" fmla="*/ 2953967 w 3815986"/>
+                <a:gd name="connsiteY5" fmla="*/ 1782349 h 2675935"/>
+                <a:gd name="connsiteX6" fmla="*/ 2530669 w 3815986"/>
+                <a:gd name="connsiteY6" fmla="*/ 2109494 h 2675935"/>
+                <a:gd name="connsiteX7" fmla="*/ 2057561 w 3815986"/>
+                <a:gd name="connsiteY7" fmla="*/ 2369245 h 2675935"/>
+                <a:gd name="connsiteX8" fmla="*/ 1007330 w 3815986"/>
+                <a:gd name="connsiteY8" fmla="*/ 2655701 h 2675935"/>
+                <a:gd name="connsiteX9" fmla="*/ 732765 w 3815986"/>
+                <a:gd name="connsiteY9" fmla="*/ 2674696 h 2675935"/>
+                <a:gd name="connsiteX10" fmla="*/ 457666 w 3815986"/>
+                <a:gd name="connsiteY10" fmla="*/ 2670839 h 2675935"/>
+                <a:gd name="connsiteX11" fmla="*/ 183574 w 3815986"/>
+                <a:gd name="connsiteY11" fmla="*/ 2643312 h 2675935"/>
+                <a:gd name="connsiteX12" fmla="*/ 0 w 3815986"/>
+                <a:gd name="connsiteY12" fmla="*/ 2607798 h 2675935"/>
+                <a:gd name="connsiteX13" fmla="*/ 0 w 3815986"/>
+                <a:gd name="connsiteY13" fmla="*/ 2356652 h 2675935"/>
+                <a:gd name="connsiteX14" fmla="*/ 222195 w 3815986"/>
+                <a:gd name="connsiteY14" fmla="*/ 2396940 h 2675935"/>
+                <a:gd name="connsiteX15" fmla="*/ 472364 w 3815986"/>
+                <a:gd name="connsiteY15" fmla="*/ 2419092 h 2675935"/>
+                <a:gd name="connsiteX16" fmla="*/ 974972 w 3815986"/>
+                <a:gd name="connsiteY16" fmla="*/ 2402122 h 2675935"/>
+                <a:gd name="connsiteX17" fmla="*/ 1468292 w 3815986"/>
+                <a:gd name="connsiteY17" fmla="*/ 2304162 h 2675935"/>
+                <a:gd name="connsiteX18" fmla="*/ 1940176 w 3815986"/>
+                <a:gd name="connsiteY18" fmla="*/ 2133695 h 2675935"/>
+                <a:gd name="connsiteX19" fmla="*/ 2783403 w 3815986"/>
+                <a:gd name="connsiteY19" fmla="*/ 1609954 h 2675935"/>
+                <a:gd name="connsiteX20" fmla="*/ 3128104 w 3815986"/>
+                <a:gd name="connsiteY20" fmla="*/ 1260439 h 2675935"/>
+                <a:gd name="connsiteX21" fmla="*/ 3400639 w 3815986"/>
+                <a:gd name="connsiteY21" fmla="*/ 859052 h 2675935"/>
+                <a:gd name="connsiteX22" fmla="*/ 3585595 w 3815986"/>
+                <a:gd name="connsiteY22" fmla="*/ 415336 h 2675935"/>
+                <a:gd name="connsiteX23" fmla="*/ 3635918 w 3815986"/>
+                <a:gd name="connsiteY23" fmla="*/ 181137 h 2675935"/>
+              </a:gdLst>
+              <a:ahLst/>
+              <a:cxnLst>
+                <a:cxn ang="0">
+                  <a:pos x="connsiteX0" y="connsiteY0"/>
+                </a:cxn>
+                <a:cxn ang="0">
+                  <a:pos x="connsiteX1" y="connsiteY1"/>
+                </a:cxn>
+                <a:cxn ang="0">
+                  <a:pos x="connsiteX2" y="connsiteY2"/>
+                </a:cxn>
+                <a:cxn ang="0">
+                  <a:pos x="connsiteX3" y="connsiteY3"/>
+                </a:cxn>
+                <a:cxn ang="0">
+                  <a:pos x="connsiteX4" y="connsiteY4"/>
+                </a:cxn>
+                <a:cxn ang="0">
+                  <a:pos x="connsiteX5" y="connsiteY5"/>
+                </a:cxn>
+                <a:cxn ang="0">
+                  <a:pos x="connsiteX6" y="connsiteY6"/>
+                </a:cxn>
+                <a:cxn ang="0">
+                  <a:pos x="connsiteX7" y="connsiteY7"/>
+                </a:cxn>
+                <a:cxn ang="0">
+                  <a:pos x="connsiteX8" y="connsiteY8"/>
+                </a:cxn>
+                <a:cxn ang="0">
+                  <a:pos x="connsiteX9" y="connsiteY9"/>
+                </a:cxn>
+                <a:cxn ang="0">
+                  <a:pos x="connsiteX10" y="connsiteY10"/>
+                </a:cxn>
+                <a:cxn ang="0">
+                  <a:pos x="connsiteX11" y="connsiteY11"/>
+                </a:cxn>
+                <a:cxn ang="0">
+                  <a:pos x="connsiteX12" y="connsiteY12"/>
+                </a:cxn>
+                <a:cxn ang="0">
+                  <a:pos x="connsiteX13" y="connsiteY13"/>
+                </a:cxn>
+                <a:cxn ang="0">
+                  <a:pos x="connsiteX14" y="connsiteY14"/>
+                </a:cxn>
+                <a:cxn ang="0">
+                  <a:pos x="connsiteX15" y="connsiteY15"/>
+                </a:cxn>
+                <a:cxn ang="0">
+                  <a:pos x="connsiteX16" y="connsiteY16"/>
+                </a:cxn>
+                <a:cxn ang="0">
+                  <a:pos x="connsiteX17" y="connsiteY17"/>
+                </a:cxn>
+                <a:cxn ang="0">
+                  <a:pos x="connsiteX18" y="connsiteY18"/>
+                </a:cxn>
+                <a:cxn ang="0">
+                  <a:pos x="connsiteX19" y="connsiteY19"/>
+                </a:cxn>
+                <a:cxn ang="0">
+                  <a:pos x="connsiteX20" y="connsiteY20"/>
+                </a:cxn>
+                <a:cxn ang="0">
+                  <a:pos x="connsiteX21" y="connsiteY21"/>
+                </a:cxn>
+                <a:cxn ang="0">
+                  <a:pos x="connsiteX22" y="connsiteY22"/>
+                </a:cxn>
+                <a:cxn ang="0">
+                  <a:pos x="connsiteX23" y="connsiteY23"/>
+                </a:cxn>
+              </a:cxnLst>
+              <a:rect l="l" t="t" r="r" b="b"/>
+              <a:pathLst>
+                <a:path w="3815986" h="2675935">
+                  <a:moveTo>
+                    <a:pt x="3648768" y="0"/>
+                  </a:moveTo>
+                  <a:lnTo>
+                    <a:pt x="3815986" y="0"/>
+                  </a:lnTo>
+                  <a:lnTo>
+                    <a:pt x="3804695" y="200084"/>
+                  </a:lnTo>
+                  <a:cubicBezTo>
+                    <a:pt x="3795228" y="285751"/>
+                    <a:pt x="3781167" y="371032"/>
+                    <a:pt x="3762590" y="455543"/>
+                  </a:cubicBezTo>
+                  <a:cubicBezTo>
+                    <a:pt x="3725537" y="624467"/>
+                    <a:pt x="3668784" y="790112"/>
+                    <a:pt x="3592332" y="947274"/>
+                  </a:cubicBezTo>
+                  <a:cubicBezTo>
+                    <a:pt x="3438712" y="1261596"/>
+                    <a:pt x="3216091" y="1542847"/>
+                    <a:pt x="2953967" y="1782349"/>
+                  </a:cubicBezTo>
+                  <a:cubicBezTo>
+                    <a:pt x="2822599" y="1902099"/>
+                    <a:pt x="2680615" y="2011341"/>
+                    <a:pt x="2530669" y="2109494"/>
+                  </a:cubicBezTo>
+                  <a:cubicBezTo>
+                    <a:pt x="2380520" y="2207551"/>
+                    <a:pt x="2222510" y="2294906"/>
+                    <a:pt x="2057561" y="2369245"/>
+                  </a:cubicBezTo>
+                  <a:cubicBezTo>
+                    <a:pt x="1727252" y="2516859"/>
+                    <a:pt x="1371629" y="2614434"/>
+                    <a:pt x="1007330" y="2655701"/>
+                  </a:cubicBezTo>
+                  <a:cubicBezTo>
+                    <a:pt x="916281" y="2665873"/>
+                    <a:pt x="824568" y="2672188"/>
+                    <a:pt x="732765" y="2674696"/>
+                  </a:cubicBezTo>
+                  <a:cubicBezTo>
+                    <a:pt x="640963" y="2677203"/>
+                    <a:pt x="549072" y="2675901"/>
+                    <a:pt x="457666" y="2670839"/>
+                  </a:cubicBezTo>
+                  <a:cubicBezTo>
+                    <a:pt x="366106" y="2665584"/>
+                    <a:pt x="274572" y="2656521"/>
+                    <a:pt x="183574" y="2643312"/>
+                  </a:cubicBezTo>
+                  <a:lnTo>
+                    <a:pt x="0" y="2607798"/>
+                  </a:lnTo>
+                  <a:lnTo>
+                    <a:pt x="0" y="2356652"/>
+                  </a:lnTo>
+                  <a:lnTo>
+                    <a:pt x="222195" y="2396940"/>
+                  </a:lnTo>
+                  <a:cubicBezTo>
+                    <a:pt x="304990" y="2407980"/>
+                    <a:pt x="388511" y="2415283"/>
+                    <a:pt x="472364" y="2419092"/>
+                  </a:cubicBezTo>
+                  <a:cubicBezTo>
+                    <a:pt x="640376" y="2427095"/>
+                    <a:pt x="808184" y="2421791"/>
+                    <a:pt x="974972" y="2402122"/>
+                  </a:cubicBezTo>
+                  <a:cubicBezTo>
+                    <a:pt x="1141658" y="2382358"/>
+                    <a:pt x="1306812" y="2349286"/>
+                    <a:pt x="1468292" y="2304162"/>
+                  </a:cubicBezTo>
+                  <a:cubicBezTo>
+                    <a:pt x="1629874" y="2259231"/>
+                    <a:pt x="1787475" y="2201091"/>
+                    <a:pt x="1940176" y="2133695"/>
+                  </a:cubicBezTo>
+                  <a:cubicBezTo>
+                    <a:pt x="2246498" y="2000349"/>
+                    <a:pt x="2532507" y="1823520"/>
+                    <a:pt x="2783403" y="1609954"/>
+                  </a:cubicBezTo>
+                  <a:cubicBezTo>
+                    <a:pt x="2908442" y="1502833"/>
+                    <a:pt x="3024295" y="1385975"/>
+                    <a:pt x="3128104" y="1260439"/>
+                  </a:cubicBezTo>
+                  <a:cubicBezTo>
+                    <a:pt x="3232116" y="1135096"/>
+                    <a:pt x="3323881" y="1000689"/>
+                    <a:pt x="3400639" y="859052"/>
+                  </a:cubicBezTo>
+                  <a:cubicBezTo>
+                    <a:pt x="3477399" y="717510"/>
+                    <a:pt x="3541296" y="569316"/>
+                    <a:pt x="3585595" y="415336"/>
+                  </a:cubicBezTo>
+                  <a:cubicBezTo>
+                    <a:pt x="3607796" y="338540"/>
+                    <a:pt x="3624638" y="260224"/>
+                    <a:pt x="3635918" y="181137"/>
+                  </a:cubicBezTo>
+                  <a:close/>
+                </a:path>
+              </a:pathLst>
+            </a:custGeom>
+            <a:gradFill>
+              <a:gsLst>
+                <a:gs pos="2000">
+                  <a:schemeClr val="bg1">
+                    <a:alpha val="10000"/>
+                  </a:schemeClr>
+                </a:gs>
+                <a:gs pos="16000">
+                  <a:schemeClr val="accent6">
+                    <a:alpha val="10000"/>
+                  </a:schemeClr>
+                </a:gs>
+                <a:gs pos="100000">
+                  <a:schemeClr val="bg1">
+                    <a:alpha val="10000"/>
+                  </a:schemeClr>
+                </a:gs>
+                <a:gs pos="85000">
+                  <a:schemeClr val="accent1">
+                    <a:alpha val="10000"/>
+                  </a:schemeClr>
+                </a:gs>
+              </a:gsLst>
+              <a:lin ang="12000000" scaled="0"/>
+            </a:gradFill>
+            <a:ln>
+              <a:noFill/>
+            </a:ln>
+          </p:spPr>
+          <p:style>
+            <a:lnRef idx="2">
+              <a:schemeClr val="accent1">
+                <a:shade val="50000"/>
+              </a:schemeClr>
+            </a:lnRef>
+            <a:fillRef idx="1">
+              <a:schemeClr val="accent1"/>
+            </a:fillRef>
+            <a:effectRef idx="0">
+              <a:schemeClr val="accent1"/>
+            </a:effectRef>
+            <a:fontRef idx="minor">
+              <a:schemeClr val="lt1"/>
+            </a:fontRef>
+          </p:style>
+          <p:txBody>
+            <a:bodyPr rtlCol="0" anchor="ctr"/>
+            <a:lstStyle/>
+            <a:p>
+              <a:pPr algn="ctr"/>
+              <a:endParaRPr lang="en-US"/>
+            </a:p>
+          </p:txBody>
+        </p:sp>
+        <p:sp>
+          <p:nvSpPr>
+            <p:cNvPr id="30" name="Freeform: Shape 15">
+              <a:extLst>
+                <a:ext uri="{FF2B5EF4-FFF2-40B4-BE49-F238E27FC236}">
+                  <a16:creationId xmlns:a16="http://schemas.microsoft.com/office/drawing/2014/main" id="{47CB5DB3-B68B-4EDB-8EB4-F70741361AC2}"/>
+                </a:ext>
+                <a:ext uri="{C183D7F6-B498-43B3-948B-1728B52AA6E4}">
+                  <adec:decorative xmlns:adec="http://schemas.microsoft.com/office/drawing/2017/decorative" val="1"/>
+                </a:ext>
+              </a:extLst>
+            </p:cNvPr>
+            <p:cNvSpPr/>
+            <p:nvPr>
+              <p:extLst>
+                <p:ext uri="{386F3935-93C4-4BCD-93E2-E3B085C9AB24}">
+                  <p16:designElem xmlns:p16="http://schemas.microsoft.com/office/powerpoint/2015/main" val="1"/>
+                </p:ext>
+              </p:extLst>
+            </p:nvPr>
+          </p:nvSpPr>
+          <p:spPr>
+            <a:xfrm>
+              <a:off x="305" y="-1"/>
+              <a:ext cx="3832270" cy="2876136"/>
+            </a:xfrm>
+            <a:custGeom>
+              <a:avLst/>
+              <a:gdLst>
+                <a:gd name="connsiteX0" fmla="*/ 3800718 w 3832270"/>
+                <a:gd name="connsiteY0" fmla="*/ 0 h 2876136"/>
+                <a:gd name="connsiteX1" fmla="*/ 3832270 w 3832270"/>
+                <a:gd name="connsiteY1" fmla="*/ 0 h 2876136"/>
+                <a:gd name="connsiteX2" fmla="*/ 3824562 w 3832270"/>
+                <a:gd name="connsiteY2" fmla="*/ 143769 h 2876136"/>
+                <a:gd name="connsiteX3" fmla="*/ 3628155 w 3832270"/>
+                <a:gd name="connsiteY3" fmla="*/ 922055 h 2876136"/>
+                <a:gd name="connsiteX4" fmla="*/ 3514853 w 3832270"/>
+                <a:gd name="connsiteY4" fmla="*/ 1169078 h 2876136"/>
+                <a:gd name="connsiteX5" fmla="*/ 3379198 w 3832270"/>
+                <a:gd name="connsiteY5" fmla="*/ 1407037 h 2876136"/>
+                <a:gd name="connsiteX6" fmla="*/ 3043787 w 3832270"/>
+                <a:gd name="connsiteY6" fmla="*/ 1848342 h 2876136"/>
+                <a:gd name="connsiteX7" fmla="*/ 2845661 w 3832270"/>
+                <a:gd name="connsiteY7" fmla="*/ 2047444 h 2876136"/>
+                <a:gd name="connsiteX8" fmla="*/ 2793197 w 3832270"/>
+                <a:gd name="connsiteY8" fmla="*/ 2094689 h 2876136"/>
+                <a:gd name="connsiteX9" fmla="*/ 2739710 w 3832270"/>
+                <a:gd name="connsiteY9" fmla="*/ 2140969 h 2876136"/>
+                <a:gd name="connsiteX10" fmla="*/ 2629166 w 3832270"/>
+                <a:gd name="connsiteY10" fmla="*/ 2229867 h 2876136"/>
+                <a:gd name="connsiteX11" fmla="*/ 2145952 w 3832270"/>
+                <a:gd name="connsiteY11" fmla="*/ 2535994 h 2876136"/>
+                <a:gd name="connsiteX12" fmla="*/ 1034987 w 3832270"/>
+                <a:gd name="connsiteY12" fmla="*/ 2863910 h 2876136"/>
+                <a:gd name="connsiteX13" fmla="*/ 741909 w 3832270"/>
+                <a:gd name="connsiteY13" fmla="*/ 2875939 h 2876136"/>
+                <a:gd name="connsiteX14" fmla="*/ 450208 w 3832270"/>
+                <a:gd name="connsiteY14" fmla="*/ 2857451 h 2876136"/>
+                <a:gd name="connsiteX15" fmla="*/ 22215 w 3832270"/>
+                <a:gd name="connsiteY15" fmla="*/ 2775923 h 2876136"/>
+                <a:gd name="connsiteX16" fmla="*/ 0 w 3832270"/>
+                <a:gd name="connsiteY16" fmla="*/ 2769256 h 2876136"/>
+                <a:gd name="connsiteX17" fmla="*/ 0 w 3832270"/>
+                <a:gd name="connsiteY17" fmla="*/ 2590612 h 2876136"/>
+                <a:gd name="connsiteX18" fmla="*/ 199046 w 3832270"/>
+                <a:gd name="connsiteY18" fmla="*/ 2627410 h 2876136"/>
+                <a:gd name="connsiteX19" fmla="*/ 468174 w 3832270"/>
+                <a:gd name="connsiteY19" fmla="*/ 2649670 h 2876136"/>
+                <a:gd name="connsiteX20" fmla="*/ 1003650 w 3832270"/>
+                <a:gd name="connsiteY20" fmla="*/ 2622480 h 2876136"/>
+                <a:gd name="connsiteX21" fmla="*/ 1266489 w 3832270"/>
+                <a:gd name="connsiteY21" fmla="*/ 2573982 h 2876136"/>
+                <a:gd name="connsiteX22" fmla="*/ 1524223 w 3832270"/>
+                <a:gd name="connsiteY22" fmla="*/ 2504657 h 2876136"/>
+                <a:gd name="connsiteX23" fmla="*/ 1775731 w 3832270"/>
+                <a:gd name="connsiteY23" fmla="*/ 2416243 h 2876136"/>
+                <a:gd name="connsiteX24" fmla="*/ 2019789 w 3832270"/>
+                <a:gd name="connsiteY24" fmla="*/ 2309412 h 2876136"/>
+                <a:gd name="connsiteX25" fmla="*/ 2482486 w 3832270"/>
+                <a:gd name="connsiteY25" fmla="*/ 2046962 h 2876136"/>
+                <a:gd name="connsiteX26" fmla="*/ 2591908 w 3832270"/>
+                <a:gd name="connsiteY26" fmla="*/ 1971371 h 2876136"/>
+                <a:gd name="connsiteX27" fmla="*/ 2645702 w 3832270"/>
+                <a:gd name="connsiteY27" fmla="*/ 1932321 h 2876136"/>
+                <a:gd name="connsiteX28" fmla="*/ 2698779 w 3832270"/>
+                <a:gd name="connsiteY28" fmla="*/ 1892309 h 2876136"/>
+                <a:gd name="connsiteX29" fmla="*/ 2903537 w 3832270"/>
+                <a:gd name="connsiteY29" fmla="*/ 1722516 h 2876136"/>
+                <a:gd name="connsiteX30" fmla="*/ 3269061 w 3832270"/>
+                <a:gd name="connsiteY30" fmla="*/ 1337327 h 2876136"/>
+                <a:gd name="connsiteX31" fmla="*/ 3424928 w 3832270"/>
+                <a:gd name="connsiteY31" fmla="*/ 1122508 h 2876136"/>
+                <a:gd name="connsiteX32" fmla="*/ 3557622 w 3832270"/>
+                <a:gd name="connsiteY32" fmla="*/ 893226 h 2876136"/>
+                <a:gd name="connsiteX33" fmla="*/ 3587019 w 3832270"/>
+                <a:gd name="connsiteY33" fmla="*/ 833929 h 2876136"/>
+                <a:gd name="connsiteX34" fmla="*/ 3601310 w 3832270"/>
+                <a:gd name="connsiteY34" fmla="*/ 804040 h 2876136"/>
+                <a:gd name="connsiteX35" fmla="*/ 3614885 w 3832270"/>
+                <a:gd name="connsiteY35" fmla="*/ 773861 h 2876136"/>
+                <a:gd name="connsiteX36" fmla="*/ 3640812 w 3832270"/>
+                <a:gd name="connsiteY36" fmla="*/ 713022 h 2876136"/>
+                <a:gd name="connsiteX37" fmla="*/ 3665105 w 3832270"/>
+                <a:gd name="connsiteY37" fmla="*/ 651506 h 2876136"/>
+                <a:gd name="connsiteX38" fmla="*/ 3744110 w 3832270"/>
+                <a:gd name="connsiteY38" fmla="*/ 399567 h 2876136"/>
+                <a:gd name="connsiteX39" fmla="*/ 3792123 w 3832270"/>
+                <a:gd name="connsiteY39" fmla="*/ 140444 h 2876136"/>
+              </a:gdLst>
+              <a:ahLst/>
+              <a:cxnLst>
+                <a:cxn ang="0">
+                  <a:pos x="connsiteX0" y="connsiteY0"/>
+                </a:cxn>
+                <a:cxn ang="0">
+                  <a:pos x="connsiteX1" y="connsiteY1"/>
+                </a:cxn>
+                <a:cxn ang="0">
+                  <a:pos x="connsiteX2" y="connsiteY2"/>
+                </a:cxn>
+                <a:cxn ang="0">
+                  <a:pos x="connsiteX3" y="connsiteY3"/>
+                </a:cxn>
+                <a:cxn ang="0">
+                  <a:pos x="connsiteX4" y="connsiteY4"/>
+                </a:cxn>
+                <a:cxn ang="0">
+                  <a:pos x="connsiteX5" y="connsiteY5"/>
+                </a:cxn>
+                <a:cxn ang="0">
+                  <a:pos x="connsiteX6" y="connsiteY6"/>
+                </a:cxn>
+                <a:cxn ang="0">
+                  <a:pos x="connsiteX7" y="connsiteY7"/>
+                </a:cxn>
+                <a:cxn ang="0">
+                  <a:pos x="connsiteX8" y="connsiteY8"/>
+                </a:cxn>
+                <a:cxn ang="0">
+                  <a:pos x="connsiteX9" y="connsiteY9"/>
+                </a:cxn>
+                <a:cxn ang="0">
+                  <a:pos x="connsiteX10" y="connsiteY10"/>
+                </a:cxn>
+                <a:cxn ang="0">
+                  <a:pos x="connsiteX11" y="connsiteY11"/>
+                </a:cxn>
+                <a:cxn ang="0">
+                  <a:pos x="connsiteX12" y="connsiteY12"/>
+                </a:cxn>
+                <a:cxn ang="0">
+                  <a:pos x="connsiteX13" y="connsiteY13"/>
+                </a:cxn>
+                <a:cxn ang="0">
+                  <a:pos x="connsiteX14" y="connsiteY14"/>
+                </a:cxn>
+                <a:cxn ang="0">
+                  <a:pos x="connsiteX15" y="connsiteY15"/>
+                </a:cxn>
+                <a:cxn ang="0">
+                  <a:pos x="connsiteX16" y="connsiteY16"/>
+                </a:cxn>
+                <a:cxn ang="0">
+                  <a:pos x="connsiteX17" y="connsiteY17"/>
+                </a:cxn>
+                <a:cxn ang="0">
+                  <a:pos x="connsiteX18" y="connsiteY18"/>
+                </a:cxn>
+                <a:cxn ang="0">
+                  <a:pos x="connsiteX19" y="connsiteY19"/>
+                </a:cxn>
+                <a:cxn ang="0">
+                  <a:pos x="connsiteX20" y="connsiteY20"/>
+                </a:cxn>
+                <a:cxn ang="0">
+                  <a:pos x="connsiteX21" y="connsiteY21"/>
+                </a:cxn>
+                <a:cxn ang="0">
+                  <a:pos x="connsiteX22" y="connsiteY22"/>
+                </a:cxn>
+                <a:cxn ang="0">
+                  <a:pos x="connsiteX23" y="connsiteY23"/>
+                </a:cxn>
+                <a:cxn ang="0">
+                  <a:pos x="connsiteX24" y="connsiteY24"/>
+                </a:cxn>
+                <a:cxn ang="0">
+                  <a:pos x="connsiteX25" y="connsiteY25"/>
+                </a:cxn>
+                <a:cxn ang="0">
+                  <a:pos x="connsiteX26" y="connsiteY26"/>
+                </a:cxn>
+                <a:cxn ang="0">
+                  <a:pos x="connsiteX27" y="connsiteY27"/>
+                </a:cxn>
+                <a:cxn ang="0">
+                  <a:pos x="connsiteX28" y="connsiteY28"/>
+                </a:cxn>
+                <a:cxn ang="0">
+                  <a:pos x="connsiteX29" y="connsiteY29"/>
+                </a:cxn>
+                <a:cxn ang="0">
+                  <a:pos x="connsiteX30" y="connsiteY30"/>
+                </a:cxn>
+                <a:cxn ang="0">
+                  <a:pos x="connsiteX31" y="connsiteY31"/>
+                </a:cxn>
+                <a:cxn ang="0">
+                  <a:pos x="connsiteX32" y="connsiteY32"/>
+                </a:cxn>
+                <a:cxn ang="0">
+                  <a:pos x="connsiteX33" y="connsiteY33"/>
+                </a:cxn>
+                <a:cxn ang="0">
+                  <a:pos x="connsiteX34" y="connsiteY34"/>
+                </a:cxn>
+                <a:cxn ang="0">
+                  <a:pos x="connsiteX35" y="connsiteY35"/>
+                </a:cxn>
+                <a:cxn ang="0">
+                  <a:pos x="connsiteX36" y="connsiteY36"/>
+                </a:cxn>
+                <a:cxn ang="0">
+                  <a:pos x="connsiteX37" y="connsiteY37"/>
+                </a:cxn>
+                <a:cxn ang="0">
+                  <a:pos x="connsiteX38" y="connsiteY38"/>
+                </a:cxn>
+                <a:cxn ang="0">
+                  <a:pos x="connsiteX39" y="connsiteY39"/>
+                </a:cxn>
+              </a:cxnLst>
+              <a:rect l="l" t="t" r="r" b="b"/>
+              <a:pathLst>
+                <a:path w="3832270" h="2876136">
+                  <a:moveTo>
+                    <a:pt x="3800718" y="0"/>
+                  </a:moveTo>
+                  <a:lnTo>
+                    <a:pt x="3832270" y="0"/>
+                  </a:lnTo>
+                  <a:lnTo>
+                    <a:pt x="3824562" y="143769"/>
+                  </a:lnTo>
+                  <a:cubicBezTo>
+                    <a:pt x="3797131" y="409191"/>
+                    <a:pt x="3730585" y="671345"/>
+                    <a:pt x="3628155" y="922055"/>
+                  </a:cubicBezTo>
+                  <a:cubicBezTo>
+                    <a:pt x="3593858" y="1005553"/>
+                    <a:pt x="3556704" y="1088280"/>
+                    <a:pt x="3514853" y="1169078"/>
+                  </a:cubicBezTo>
+                  <a:cubicBezTo>
+                    <a:pt x="3473616" y="1250166"/>
+                    <a:pt x="3428194" y="1329517"/>
+                    <a:pt x="3379198" y="1407037"/>
+                  </a:cubicBezTo>
+                  <a:cubicBezTo>
+                    <a:pt x="3281106" y="1561980"/>
+                    <a:pt x="3169132" y="1710174"/>
+                    <a:pt x="3043787" y="1848342"/>
+                  </a:cubicBezTo>
+                  <a:cubicBezTo>
+                    <a:pt x="2980806" y="1917184"/>
+                    <a:pt x="2915071" y="1984001"/>
+                    <a:pt x="2845661" y="2047444"/>
+                  </a:cubicBezTo>
+                  <a:cubicBezTo>
+                    <a:pt x="2828411" y="2063450"/>
+                    <a:pt x="2811060" y="2079263"/>
+                    <a:pt x="2793197" y="2094689"/>
+                  </a:cubicBezTo>
+                  <a:cubicBezTo>
+                    <a:pt x="2775436" y="2110213"/>
+                    <a:pt x="2757982" y="2126025"/>
+                    <a:pt x="2739710" y="2140969"/>
+                  </a:cubicBezTo>
+                  <a:cubicBezTo>
+                    <a:pt x="2703576" y="2171341"/>
+                    <a:pt x="2666524" y="2200749"/>
+                    <a:pt x="2629166" y="2229867"/>
+                  </a:cubicBezTo>
+                  <a:cubicBezTo>
+                    <a:pt x="2479015" y="2345569"/>
+                    <a:pt x="2316821" y="2448061"/>
+                    <a:pt x="2145952" y="2535994"/>
+                  </a:cubicBezTo>
+                  <a:cubicBezTo>
+                    <a:pt x="1804312" y="2711957"/>
+                    <a:pt x="1424600" y="2826982"/>
+                    <a:pt x="1034987" y="2863910"/>
+                  </a:cubicBezTo>
+                  <a:cubicBezTo>
+                    <a:pt x="937762" y="2873167"/>
+                    <a:pt x="839720" y="2877096"/>
+                    <a:pt x="741909" y="2875939"/>
+                  </a:cubicBezTo>
+                  <a:cubicBezTo>
+                    <a:pt x="644097" y="2874782"/>
+                    <a:pt x="546515" y="2868539"/>
+                    <a:pt x="450208" y="2857451"/>
+                  </a:cubicBezTo>
+                  <a:cubicBezTo>
+                    <a:pt x="305520" y="2840674"/>
+                    <a:pt x="162095" y="2813810"/>
+                    <a:pt x="22215" y="2775923"/>
+                  </a:cubicBezTo>
+                  <a:lnTo>
+                    <a:pt x="0" y="2769256"/>
+                  </a:lnTo>
+                  <a:lnTo>
+                    <a:pt x="0" y="2590612"/>
+                  </a:lnTo>
+                  <a:lnTo>
+                    <a:pt x="199046" y="2627410"/>
+                  </a:lnTo>
+                  <a:cubicBezTo>
+                    <a:pt x="288321" y="2639209"/>
+                    <a:pt x="378197" y="2646537"/>
+                    <a:pt x="468174" y="2649670"/>
+                  </a:cubicBezTo>
+                  <a:cubicBezTo>
+                    <a:pt x="648333" y="2656805"/>
+                    <a:pt x="826655" y="2647163"/>
+                    <a:pt x="1003650" y="2622480"/>
+                  </a:cubicBezTo>
+                  <a:cubicBezTo>
+                    <a:pt x="1091943" y="2609658"/>
+                    <a:pt x="1179725" y="2593747"/>
+                    <a:pt x="1266489" y="2573982"/>
+                  </a:cubicBezTo>
+                  <a:cubicBezTo>
+                    <a:pt x="1353250" y="2553927"/>
+                    <a:pt x="1439298" y="2531076"/>
+                    <a:pt x="1524223" y="2504657"/>
+                  </a:cubicBezTo>
+                  <a:cubicBezTo>
+                    <a:pt x="1609149" y="2478336"/>
+                    <a:pt x="1693052" y="2448833"/>
+                    <a:pt x="1775731" y="2416243"/>
+                  </a:cubicBezTo>
+                  <a:cubicBezTo>
+                    <a:pt x="1858309" y="2383557"/>
+                    <a:pt x="1939764" y="2347882"/>
+                    <a:pt x="2019789" y="2309412"/>
+                  </a:cubicBezTo>
+                  <a:cubicBezTo>
+                    <a:pt x="2179839" y="2232567"/>
+                    <a:pt x="2334583" y="2144923"/>
+                    <a:pt x="2482486" y="2046962"/>
+                  </a:cubicBezTo>
+                  <a:cubicBezTo>
+                    <a:pt x="2519334" y="2022376"/>
+                    <a:pt x="2556081" y="1997403"/>
+                    <a:pt x="2591908" y="1971371"/>
+                  </a:cubicBezTo>
+                  <a:cubicBezTo>
+                    <a:pt x="2610077" y="1958644"/>
+                    <a:pt x="2627838" y="1945434"/>
+                    <a:pt x="2645702" y="1932321"/>
+                  </a:cubicBezTo>
+                  <a:cubicBezTo>
+                    <a:pt x="2663666" y="1919305"/>
+                    <a:pt x="2681325" y="1905903"/>
+                    <a:pt x="2698779" y="1892309"/>
+                  </a:cubicBezTo>
+                  <a:cubicBezTo>
+                    <a:pt x="2768903" y="1838025"/>
+                    <a:pt x="2837496" y="1781717"/>
+                    <a:pt x="2903537" y="1722516"/>
+                  </a:cubicBezTo>
+                  <a:cubicBezTo>
+                    <a:pt x="3035926" y="1604501"/>
+                    <a:pt x="3158720" y="1475784"/>
+                    <a:pt x="3269061" y="1337327"/>
+                  </a:cubicBezTo>
+                  <a:cubicBezTo>
+                    <a:pt x="3324182" y="1268099"/>
+                    <a:pt x="3376341" y="1196461"/>
+                    <a:pt x="3424928" y="1122508"/>
+                  </a:cubicBezTo>
+                  <a:cubicBezTo>
+                    <a:pt x="3472697" y="1048170"/>
+                    <a:pt x="3517814" y="972000"/>
+                    <a:pt x="3557622" y="893226"/>
+                  </a:cubicBezTo>
+                  <a:cubicBezTo>
+                    <a:pt x="3567931" y="873654"/>
+                    <a:pt x="3577526" y="853791"/>
+                    <a:pt x="3587019" y="833929"/>
+                  </a:cubicBezTo>
+                  <a:lnTo>
+                    <a:pt x="3601310" y="804040"/>
+                  </a:lnTo>
+                  <a:lnTo>
+                    <a:pt x="3614885" y="773861"/>
+                  </a:lnTo>
+                  <a:cubicBezTo>
+                    <a:pt x="3623766" y="753709"/>
+                    <a:pt x="3632748" y="733559"/>
+                    <a:pt x="3640812" y="713022"/>
+                  </a:cubicBezTo>
+                  <a:cubicBezTo>
+                    <a:pt x="3648876" y="692485"/>
+                    <a:pt x="3657756" y="672236"/>
+                    <a:pt x="3665105" y="651506"/>
+                  </a:cubicBezTo>
+                  <a:cubicBezTo>
+                    <a:pt x="3696544" y="569166"/>
+                    <a:pt x="3723185" y="485089"/>
+                    <a:pt x="3744110" y="399567"/>
+                  </a:cubicBezTo>
+                  <a:cubicBezTo>
+                    <a:pt x="3765341" y="314238"/>
+                    <a:pt x="3781392" y="227654"/>
+                    <a:pt x="3792123" y="140444"/>
+                  </a:cubicBezTo>
+                  <a:close/>
+                </a:path>
+              </a:pathLst>
+            </a:custGeom>
+            <a:gradFill>
+              <a:gsLst>
+                <a:gs pos="2000">
+                  <a:schemeClr val="bg1">
+                    <a:alpha val="10000"/>
+                  </a:schemeClr>
+                </a:gs>
+                <a:gs pos="16000">
+                  <a:schemeClr val="accent6">
+                    <a:alpha val="10000"/>
+                  </a:schemeClr>
+                </a:gs>
+                <a:gs pos="100000">
+                  <a:schemeClr val="bg1">
+                    <a:alpha val="10000"/>
+                  </a:schemeClr>
+                </a:gs>
+                <a:gs pos="85000">
+                  <a:schemeClr val="accent1">
+                    <a:alpha val="10000"/>
+                  </a:schemeClr>
+                </a:gs>
+              </a:gsLst>
+              <a:lin ang="12000000" scaled="0"/>
+            </a:gradFill>
+            <a:ln>
+              <a:noFill/>
+            </a:ln>
+          </p:spPr>
+          <p:style>
+            <a:lnRef idx="2">
+              <a:schemeClr val="accent1">
+                <a:shade val="50000"/>
+              </a:schemeClr>
+            </a:lnRef>
+            <a:fillRef idx="1">
+              <a:schemeClr val="accent1"/>
+            </a:fillRef>
+            <a:effectRef idx="0">
+              <a:schemeClr val="accent1"/>
+            </a:effectRef>
+            <a:fontRef idx="minor">
+              <a:schemeClr val="lt1"/>
+            </a:fontRef>
+          </p:style>
+          <p:txBody>
+            <a:bodyPr rtlCol="0" anchor="ctr"/>
+            <a:lstStyle/>
+            <a:p>
+              <a:pPr algn="ctr"/>
+              <a:endParaRPr lang="en-US"/>
+            </a:p>
+          </p:txBody>
+        </p:sp>
+      </p:grpSp>
+      <p:pic>
+        <p:nvPicPr>
+          <p:cNvPr id="7" name="Picture 6" descr="Graphical user interface, application&#10;&#10;Description automatically generated">
+            <a:extLst>
+              <a:ext uri="{FF2B5EF4-FFF2-40B4-BE49-F238E27FC236}">
+                <a16:creationId xmlns:a16="http://schemas.microsoft.com/office/drawing/2014/main" id="{0F6E3AAC-6251-43A9-ACCD-AF059BCD2C17}"/>
+              </a:ext>
+            </a:extLst>
+          </p:cNvPr>
+          <p:cNvPicPr>
+            <a:picLocks noChangeAspect="1"/>
+          </p:cNvPicPr>
+          <p:nvPr/>
+        </p:nvPicPr>
+        <p:blipFill rotWithShape="1">
+          <a:blip r:embed="rId2">
+            <a:extLst>
+              <a:ext uri="{28A0092B-C50C-407E-A947-70E740481C1C}">
+                <a14:useLocalDpi xmlns:a14="http://schemas.microsoft.com/office/drawing/2010/main" val="0"/>
+              </a:ext>
+            </a:extLst>
+          </a:blip>
+          <a:srcRect b="50000"/>
+          <a:stretch/>
+        </p:blipFill>
+        <p:spPr>
+          <a:xfrm>
+            <a:off x="2255024" y="979610"/>
+            <a:ext cx="7681646" cy="5787815"/>
+          </a:xfrm>
+          <a:prstGeom prst="rect">
+            <a:avLst/>
+          </a:prstGeom>
+        </p:spPr>
+      </p:pic>
+      <p:sp>
+        <p:nvSpPr>
+          <p:cNvPr id="9" name="Rectangle 8">
+            <a:extLst>
+              <a:ext uri="{FF2B5EF4-FFF2-40B4-BE49-F238E27FC236}">
+                <a16:creationId xmlns:a16="http://schemas.microsoft.com/office/drawing/2014/main" id="{330F2E22-0979-43FB-BFCF-717094721B71}"/>
+              </a:ext>
+            </a:extLst>
+          </p:cNvPr>
+          <p:cNvSpPr/>
+          <p:nvPr/>
+        </p:nvSpPr>
+        <p:spPr>
+          <a:xfrm>
+            <a:off x="4443952" y="181150"/>
+            <a:ext cx="3303790" cy="707886"/>
+          </a:xfrm>
+          <a:prstGeom prst="rect">
+            <a:avLst/>
+          </a:prstGeom>
+        </p:spPr>
+        <p:txBody>
+          <a:bodyPr wrap="none">
+            <a:spAutoFit/>
+          </a:bodyPr>
+          <a:lstStyle/>
+          <a:p>
+            <a:r>
+              <a:rPr lang="en-GB" sz="4000" dirty="0"/>
+              <a:t>Planner Screen</a:t>
+            </a:r>
+          </a:p>
+        </p:txBody>
+      </p:sp>
+    </p:spTree>
+    <p:extLst>
+      <p:ext uri="{BB962C8B-B14F-4D97-AF65-F5344CB8AC3E}">
+        <p14:creationId xmlns:p14="http://schemas.microsoft.com/office/powerpoint/2010/main" val="249924630"/>
+      </p:ext>
+    </p:extLst>
+  </p:cSld>
+  <p:clrMapOvr>
+    <a:masterClrMapping/>
+  </p:clrMapOvr>
+</p:sld>
+</file>
+
+<file path=ppt/slides/slide14.xml><?xml version="1.0" encoding="utf-8"?>
+<p:sld xmlns:a="http://schemas.openxmlformats.org/drawingml/2006/main" xmlns:r="http://schemas.openxmlformats.org/officeDocument/2006/relationships" xmlns:p="http://schemas.openxmlformats.org/presentationml/2006/main">
+  <p:cSld>
+    <p:bg>
+      <p:bgPr>
+        <a:solidFill>
+          <a:schemeClr val="bg1"/>
+        </a:solidFill>
+        <a:effectLst/>
+      </p:bgPr>
+    </p:bg>
+    <p:spTree>
+      <p:nvGrpSpPr>
+        <p:cNvPr id="1" name=""/>
+        <p:cNvGrpSpPr/>
+        <p:nvPr/>
+      </p:nvGrpSpPr>
+      <p:grpSpPr>
+        <a:xfrm>
+          <a:off x="0" y="0"/>
+          <a:ext cx="0" cy="0"/>
+          <a:chOff x="0" y="0"/>
+          <a:chExt cx="0" cy="0"/>
+        </a:xfrm>
+      </p:grpSpPr>
+      <p:sp useBgFill="1">
+        <p:nvSpPr>
+          <p:cNvPr id="24" name="Rectangle 7">
+            <a:extLst>
+              <a:ext uri="{FF2B5EF4-FFF2-40B4-BE49-F238E27FC236}">
+                <a16:creationId xmlns:a16="http://schemas.microsoft.com/office/drawing/2014/main" id="{CD758A0E-EDF3-4C8A-9AAF-B84F8014E095}"/>
+              </a:ext>
+              <a:ext uri="{C183D7F6-B498-43B3-948B-1728B52AA6E4}">
+                <adec:decorative xmlns:adec="http://schemas.microsoft.com/office/drawing/2017/decorative" val="1"/>
+              </a:ext>
+            </a:extLst>
+          </p:cNvPr>
+          <p:cNvSpPr>
+            <a:spLocks noGrp="1" noRot="1" noChangeAspect="1" noMove="1" noResize="1" noEditPoints="1" noAdjustHandles="1" noChangeArrowheads="1" noChangeShapeType="1" noTextEdit="1"/>
+          </p:cNvSpPr>
+          <p:nvPr>
+            <p:extLst>
+              <p:ext uri="{386F3935-93C4-4BCD-93E2-E3B085C9AB24}">
+                <p16:designElem xmlns:p16="http://schemas.microsoft.com/office/powerpoint/2015/main" val="1"/>
+              </p:ext>
+            </p:extLst>
+          </p:nvPr>
+        </p:nvSpPr>
+        <p:spPr>
+          <a:xfrm>
+            <a:off x="0" y="1"/>
+            <a:ext cx="12191695" cy="6858000"/>
+          </a:xfrm>
+          <a:prstGeom prst="rect">
+            <a:avLst/>
+          </a:prstGeom>
+          <a:ln>
+            <a:noFill/>
+          </a:ln>
+        </p:spPr>
+        <p:style>
+          <a:lnRef idx="2">
+            <a:schemeClr val="accent1">
+              <a:shade val="50000"/>
+            </a:schemeClr>
+          </a:lnRef>
+          <a:fillRef idx="1">
+            <a:schemeClr val="accent1"/>
+          </a:fillRef>
+          <a:effectRef idx="0">
+            <a:schemeClr val="accent1"/>
+          </a:effectRef>
+          <a:fontRef idx="minor">
+            <a:schemeClr val="lt1"/>
+          </a:fontRef>
+        </p:style>
+        <p:txBody>
+          <a:bodyPr rtlCol="0" anchor="ctr"/>
+          <a:lstStyle/>
+          <a:p>
+            <a:pPr algn="ctr"/>
+            <a:endParaRPr lang="en-US"/>
+          </a:p>
+        </p:txBody>
+      </p:sp>
+      <p:sp>
+        <p:nvSpPr>
+          <p:cNvPr id="25" name="Rectangle 9">
+            <a:extLst>
+              <a:ext uri="{FF2B5EF4-FFF2-40B4-BE49-F238E27FC236}">
+                <a16:creationId xmlns:a16="http://schemas.microsoft.com/office/drawing/2014/main" id="{32FE9855-A391-40A9-A6FA-BAC94FB5431F}"/>
+              </a:ext>
+              <a:ext uri="{C183D7F6-B498-43B3-948B-1728B52AA6E4}">
+                <adec:decorative xmlns:adec="http://schemas.microsoft.com/office/drawing/2017/decorative" val="1"/>
+              </a:ext>
+            </a:extLst>
+          </p:cNvPr>
+          <p:cNvSpPr>
+            <a:spLocks noGrp="1" noRot="1" noChangeAspect="1" noMove="1" noResize="1" noEditPoints="1" noAdjustHandles="1" noChangeArrowheads="1" noChangeShapeType="1" noTextEdit="1"/>
+          </p:cNvSpPr>
+          <p:nvPr>
+            <p:extLst>
+              <p:ext uri="{386F3935-93C4-4BCD-93E2-E3B085C9AB24}">
+                <p16:designElem xmlns:p16="http://schemas.microsoft.com/office/powerpoint/2015/main" val="1"/>
+              </p:ext>
+            </p:extLst>
+          </p:nvPr>
+        </p:nvSpPr>
+        <p:spPr>
+          <a:xfrm>
+            <a:off x="305" y="0"/>
+            <a:ext cx="12191695" cy="6858000"/>
+          </a:xfrm>
+          <a:prstGeom prst="rect">
+            <a:avLst/>
+          </a:prstGeom>
+          <a:solidFill>
+            <a:schemeClr val="bg1"/>
+          </a:solidFill>
+          <a:ln>
+            <a:noFill/>
+          </a:ln>
+        </p:spPr>
+        <p:style>
+          <a:lnRef idx="2">
+            <a:schemeClr val="accent1">
+              <a:shade val="50000"/>
+            </a:schemeClr>
+          </a:lnRef>
+          <a:fillRef idx="1">
+            <a:schemeClr val="accent1"/>
+          </a:fillRef>
+          <a:effectRef idx="0">
+            <a:schemeClr val="accent1"/>
+          </a:effectRef>
+          <a:fontRef idx="minor">
+            <a:schemeClr val="lt1"/>
+          </a:fontRef>
+        </p:style>
+        <p:txBody>
+          <a:bodyPr rtlCol="0" anchor="ctr"/>
+          <a:lstStyle/>
+          <a:p>
+            <a:pPr algn="ctr"/>
+            <a:endParaRPr lang="en-US" sz="800"/>
+          </a:p>
+        </p:txBody>
+      </p:sp>
+      <p:grpSp>
+        <p:nvGrpSpPr>
+          <p:cNvPr id="26" name="Group 11">
+            <a:extLst>
+              <a:ext uri="{FF2B5EF4-FFF2-40B4-BE49-F238E27FC236}">
+                <a16:creationId xmlns:a16="http://schemas.microsoft.com/office/drawing/2014/main" id="{13621FAC-5123-4838-A7BE-271A4095B234}"/>
+              </a:ext>
+              <a:ext uri="{C183D7F6-B498-43B3-948B-1728B52AA6E4}">
+                <adec:decorative xmlns:adec="http://schemas.microsoft.com/office/drawing/2017/decorative" val="1"/>
+              </a:ext>
+            </a:extLst>
+          </p:cNvPr>
+          <p:cNvGrpSpPr>
+            <a:grpSpLocks noGrp="1" noUngrp="1" noRot="1" noChangeAspect="1" noMove="1" noResize="1"/>
+          </p:cNvGrpSpPr>
+          <p:nvPr>
+            <p:extLst>
+              <p:ext uri="{386F3935-93C4-4BCD-93E2-E3B085C9AB24}">
+                <p16:designElem xmlns:p16="http://schemas.microsoft.com/office/powerpoint/2015/main" val="1"/>
+              </p:ext>
+            </p:extLst>
+          </p:nvPr>
+        </p:nvGrpSpPr>
+        <p:grpSpPr>
+          <a:xfrm rot="10800000">
+            <a:off x="8535970" y="4114799"/>
+            <a:ext cx="3655725" cy="2743201"/>
+            <a:chOff x="-305" y="-1"/>
+            <a:chExt cx="3832880" cy="2876136"/>
+          </a:xfrm>
+        </p:grpSpPr>
+        <p:sp>
+          <p:nvSpPr>
+            <p:cNvPr id="27" name="Freeform: Shape 12">
+              <a:extLst>
+                <a:ext uri="{FF2B5EF4-FFF2-40B4-BE49-F238E27FC236}">
+                  <a16:creationId xmlns:a16="http://schemas.microsoft.com/office/drawing/2014/main" id="{9084F7DB-2C1C-470A-A963-600DAEF0A462}"/>
+                </a:ext>
+                <a:ext uri="{C183D7F6-B498-43B3-948B-1728B52AA6E4}">
+                  <adec:decorative xmlns:adec="http://schemas.microsoft.com/office/drawing/2017/decorative" val="1"/>
+                </a:ext>
+              </a:extLst>
+            </p:cNvPr>
+            <p:cNvSpPr/>
+            <p:nvPr>
+              <p:extLst>
+                <p:ext uri="{386F3935-93C4-4BCD-93E2-E3B085C9AB24}">
+                  <p16:designElem xmlns:p16="http://schemas.microsoft.com/office/powerpoint/2015/main" val="1"/>
+                </p:ext>
+              </p:extLst>
+            </p:nvPr>
+          </p:nvSpPr>
+          <p:spPr>
+            <a:xfrm>
+              <a:off x="305" y="1"/>
+              <a:ext cx="3815424" cy="2653659"/>
+            </a:xfrm>
+            <a:custGeom>
+              <a:avLst/>
+              <a:gdLst>
+                <a:gd name="connsiteX0" fmla="*/ 3203055 w 3815424"/>
+                <a:gd name="connsiteY0" fmla="*/ 0 h 2653659"/>
+                <a:gd name="connsiteX1" fmla="*/ 3815424 w 3815424"/>
+                <a:gd name="connsiteY1" fmla="*/ 0 h 2653659"/>
+                <a:gd name="connsiteX2" fmla="*/ 3801025 w 3815424"/>
+                <a:gd name="connsiteY2" fmla="*/ 214243 h 2653659"/>
+                <a:gd name="connsiteX3" fmla="*/ 587142 w 3815424"/>
+                <a:gd name="connsiteY3" fmla="*/ 2653659 h 2653659"/>
+                <a:gd name="connsiteX4" fmla="*/ 53389 w 3815424"/>
+                <a:gd name="connsiteY4" fmla="*/ 2605041 h 2653659"/>
+                <a:gd name="connsiteX5" fmla="*/ 0 w 3815424"/>
+                <a:gd name="connsiteY5" fmla="*/ 2593136 h 2653659"/>
+                <a:gd name="connsiteX6" fmla="*/ 0 w 3815424"/>
+                <a:gd name="connsiteY6" fmla="*/ 1994836 h 2653659"/>
+                <a:gd name="connsiteX7" fmla="*/ 159710 w 3815424"/>
+                <a:gd name="connsiteY7" fmla="*/ 2035054 h 2653659"/>
+                <a:gd name="connsiteX8" fmla="*/ 587142 w 3815424"/>
+                <a:gd name="connsiteY8" fmla="*/ 2075152 h 2653659"/>
+                <a:gd name="connsiteX9" fmla="*/ 1549283 w 3815424"/>
+                <a:gd name="connsiteY9" fmla="*/ 1900153 h 2653659"/>
+                <a:gd name="connsiteX10" fmla="*/ 2406698 w 3815424"/>
+                <a:gd name="connsiteY10" fmla="*/ 1418450 h 2653659"/>
+                <a:gd name="connsiteX11" fmla="*/ 2996069 w 3815424"/>
+                <a:gd name="connsiteY11" fmla="*/ 728678 h 2653659"/>
+                <a:gd name="connsiteX12" fmla="*/ 3193967 w 3815424"/>
+                <a:gd name="connsiteY12" fmla="*/ 137719 h 2653659"/>
+              </a:gdLst>
+              <a:ahLst/>
+              <a:cxnLst>
+                <a:cxn ang="0">
+                  <a:pos x="connsiteX0" y="connsiteY0"/>
+                </a:cxn>
+                <a:cxn ang="0">
+                  <a:pos x="connsiteX1" y="connsiteY1"/>
+                </a:cxn>
+                <a:cxn ang="0">
+                  <a:pos x="connsiteX2" y="connsiteY2"/>
+                </a:cxn>
+                <a:cxn ang="0">
+                  <a:pos x="connsiteX3" y="connsiteY3"/>
+                </a:cxn>
+                <a:cxn ang="0">
+                  <a:pos x="connsiteX4" y="connsiteY4"/>
+                </a:cxn>
+                <a:cxn ang="0">
+                  <a:pos x="connsiteX5" y="connsiteY5"/>
+                </a:cxn>
+                <a:cxn ang="0">
+                  <a:pos x="connsiteX6" y="connsiteY6"/>
+                </a:cxn>
+                <a:cxn ang="0">
+                  <a:pos x="connsiteX7" y="connsiteY7"/>
+                </a:cxn>
+                <a:cxn ang="0">
+                  <a:pos x="connsiteX8" y="connsiteY8"/>
+                </a:cxn>
+                <a:cxn ang="0">
+                  <a:pos x="connsiteX9" y="connsiteY9"/>
+                </a:cxn>
+                <a:cxn ang="0">
+                  <a:pos x="connsiteX10" y="connsiteY10"/>
+                </a:cxn>
+                <a:cxn ang="0">
+                  <a:pos x="connsiteX11" y="connsiteY11"/>
+                </a:cxn>
+                <a:cxn ang="0">
+                  <a:pos x="connsiteX12" y="connsiteY12"/>
+                </a:cxn>
+              </a:cxnLst>
+              <a:rect l="l" t="t" r="r" b="b"/>
+              <a:pathLst>
+                <a:path w="3815424" h="2653659">
+                  <a:moveTo>
+                    <a:pt x="3203055" y="0"/>
+                  </a:moveTo>
+                  <a:lnTo>
+                    <a:pt x="3815424" y="0"/>
+                  </a:lnTo>
+                  <a:lnTo>
+                    <a:pt x="3801025" y="214243"/>
+                  </a:lnTo>
+                  <a:cubicBezTo>
+                    <a:pt x="3616317" y="1584467"/>
+                    <a:pt x="2091637" y="2653659"/>
+                    <a:pt x="587142" y="2653659"/>
+                  </a:cubicBezTo>
+                  <a:cubicBezTo>
+                    <a:pt x="400192" y="2653659"/>
+                    <a:pt x="222112" y="2636953"/>
+                    <a:pt x="53389" y="2605041"/>
+                  </a:cubicBezTo>
+                  <a:lnTo>
+                    <a:pt x="0" y="2593136"/>
+                  </a:lnTo>
+                  <a:lnTo>
+                    <a:pt x="0" y="1994836"/>
+                  </a:lnTo>
+                  <a:lnTo>
+                    <a:pt x="159710" y="2035054"/>
+                  </a:lnTo>
+                  <a:cubicBezTo>
+                    <a:pt x="295467" y="2061726"/>
+                    <a:pt x="438268" y="2075152"/>
+                    <a:pt x="587142" y="2075152"/>
+                  </a:cubicBezTo>
+                  <a:cubicBezTo>
+                    <a:pt x="901731" y="2075152"/>
+                    <a:pt x="1234490" y="2014697"/>
+                    <a:pt x="1549283" y="1900153"/>
+                  </a:cubicBezTo>
+                  <a:cubicBezTo>
+                    <a:pt x="1860709" y="1786959"/>
+                    <a:pt x="2157231" y="1620350"/>
+                    <a:pt x="2406698" y="1418450"/>
+                  </a:cubicBezTo>
+                  <a:cubicBezTo>
+                    <a:pt x="2655859" y="1216840"/>
+                    <a:pt x="2859596" y="978302"/>
+                    <a:pt x="2996069" y="728678"/>
+                  </a:cubicBezTo>
+                  <a:cubicBezTo>
+                    <a:pt x="3101178" y="536396"/>
+                    <a:pt x="3167417" y="338366"/>
+                    <a:pt x="3193967" y="137719"/>
+                  </a:cubicBezTo>
+                  <a:close/>
+                </a:path>
+              </a:pathLst>
+            </a:custGeom>
+            <a:gradFill>
+              <a:gsLst>
+                <a:gs pos="2000">
+                  <a:schemeClr val="bg1">
+                    <a:alpha val="10000"/>
+                  </a:schemeClr>
+                </a:gs>
+                <a:gs pos="16000">
+                  <a:schemeClr val="accent6">
+                    <a:alpha val="10000"/>
+                  </a:schemeClr>
+                </a:gs>
+                <a:gs pos="100000">
+                  <a:schemeClr val="bg1">
+                    <a:alpha val="10000"/>
+                  </a:schemeClr>
+                </a:gs>
+                <a:gs pos="85000">
+                  <a:schemeClr val="accent1">
+                    <a:alpha val="10000"/>
+                  </a:schemeClr>
+                </a:gs>
+              </a:gsLst>
+              <a:lin ang="12000000" scaled="0"/>
+            </a:gradFill>
+            <a:ln>
+              <a:noFill/>
+            </a:ln>
+          </p:spPr>
+          <p:style>
+            <a:lnRef idx="2">
+              <a:schemeClr val="accent1">
+                <a:shade val="50000"/>
+              </a:schemeClr>
+            </a:lnRef>
+            <a:fillRef idx="1">
+              <a:schemeClr val="accent1"/>
+            </a:fillRef>
+            <a:effectRef idx="0">
+              <a:schemeClr val="accent1"/>
+            </a:effectRef>
+            <a:fontRef idx="minor">
+              <a:schemeClr val="lt1"/>
+            </a:fontRef>
+          </p:style>
+          <p:txBody>
+            <a:bodyPr rtlCol="0" anchor="ctr"/>
+            <a:lstStyle/>
+            <a:p>
+              <a:pPr algn="ctr"/>
+              <a:endParaRPr lang="en-US"/>
+            </a:p>
+          </p:txBody>
+        </p:sp>
+        <p:sp>
+          <p:nvSpPr>
+            <p:cNvPr id="28" name="Freeform: Shape 13">
+              <a:extLst>
+                <a:ext uri="{FF2B5EF4-FFF2-40B4-BE49-F238E27FC236}">
+                  <a16:creationId xmlns:a16="http://schemas.microsoft.com/office/drawing/2014/main" id="{21B6B121-76D5-4D26-92B4-697EBDEE300A}"/>
+                </a:ext>
+                <a:ext uri="{C183D7F6-B498-43B3-948B-1728B52AA6E4}">
+                  <adec:decorative xmlns:adec="http://schemas.microsoft.com/office/drawing/2017/decorative" val="1"/>
+                </a:ext>
+              </a:extLst>
+            </p:cNvPr>
+            <p:cNvSpPr/>
+            <p:nvPr>
+              <p:extLst>
+                <p:ext uri="{386F3935-93C4-4BCD-93E2-E3B085C9AB24}">
+                  <p16:designElem xmlns:p16="http://schemas.microsoft.com/office/powerpoint/2015/main" val="1"/>
+                </p:ext>
+              </p:extLst>
+            </p:nvPr>
+          </p:nvSpPr>
+          <p:spPr>
+            <a:xfrm>
+              <a:off x="305" y="-1"/>
+              <a:ext cx="3815424" cy="2653660"/>
+            </a:xfrm>
+            <a:custGeom>
+              <a:avLst/>
+              <a:gdLst>
+                <a:gd name="connsiteX0" fmla="*/ 3305038 w 3815424"/>
+                <a:gd name="connsiteY0" fmla="*/ 0 h 2653660"/>
+                <a:gd name="connsiteX1" fmla="*/ 3815424 w 3815424"/>
+                <a:gd name="connsiteY1" fmla="*/ 0 h 2653660"/>
+                <a:gd name="connsiteX2" fmla="*/ 3801025 w 3815424"/>
+                <a:gd name="connsiteY2" fmla="*/ 214244 h 2653660"/>
+                <a:gd name="connsiteX3" fmla="*/ 587142 w 3815424"/>
+                <a:gd name="connsiteY3" fmla="*/ 2653660 h 2653660"/>
+                <a:gd name="connsiteX4" fmla="*/ 53389 w 3815424"/>
+                <a:gd name="connsiteY4" fmla="*/ 2605042 h 2653660"/>
+                <a:gd name="connsiteX5" fmla="*/ 0 w 3815424"/>
+                <a:gd name="connsiteY5" fmla="*/ 2593137 h 2653660"/>
+                <a:gd name="connsiteX6" fmla="*/ 0 w 3815424"/>
+                <a:gd name="connsiteY6" fmla="*/ 2094444 h 2653660"/>
+                <a:gd name="connsiteX7" fmla="*/ 137675 w 3815424"/>
+                <a:gd name="connsiteY7" fmla="*/ 2129195 h 2653660"/>
+                <a:gd name="connsiteX8" fmla="*/ 587142 w 3815424"/>
+                <a:gd name="connsiteY8" fmla="*/ 2171571 h 2653660"/>
+                <a:gd name="connsiteX9" fmla="*/ 1585826 w 3815424"/>
+                <a:gd name="connsiteY9" fmla="*/ 1990112 h 2653660"/>
+                <a:gd name="connsiteX10" fmla="*/ 2473046 w 3815424"/>
+                <a:gd name="connsiteY10" fmla="*/ 1491633 h 2653660"/>
+                <a:gd name="connsiteX11" fmla="*/ 3086710 w 3815424"/>
+                <a:gd name="connsiteY11" fmla="*/ 772838 h 2653660"/>
+                <a:gd name="connsiteX12" fmla="*/ 3295217 w 3815424"/>
+                <a:gd name="connsiteY12" fmla="*/ 149229 h 2653660"/>
+              </a:gdLst>
+              <a:ahLst/>
+              <a:cxnLst>
+                <a:cxn ang="0">
+                  <a:pos x="connsiteX0" y="connsiteY0"/>
+                </a:cxn>
+                <a:cxn ang="0">
+                  <a:pos x="connsiteX1" y="connsiteY1"/>
+                </a:cxn>
+                <a:cxn ang="0">
+                  <a:pos x="connsiteX2" y="connsiteY2"/>
+                </a:cxn>
+                <a:cxn ang="0">
+                  <a:pos x="connsiteX3" y="connsiteY3"/>
+                </a:cxn>
+                <a:cxn ang="0">
+                  <a:pos x="connsiteX4" y="connsiteY4"/>
+                </a:cxn>
+                <a:cxn ang="0">
+                  <a:pos x="connsiteX5" y="connsiteY5"/>
+                </a:cxn>
+                <a:cxn ang="0">
+                  <a:pos x="connsiteX6" y="connsiteY6"/>
+                </a:cxn>
+                <a:cxn ang="0">
+                  <a:pos x="connsiteX7" y="connsiteY7"/>
+                </a:cxn>
+                <a:cxn ang="0">
+                  <a:pos x="connsiteX8" y="connsiteY8"/>
+                </a:cxn>
+                <a:cxn ang="0">
+                  <a:pos x="connsiteX9" y="connsiteY9"/>
+                </a:cxn>
+                <a:cxn ang="0">
+                  <a:pos x="connsiteX10" y="connsiteY10"/>
+                </a:cxn>
+                <a:cxn ang="0">
+                  <a:pos x="connsiteX11" y="connsiteY11"/>
+                </a:cxn>
+                <a:cxn ang="0">
+                  <a:pos x="connsiteX12" y="connsiteY12"/>
+                </a:cxn>
+              </a:cxnLst>
+              <a:rect l="l" t="t" r="r" b="b"/>
+              <a:pathLst>
+                <a:path w="3815424" h="2653660">
+                  <a:moveTo>
+                    <a:pt x="3305038" y="0"/>
+                  </a:moveTo>
+                  <a:lnTo>
+                    <a:pt x="3815424" y="0"/>
+                  </a:lnTo>
+                  <a:lnTo>
+                    <a:pt x="3801025" y="214244"/>
+                  </a:lnTo>
+                  <a:cubicBezTo>
+                    <a:pt x="3616317" y="1584467"/>
+                    <a:pt x="2091637" y="2653660"/>
+                    <a:pt x="587142" y="2653660"/>
+                  </a:cubicBezTo>
+                  <a:cubicBezTo>
+                    <a:pt x="400192" y="2653660"/>
+                    <a:pt x="222112" y="2636954"/>
+                    <a:pt x="53389" y="2605042"/>
+                  </a:cubicBezTo>
+                  <a:lnTo>
+                    <a:pt x="0" y="2593137"/>
+                  </a:lnTo>
+                  <a:lnTo>
+                    <a:pt x="0" y="2094444"/>
+                  </a:lnTo>
+                  <a:lnTo>
+                    <a:pt x="137675" y="2129195"/>
+                  </a:lnTo>
+                  <a:cubicBezTo>
+                    <a:pt x="280616" y="2157374"/>
+                    <a:pt x="430766" y="2171571"/>
+                    <a:pt x="587142" y="2171571"/>
+                  </a:cubicBezTo>
+                  <a:cubicBezTo>
+                    <a:pt x="918879" y="2171571"/>
+                    <a:pt x="1254904" y="2110634"/>
+                    <a:pt x="1585826" y="1990112"/>
+                  </a:cubicBezTo>
+                  <a:cubicBezTo>
+                    <a:pt x="1908071" y="1873061"/>
+                    <a:pt x="2214800" y="1700666"/>
+                    <a:pt x="2473046" y="1491633"/>
+                  </a:cubicBezTo>
+                  <a:cubicBezTo>
+                    <a:pt x="2735782" y="1279031"/>
+                    <a:pt x="2942276" y="1037118"/>
+                    <a:pt x="3086710" y="772838"/>
+                  </a:cubicBezTo>
+                  <a:cubicBezTo>
+                    <a:pt x="3197408" y="570216"/>
+                    <a:pt x="3267226" y="361248"/>
+                    <a:pt x="3295217" y="149229"/>
+                  </a:cubicBezTo>
+                  <a:close/>
+                </a:path>
+              </a:pathLst>
+            </a:custGeom>
+            <a:gradFill>
+              <a:gsLst>
+                <a:gs pos="2000">
+                  <a:schemeClr val="bg1">
+                    <a:alpha val="10000"/>
+                  </a:schemeClr>
+                </a:gs>
+                <a:gs pos="16000">
+                  <a:schemeClr val="accent6">
+                    <a:alpha val="10000"/>
+                  </a:schemeClr>
+                </a:gs>
+                <a:gs pos="100000">
+                  <a:schemeClr val="bg1">
+                    <a:alpha val="10000"/>
+                  </a:schemeClr>
+                </a:gs>
+                <a:gs pos="85000">
+                  <a:schemeClr val="accent1">
+                    <a:alpha val="10000"/>
+                  </a:schemeClr>
+                </a:gs>
+              </a:gsLst>
+              <a:lin ang="12000000" scaled="0"/>
+            </a:gradFill>
+            <a:ln>
+              <a:noFill/>
+            </a:ln>
+          </p:spPr>
+          <p:style>
+            <a:lnRef idx="2">
+              <a:schemeClr val="accent1">
+                <a:shade val="50000"/>
+              </a:schemeClr>
+            </a:lnRef>
+            <a:fillRef idx="1">
+              <a:schemeClr val="accent1"/>
+            </a:fillRef>
+            <a:effectRef idx="0">
+              <a:schemeClr val="accent1"/>
+            </a:effectRef>
+            <a:fontRef idx="minor">
+              <a:schemeClr val="lt1"/>
+            </a:fontRef>
+          </p:style>
+          <p:txBody>
+            <a:bodyPr rtlCol="0" anchor="ctr"/>
+            <a:lstStyle/>
+            <a:p>
+              <a:pPr algn="ctr"/>
+              <a:endParaRPr lang="en-US"/>
+            </a:p>
+          </p:txBody>
+        </p:sp>
+        <p:sp>
+          <p:nvSpPr>
+            <p:cNvPr id="29" name="Freeform: Shape 14">
+              <a:extLst>
+                <a:ext uri="{FF2B5EF4-FFF2-40B4-BE49-F238E27FC236}">
+                  <a16:creationId xmlns:a16="http://schemas.microsoft.com/office/drawing/2014/main" id="{394B9A53-60A5-4916-BC15-DB03763D9382}"/>
+                </a:ext>
+                <a:ext uri="{C183D7F6-B498-43B3-948B-1728B52AA6E4}">
+                  <adec:decorative xmlns:adec="http://schemas.microsoft.com/office/drawing/2017/decorative" val="1"/>
+                </a:ext>
+              </a:extLst>
+            </p:cNvPr>
+            <p:cNvSpPr/>
+            <p:nvPr>
+              <p:extLst>
+                <p:ext uri="{386F3935-93C4-4BCD-93E2-E3B085C9AB24}">
+                  <p16:designElem xmlns:p16="http://schemas.microsoft.com/office/powerpoint/2015/main" val="1"/>
+                </p:ext>
+              </p:extLst>
+            </p:nvPr>
+          </p:nvSpPr>
+          <p:spPr>
+            <a:xfrm>
+              <a:off x="-305" y="1"/>
+              <a:ext cx="3815986" cy="2675935"/>
+            </a:xfrm>
+            <a:custGeom>
+              <a:avLst/>
+              <a:gdLst>
+                <a:gd name="connsiteX0" fmla="*/ 3648768 w 3815986"/>
+                <a:gd name="connsiteY0" fmla="*/ 0 h 2675935"/>
+                <a:gd name="connsiteX1" fmla="*/ 3815986 w 3815986"/>
+                <a:gd name="connsiteY1" fmla="*/ 0 h 2675935"/>
+                <a:gd name="connsiteX2" fmla="*/ 3804695 w 3815986"/>
+                <a:gd name="connsiteY2" fmla="*/ 200084 h 2675935"/>
+                <a:gd name="connsiteX3" fmla="*/ 3762590 w 3815986"/>
+                <a:gd name="connsiteY3" fmla="*/ 455543 h 2675935"/>
+                <a:gd name="connsiteX4" fmla="*/ 3592332 w 3815986"/>
+                <a:gd name="connsiteY4" fmla="*/ 947274 h 2675935"/>
+                <a:gd name="connsiteX5" fmla="*/ 2953967 w 3815986"/>
+                <a:gd name="connsiteY5" fmla="*/ 1782349 h 2675935"/>
+                <a:gd name="connsiteX6" fmla="*/ 2530669 w 3815986"/>
+                <a:gd name="connsiteY6" fmla="*/ 2109494 h 2675935"/>
+                <a:gd name="connsiteX7" fmla="*/ 2057561 w 3815986"/>
+                <a:gd name="connsiteY7" fmla="*/ 2369245 h 2675935"/>
+                <a:gd name="connsiteX8" fmla="*/ 1007330 w 3815986"/>
+                <a:gd name="connsiteY8" fmla="*/ 2655701 h 2675935"/>
+                <a:gd name="connsiteX9" fmla="*/ 732765 w 3815986"/>
+                <a:gd name="connsiteY9" fmla="*/ 2674696 h 2675935"/>
+                <a:gd name="connsiteX10" fmla="*/ 457666 w 3815986"/>
+                <a:gd name="connsiteY10" fmla="*/ 2670839 h 2675935"/>
+                <a:gd name="connsiteX11" fmla="*/ 183574 w 3815986"/>
+                <a:gd name="connsiteY11" fmla="*/ 2643312 h 2675935"/>
+                <a:gd name="connsiteX12" fmla="*/ 0 w 3815986"/>
+                <a:gd name="connsiteY12" fmla="*/ 2607798 h 2675935"/>
+                <a:gd name="connsiteX13" fmla="*/ 0 w 3815986"/>
+                <a:gd name="connsiteY13" fmla="*/ 2356652 h 2675935"/>
+                <a:gd name="connsiteX14" fmla="*/ 222195 w 3815986"/>
+                <a:gd name="connsiteY14" fmla="*/ 2396940 h 2675935"/>
+                <a:gd name="connsiteX15" fmla="*/ 472364 w 3815986"/>
+                <a:gd name="connsiteY15" fmla="*/ 2419092 h 2675935"/>
+                <a:gd name="connsiteX16" fmla="*/ 974972 w 3815986"/>
+                <a:gd name="connsiteY16" fmla="*/ 2402122 h 2675935"/>
+                <a:gd name="connsiteX17" fmla="*/ 1468292 w 3815986"/>
+                <a:gd name="connsiteY17" fmla="*/ 2304162 h 2675935"/>
+                <a:gd name="connsiteX18" fmla="*/ 1940176 w 3815986"/>
+                <a:gd name="connsiteY18" fmla="*/ 2133695 h 2675935"/>
+                <a:gd name="connsiteX19" fmla="*/ 2783403 w 3815986"/>
+                <a:gd name="connsiteY19" fmla="*/ 1609954 h 2675935"/>
+                <a:gd name="connsiteX20" fmla="*/ 3128104 w 3815986"/>
+                <a:gd name="connsiteY20" fmla="*/ 1260439 h 2675935"/>
+                <a:gd name="connsiteX21" fmla="*/ 3400639 w 3815986"/>
+                <a:gd name="connsiteY21" fmla="*/ 859052 h 2675935"/>
+                <a:gd name="connsiteX22" fmla="*/ 3585595 w 3815986"/>
+                <a:gd name="connsiteY22" fmla="*/ 415336 h 2675935"/>
+                <a:gd name="connsiteX23" fmla="*/ 3635918 w 3815986"/>
+                <a:gd name="connsiteY23" fmla="*/ 181137 h 2675935"/>
+              </a:gdLst>
+              <a:ahLst/>
+              <a:cxnLst>
+                <a:cxn ang="0">
+                  <a:pos x="connsiteX0" y="connsiteY0"/>
+                </a:cxn>
+                <a:cxn ang="0">
+                  <a:pos x="connsiteX1" y="connsiteY1"/>
+                </a:cxn>
+                <a:cxn ang="0">
+                  <a:pos x="connsiteX2" y="connsiteY2"/>
+                </a:cxn>
+                <a:cxn ang="0">
+                  <a:pos x="connsiteX3" y="connsiteY3"/>
+                </a:cxn>
+                <a:cxn ang="0">
+                  <a:pos x="connsiteX4" y="connsiteY4"/>
+                </a:cxn>
+                <a:cxn ang="0">
+                  <a:pos x="connsiteX5" y="connsiteY5"/>
+                </a:cxn>
+                <a:cxn ang="0">
+                  <a:pos x="connsiteX6" y="connsiteY6"/>
+                </a:cxn>
+                <a:cxn ang="0">
+                  <a:pos x="connsiteX7" y="connsiteY7"/>
+                </a:cxn>
+                <a:cxn ang="0">
+                  <a:pos x="connsiteX8" y="connsiteY8"/>
+                </a:cxn>
+                <a:cxn ang="0">
+                  <a:pos x="connsiteX9" y="connsiteY9"/>
+                </a:cxn>
+                <a:cxn ang="0">
+                  <a:pos x="connsiteX10" y="connsiteY10"/>
+                </a:cxn>
+                <a:cxn ang="0">
+                  <a:pos x="connsiteX11" y="connsiteY11"/>
+                </a:cxn>
+                <a:cxn ang="0">
+                  <a:pos x="connsiteX12" y="connsiteY12"/>
+                </a:cxn>
+                <a:cxn ang="0">
+                  <a:pos x="connsiteX13" y="connsiteY13"/>
+                </a:cxn>
+                <a:cxn ang="0">
+                  <a:pos x="connsiteX14" y="connsiteY14"/>
+                </a:cxn>
+                <a:cxn ang="0">
+                  <a:pos x="connsiteX15" y="connsiteY15"/>
+                </a:cxn>
+                <a:cxn ang="0">
+                  <a:pos x="connsiteX16" y="connsiteY16"/>
+                </a:cxn>
+                <a:cxn ang="0">
+                  <a:pos x="connsiteX17" y="connsiteY17"/>
+                </a:cxn>
+                <a:cxn ang="0">
+                  <a:pos x="connsiteX18" y="connsiteY18"/>
+                </a:cxn>
+                <a:cxn ang="0">
+                  <a:pos x="connsiteX19" y="connsiteY19"/>
+                </a:cxn>
+                <a:cxn ang="0">
+                  <a:pos x="connsiteX20" y="connsiteY20"/>
+                </a:cxn>
+                <a:cxn ang="0">
+                  <a:pos x="connsiteX21" y="connsiteY21"/>
+                </a:cxn>
+                <a:cxn ang="0">
+                  <a:pos x="connsiteX22" y="connsiteY22"/>
+                </a:cxn>
+                <a:cxn ang="0">
+                  <a:pos x="connsiteX23" y="connsiteY23"/>
+                </a:cxn>
+              </a:cxnLst>
+              <a:rect l="l" t="t" r="r" b="b"/>
+              <a:pathLst>
+                <a:path w="3815986" h="2675935">
+                  <a:moveTo>
+                    <a:pt x="3648768" y="0"/>
+                  </a:moveTo>
+                  <a:lnTo>
+                    <a:pt x="3815986" y="0"/>
+                  </a:lnTo>
+                  <a:lnTo>
+                    <a:pt x="3804695" y="200084"/>
+                  </a:lnTo>
+                  <a:cubicBezTo>
+                    <a:pt x="3795228" y="285751"/>
+                    <a:pt x="3781167" y="371032"/>
+                    <a:pt x="3762590" y="455543"/>
+                  </a:cubicBezTo>
+                  <a:cubicBezTo>
+                    <a:pt x="3725537" y="624467"/>
+                    <a:pt x="3668784" y="790112"/>
+                    <a:pt x="3592332" y="947274"/>
+                  </a:cubicBezTo>
+                  <a:cubicBezTo>
+                    <a:pt x="3438712" y="1261596"/>
+                    <a:pt x="3216091" y="1542847"/>
+                    <a:pt x="2953967" y="1782349"/>
+                  </a:cubicBezTo>
+                  <a:cubicBezTo>
+                    <a:pt x="2822599" y="1902099"/>
+                    <a:pt x="2680615" y="2011341"/>
+                    <a:pt x="2530669" y="2109494"/>
+                  </a:cubicBezTo>
+                  <a:cubicBezTo>
+                    <a:pt x="2380520" y="2207551"/>
+                    <a:pt x="2222510" y="2294906"/>
+                    <a:pt x="2057561" y="2369245"/>
+                  </a:cubicBezTo>
+                  <a:cubicBezTo>
+                    <a:pt x="1727252" y="2516859"/>
+                    <a:pt x="1371629" y="2614434"/>
+                    <a:pt x="1007330" y="2655701"/>
+                  </a:cubicBezTo>
+                  <a:cubicBezTo>
+                    <a:pt x="916281" y="2665873"/>
+                    <a:pt x="824568" y="2672188"/>
+                    <a:pt x="732765" y="2674696"/>
+                  </a:cubicBezTo>
+                  <a:cubicBezTo>
+                    <a:pt x="640963" y="2677203"/>
+                    <a:pt x="549072" y="2675901"/>
+                    <a:pt x="457666" y="2670839"/>
+                  </a:cubicBezTo>
+                  <a:cubicBezTo>
+                    <a:pt x="366106" y="2665584"/>
+                    <a:pt x="274572" y="2656521"/>
+                    <a:pt x="183574" y="2643312"/>
+                  </a:cubicBezTo>
+                  <a:lnTo>
+                    <a:pt x="0" y="2607798"/>
+                  </a:lnTo>
+                  <a:lnTo>
+                    <a:pt x="0" y="2356652"/>
+                  </a:lnTo>
+                  <a:lnTo>
+                    <a:pt x="222195" y="2396940"/>
+                  </a:lnTo>
+                  <a:cubicBezTo>
+                    <a:pt x="304990" y="2407980"/>
+                    <a:pt x="388511" y="2415283"/>
+                    <a:pt x="472364" y="2419092"/>
+                  </a:cubicBezTo>
+                  <a:cubicBezTo>
+                    <a:pt x="640376" y="2427095"/>
+                    <a:pt x="808184" y="2421791"/>
+                    <a:pt x="974972" y="2402122"/>
+                  </a:cubicBezTo>
+                  <a:cubicBezTo>
+                    <a:pt x="1141658" y="2382358"/>
+                    <a:pt x="1306812" y="2349286"/>
+                    <a:pt x="1468292" y="2304162"/>
+                  </a:cubicBezTo>
+                  <a:cubicBezTo>
+                    <a:pt x="1629874" y="2259231"/>
+                    <a:pt x="1787475" y="2201091"/>
+                    <a:pt x="1940176" y="2133695"/>
+                  </a:cubicBezTo>
+                  <a:cubicBezTo>
+                    <a:pt x="2246498" y="2000349"/>
+                    <a:pt x="2532507" y="1823520"/>
+                    <a:pt x="2783403" y="1609954"/>
+                  </a:cubicBezTo>
+                  <a:cubicBezTo>
+                    <a:pt x="2908442" y="1502833"/>
+                    <a:pt x="3024295" y="1385975"/>
+                    <a:pt x="3128104" y="1260439"/>
+                  </a:cubicBezTo>
+                  <a:cubicBezTo>
+                    <a:pt x="3232116" y="1135096"/>
+                    <a:pt x="3323881" y="1000689"/>
+                    <a:pt x="3400639" y="859052"/>
+                  </a:cubicBezTo>
+                  <a:cubicBezTo>
+                    <a:pt x="3477399" y="717510"/>
+                    <a:pt x="3541296" y="569316"/>
+                    <a:pt x="3585595" y="415336"/>
+                  </a:cubicBezTo>
+                  <a:cubicBezTo>
+                    <a:pt x="3607796" y="338540"/>
+                    <a:pt x="3624638" y="260224"/>
+                    <a:pt x="3635918" y="181137"/>
+                  </a:cubicBezTo>
+                  <a:close/>
+                </a:path>
+              </a:pathLst>
+            </a:custGeom>
+            <a:gradFill>
+              <a:gsLst>
+                <a:gs pos="2000">
+                  <a:schemeClr val="bg1">
+                    <a:alpha val="10000"/>
+                  </a:schemeClr>
+                </a:gs>
+                <a:gs pos="16000">
+                  <a:schemeClr val="accent6">
+                    <a:alpha val="10000"/>
+                  </a:schemeClr>
+                </a:gs>
+                <a:gs pos="100000">
+                  <a:schemeClr val="bg1">
+                    <a:alpha val="10000"/>
+                  </a:schemeClr>
+                </a:gs>
+                <a:gs pos="85000">
+                  <a:schemeClr val="accent1">
+                    <a:alpha val="10000"/>
+                  </a:schemeClr>
+                </a:gs>
+              </a:gsLst>
+              <a:lin ang="12000000" scaled="0"/>
+            </a:gradFill>
+            <a:ln>
+              <a:noFill/>
+            </a:ln>
+          </p:spPr>
+          <p:style>
+            <a:lnRef idx="2">
+              <a:schemeClr val="accent1">
+                <a:shade val="50000"/>
+              </a:schemeClr>
+            </a:lnRef>
+            <a:fillRef idx="1">
+              <a:schemeClr val="accent1"/>
+            </a:fillRef>
+            <a:effectRef idx="0">
+              <a:schemeClr val="accent1"/>
+            </a:effectRef>
+            <a:fontRef idx="minor">
+              <a:schemeClr val="lt1"/>
+            </a:fontRef>
+          </p:style>
+          <p:txBody>
+            <a:bodyPr rtlCol="0" anchor="ctr"/>
+            <a:lstStyle/>
+            <a:p>
+              <a:pPr algn="ctr"/>
+              <a:endParaRPr lang="en-US"/>
+            </a:p>
+          </p:txBody>
+        </p:sp>
+        <p:sp>
+          <p:nvSpPr>
+            <p:cNvPr id="30" name="Freeform: Shape 15">
+              <a:extLst>
+                <a:ext uri="{FF2B5EF4-FFF2-40B4-BE49-F238E27FC236}">
+                  <a16:creationId xmlns:a16="http://schemas.microsoft.com/office/drawing/2014/main" id="{47CB5DB3-B68B-4EDB-8EB4-F70741361AC2}"/>
+                </a:ext>
+                <a:ext uri="{C183D7F6-B498-43B3-948B-1728B52AA6E4}">
+                  <adec:decorative xmlns:adec="http://schemas.microsoft.com/office/drawing/2017/decorative" val="1"/>
+                </a:ext>
+              </a:extLst>
+            </p:cNvPr>
+            <p:cNvSpPr/>
+            <p:nvPr>
+              <p:extLst>
+                <p:ext uri="{386F3935-93C4-4BCD-93E2-E3B085C9AB24}">
+                  <p16:designElem xmlns:p16="http://schemas.microsoft.com/office/powerpoint/2015/main" val="1"/>
+                </p:ext>
+              </p:extLst>
+            </p:nvPr>
+          </p:nvSpPr>
+          <p:spPr>
+            <a:xfrm>
+              <a:off x="305" y="-1"/>
+              <a:ext cx="3832270" cy="2876136"/>
+            </a:xfrm>
+            <a:custGeom>
+              <a:avLst/>
+              <a:gdLst>
+                <a:gd name="connsiteX0" fmla="*/ 3800718 w 3832270"/>
+                <a:gd name="connsiteY0" fmla="*/ 0 h 2876136"/>
+                <a:gd name="connsiteX1" fmla="*/ 3832270 w 3832270"/>
+                <a:gd name="connsiteY1" fmla="*/ 0 h 2876136"/>
+                <a:gd name="connsiteX2" fmla="*/ 3824562 w 3832270"/>
+                <a:gd name="connsiteY2" fmla="*/ 143769 h 2876136"/>
+                <a:gd name="connsiteX3" fmla="*/ 3628155 w 3832270"/>
+                <a:gd name="connsiteY3" fmla="*/ 922055 h 2876136"/>
+                <a:gd name="connsiteX4" fmla="*/ 3514853 w 3832270"/>
+                <a:gd name="connsiteY4" fmla="*/ 1169078 h 2876136"/>
+                <a:gd name="connsiteX5" fmla="*/ 3379198 w 3832270"/>
+                <a:gd name="connsiteY5" fmla="*/ 1407037 h 2876136"/>
+                <a:gd name="connsiteX6" fmla="*/ 3043787 w 3832270"/>
+                <a:gd name="connsiteY6" fmla="*/ 1848342 h 2876136"/>
+                <a:gd name="connsiteX7" fmla="*/ 2845661 w 3832270"/>
+                <a:gd name="connsiteY7" fmla="*/ 2047444 h 2876136"/>
+                <a:gd name="connsiteX8" fmla="*/ 2793197 w 3832270"/>
+                <a:gd name="connsiteY8" fmla="*/ 2094689 h 2876136"/>
+                <a:gd name="connsiteX9" fmla="*/ 2739710 w 3832270"/>
+                <a:gd name="connsiteY9" fmla="*/ 2140969 h 2876136"/>
+                <a:gd name="connsiteX10" fmla="*/ 2629166 w 3832270"/>
+                <a:gd name="connsiteY10" fmla="*/ 2229867 h 2876136"/>
+                <a:gd name="connsiteX11" fmla="*/ 2145952 w 3832270"/>
+                <a:gd name="connsiteY11" fmla="*/ 2535994 h 2876136"/>
+                <a:gd name="connsiteX12" fmla="*/ 1034987 w 3832270"/>
+                <a:gd name="connsiteY12" fmla="*/ 2863910 h 2876136"/>
+                <a:gd name="connsiteX13" fmla="*/ 741909 w 3832270"/>
+                <a:gd name="connsiteY13" fmla="*/ 2875939 h 2876136"/>
+                <a:gd name="connsiteX14" fmla="*/ 450208 w 3832270"/>
+                <a:gd name="connsiteY14" fmla="*/ 2857451 h 2876136"/>
+                <a:gd name="connsiteX15" fmla="*/ 22215 w 3832270"/>
+                <a:gd name="connsiteY15" fmla="*/ 2775923 h 2876136"/>
+                <a:gd name="connsiteX16" fmla="*/ 0 w 3832270"/>
+                <a:gd name="connsiteY16" fmla="*/ 2769256 h 2876136"/>
+                <a:gd name="connsiteX17" fmla="*/ 0 w 3832270"/>
+                <a:gd name="connsiteY17" fmla="*/ 2590612 h 2876136"/>
+                <a:gd name="connsiteX18" fmla="*/ 199046 w 3832270"/>
+                <a:gd name="connsiteY18" fmla="*/ 2627410 h 2876136"/>
+                <a:gd name="connsiteX19" fmla="*/ 468174 w 3832270"/>
+                <a:gd name="connsiteY19" fmla="*/ 2649670 h 2876136"/>
+                <a:gd name="connsiteX20" fmla="*/ 1003650 w 3832270"/>
+                <a:gd name="connsiteY20" fmla="*/ 2622480 h 2876136"/>
+                <a:gd name="connsiteX21" fmla="*/ 1266489 w 3832270"/>
+                <a:gd name="connsiteY21" fmla="*/ 2573982 h 2876136"/>
+                <a:gd name="connsiteX22" fmla="*/ 1524223 w 3832270"/>
+                <a:gd name="connsiteY22" fmla="*/ 2504657 h 2876136"/>
+                <a:gd name="connsiteX23" fmla="*/ 1775731 w 3832270"/>
+                <a:gd name="connsiteY23" fmla="*/ 2416243 h 2876136"/>
+                <a:gd name="connsiteX24" fmla="*/ 2019789 w 3832270"/>
+                <a:gd name="connsiteY24" fmla="*/ 2309412 h 2876136"/>
+                <a:gd name="connsiteX25" fmla="*/ 2482486 w 3832270"/>
+                <a:gd name="connsiteY25" fmla="*/ 2046962 h 2876136"/>
+                <a:gd name="connsiteX26" fmla="*/ 2591908 w 3832270"/>
+                <a:gd name="connsiteY26" fmla="*/ 1971371 h 2876136"/>
+                <a:gd name="connsiteX27" fmla="*/ 2645702 w 3832270"/>
+                <a:gd name="connsiteY27" fmla="*/ 1932321 h 2876136"/>
+                <a:gd name="connsiteX28" fmla="*/ 2698779 w 3832270"/>
+                <a:gd name="connsiteY28" fmla="*/ 1892309 h 2876136"/>
+                <a:gd name="connsiteX29" fmla="*/ 2903537 w 3832270"/>
+                <a:gd name="connsiteY29" fmla="*/ 1722516 h 2876136"/>
+                <a:gd name="connsiteX30" fmla="*/ 3269061 w 3832270"/>
+                <a:gd name="connsiteY30" fmla="*/ 1337327 h 2876136"/>
+                <a:gd name="connsiteX31" fmla="*/ 3424928 w 3832270"/>
+                <a:gd name="connsiteY31" fmla="*/ 1122508 h 2876136"/>
+                <a:gd name="connsiteX32" fmla="*/ 3557622 w 3832270"/>
+                <a:gd name="connsiteY32" fmla="*/ 893226 h 2876136"/>
+                <a:gd name="connsiteX33" fmla="*/ 3587019 w 3832270"/>
+                <a:gd name="connsiteY33" fmla="*/ 833929 h 2876136"/>
+                <a:gd name="connsiteX34" fmla="*/ 3601310 w 3832270"/>
+                <a:gd name="connsiteY34" fmla="*/ 804040 h 2876136"/>
+                <a:gd name="connsiteX35" fmla="*/ 3614885 w 3832270"/>
+                <a:gd name="connsiteY35" fmla="*/ 773861 h 2876136"/>
+                <a:gd name="connsiteX36" fmla="*/ 3640812 w 3832270"/>
+                <a:gd name="connsiteY36" fmla="*/ 713022 h 2876136"/>
+                <a:gd name="connsiteX37" fmla="*/ 3665105 w 3832270"/>
+                <a:gd name="connsiteY37" fmla="*/ 651506 h 2876136"/>
+                <a:gd name="connsiteX38" fmla="*/ 3744110 w 3832270"/>
+                <a:gd name="connsiteY38" fmla="*/ 399567 h 2876136"/>
+                <a:gd name="connsiteX39" fmla="*/ 3792123 w 3832270"/>
+                <a:gd name="connsiteY39" fmla="*/ 140444 h 2876136"/>
+              </a:gdLst>
+              <a:ahLst/>
+              <a:cxnLst>
+                <a:cxn ang="0">
+                  <a:pos x="connsiteX0" y="connsiteY0"/>
+                </a:cxn>
+                <a:cxn ang="0">
+                  <a:pos x="connsiteX1" y="connsiteY1"/>
+                </a:cxn>
+                <a:cxn ang="0">
+                  <a:pos x="connsiteX2" y="connsiteY2"/>
+                </a:cxn>
+                <a:cxn ang="0">
+                  <a:pos x="connsiteX3" y="connsiteY3"/>
+                </a:cxn>
+                <a:cxn ang="0">
+                  <a:pos x="connsiteX4" y="connsiteY4"/>
+                </a:cxn>
+                <a:cxn ang="0">
+                  <a:pos x="connsiteX5" y="connsiteY5"/>
+                </a:cxn>
+                <a:cxn ang="0">
+                  <a:pos x="connsiteX6" y="connsiteY6"/>
+                </a:cxn>
+                <a:cxn ang="0">
+                  <a:pos x="connsiteX7" y="connsiteY7"/>
+                </a:cxn>
+                <a:cxn ang="0">
+                  <a:pos x="connsiteX8" y="connsiteY8"/>
+                </a:cxn>
+                <a:cxn ang="0">
+                  <a:pos x="connsiteX9" y="connsiteY9"/>
+                </a:cxn>
+                <a:cxn ang="0">
+                  <a:pos x="connsiteX10" y="connsiteY10"/>
+                </a:cxn>
+                <a:cxn ang="0">
+                  <a:pos x="connsiteX11" y="connsiteY11"/>
+                </a:cxn>
+                <a:cxn ang="0">
+                  <a:pos x="connsiteX12" y="connsiteY12"/>
+                </a:cxn>
+                <a:cxn ang="0">
+                  <a:pos x="connsiteX13" y="connsiteY13"/>
+                </a:cxn>
+                <a:cxn ang="0">
+                  <a:pos x="connsiteX14" y="connsiteY14"/>
+                </a:cxn>
+                <a:cxn ang="0">
+                  <a:pos x="connsiteX15" y="connsiteY15"/>
+                </a:cxn>
+                <a:cxn ang="0">
+                  <a:pos x="connsiteX16" y="connsiteY16"/>
+                </a:cxn>
+                <a:cxn ang="0">
+                  <a:pos x="connsiteX17" y="connsiteY17"/>
+                </a:cxn>
+                <a:cxn ang="0">
+                  <a:pos x="connsiteX18" y="connsiteY18"/>
+                </a:cxn>
+                <a:cxn ang="0">
+                  <a:pos x="connsiteX19" y="connsiteY19"/>
+                </a:cxn>
+                <a:cxn ang="0">
+                  <a:pos x="connsiteX20" y="connsiteY20"/>
+                </a:cxn>
+                <a:cxn ang="0">
+                  <a:pos x="connsiteX21" y="connsiteY21"/>
+                </a:cxn>
+                <a:cxn ang="0">
+                  <a:pos x="connsiteX22" y="connsiteY22"/>
+                </a:cxn>
+                <a:cxn ang="0">
+                  <a:pos x="connsiteX23" y="connsiteY23"/>
+                </a:cxn>
+                <a:cxn ang="0">
+                  <a:pos x="connsiteX24" y="connsiteY24"/>
+                </a:cxn>
+                <a:cxn ang="0">
+                  <a:pos x="connsiteX25" y="connsiteY25"/>
+                </a:cxn>
+                <a:cxn ang="0">
+                  <a:pos x="connsiteX26" y="connsiteY26"/>
+                </a:cxn>
+                <a:cxn ang="0">
+                  <a:pos x="connsiteX27" y="connsiteY27"/>
+                </a:cxn>
+                <a:cxn ang="0">
+                  <a:pos x="connsiteX28" y="connsiteY28"/>
+                </a:cxn>
+                <a:cxn ang="0">
+                  <a:pos x="connsiteX29" y="connsiteY29"/>
+                </a:cxn>
+                <a:cxn ang="0">
+                  <a:pos x="connsiteX30" y="connsiteY30"/>
+                </a:cxn>
+                <a:cxn ang="0">
+                  <a:pos x="connsiteX31" y="connsiteY31"/>
+                </a:cxn>
+                <a:cxn ang="0">
+                  <a:pos x="connsiteX32" y="connsiteY32"/>
+                </a:cxn>
+                <a:cxn ang="0">
+                  <a:pos x="connsiteX33" y="connsiteY33"/>
+                </a:cxn>
+                <a:cxn ang="0">
+                  <a:pos x="connsiteX34" y="connsiteY34"/>
+                </a:cxn>
+                <a:cxn ang="0">
+                  <a:pos x="connsiteX35" y="connsiteY35"/>
+                </a:cxn>
+                <a:cxn ang="0">
+                  <a:pos x="connsiteX36" y="connsiteY36"/>
+                </a:cxn>
+                <a:cxn ang="0">
+                  <a:pos x="connsiteX37" y="connsiteY37"/>
+                </a:cxn>
+                <a:cxn ang="0">
+                  <a:pos x="connsiteX38" y="connsiteY38"/>
+                </a:cxn>
+                <a:cxn ang="0">
+                  <a:pos x="connsiteX39" y="connsiteY39"/>
+                </a:cxn>
+              </a:cxnLst>
+              <a:rect l="l" t="t" r="r" b="b"/>
+              <a:pathLst>
+                <a:path w="3832270" h="2876136">
+                  <a:moveTo>
+                    <a:pt x="3800718" y="0"/>
+                  </a:moveTo>
+                  <a:lnTo>
+                    <a:pt x="3832270" y="0"/>
+                  </a:lnTo>
+                  <a:lnTo>
+                    <a:pt x="3824562" y="143769"/>
+                  </a:lnTo>
+                  <a:cubicBezTo>
+                    <a:pt x="3797131" y="409191"/>
+                    <a:pt x="3730585" y="671345"/>
+                    <a:pt x="3628155" y="922055"/>
+                  </a:cubicBezTo>
+                  <a:cubicBezTo>
+                    <a:pt x="3593858" y="1005553"/>
+                    <a:pt x="3556704" y="1088280"/>
+                    <a:pt x="3514853" y="1169078"/>
+                  </a:cubicBezTo>
+                  <a:cubicBezTo>
+                    <a:pt x="3473616" y="1250166"/>
+                    <a:pt x="3428194" y="1329517"/>
+                    <a:pt x="3379198" y="1407037"/>
+                  </a:cubicBezTo>
+                  <a:cubicBezTo>
+                    <a:pt x="3281106" y="1561980"/>
+                    <a:pt x="3169132" y="1710174"/>
+                    <a:pt x="3043787" y="1848342"/>
+                  </a:cubicBezTo>
+                  <a:cubicBezTo>
+                    <a:pt x="2980806" y="1917184"/>
+                    <a:pt x="2915071" y="1984001"/>
+                    <a:pt x="2845661" y="2047444"/>
+                  </a:cubicBezTo>
+                  <a:cubicBezTo>
+                    <a:pt x="2828411" y="2063450"/>
+                    <a:pt x="2811060" y="2079263"/>
+                    <a:pt x="2793197" y="2094689"/>
+                  </a:cubicBezTo>
+                  <a:cubicBezTo>
+                    <a:pt x="2775436" y="2110213"/>
+                    <a:pt x="2757982" y="2126025"/>
+                    <a:pt x="2739710" y="2140969"/>
+                  </a:cubicBezTo>
+                  <a:cubicBezTo>
+                    <a:pt x="2703576" y="2171341"/>
+                    <a:pt x="2666524" y="2200749"/>
+                    <a:pt x="2629166" y="2229867"/>
+                  </a:cubicBezTo>
+                  <a:cubicBezTo>
+                    <a:pt x="2479015" y="2345569"/>
+                    <a:pt x="2316821" y="2448061"/>
+                    <a:pt x="2145952" y="2535994"/>
+                  </a:cubicBezTo>
+                  <a:cubicBezTo>
+                    <a:pt x="1804312" y="2711957"/>
+                    <a:pt x="1424600" y="2826982"/>
+                    <a:pt x="1034987" y="2863910"/>
+                  </a:cubicBezTo>
+                  <a:cubicBezTo>
+                    <a:pt x="937762" y="2873167"/>
+                    <a:pt x="839720" y="2877096"/>
+                    <a:pt x="741909" y="2875939"/>
+                  </a:cubicBezTo>
+                  <a:cubicBezTo>
+                    <a:pt x="644097" y="2874782"/>
+                    <a:pt x="546515" y="2868539"/>
+                    <a:pt x="450208" y="2857451"/>
+                  </a:cubicBezTo>
+                  <a:cubicBezTo>
+                    <a:pt x="305520" y="2840674"/>
+                    <a:pt x="162095" y="2813810"/>
+                    <a:pt x="22215" y="2775923"/>
+                  </a:cubicBezTo>
+                  <a:lnTo>
+                    <a:pt x="0" y="2769256"/>
+                  </a:lnTo>
+                  <a:lnTo>
+                    <a:pt x="0" y="2590612"/>
+                  </a:lnTo>
+                  <a:lnTo>
+                    <a:pt x="199046" y="2627410"/>
+                  </a:lnTo>
+                  <a:cubicBezTo>
+                    <a:pt x="288321" y="2639209"/>
+                    <a:pt x="378197" y="2646537"/>
+                    <a:pt x="468174" y="2649670"/>
+                  </a:cubicBezTo>
+                  <a:cubicBezTo>
+                    <a:pt x="648333" y="2656805"/>
+                    <a:pt x="826655" y="2647163"/>
+                    <a:pt x="1003650" y="2622480"/>
+                  </a:cubicBezTo>
+                  <a:cubicBezTo>
+                    <a:pt x="1091943" y="2609658"/>
+                    <a:pt x="1179725" y="2593747"/>
+                    <a:pt x="1266489" y="2573982"/>
+                  </a:cubicBezTo>
+                  <a:cubicBezTo>
+                    <a:pt x="1353250" y="2553927"/>
+                    <a:pt x="1439298" y="2531076"/>
+                    <a:pt x="1524223" y="2504657"/>
+                  </a:cubicBezTo>
+                  <a:cubicBezTo>
+                    <a:pt x="1609149" y="2478336"/>
+                    <a:pt x="1693052" y="2448833"/>
+                    <a:pt x="1775731" y="2416243"/>
+                  </a:cubicBezTo>
+                  <a:cubicBezTo>
+                    <a:pt x="1858309" y="2383557"/>
+                    <a:pt x="1939764" y="2347882"/>
+                    <a:pt x="2019789" y="2309412"/>
+                  </a:cubicBezTo>
+                  <a:cubicBezTo>
+                    <a:pt x="2179839" y="2232567"/>
+                    <a:pt x="2334583" y="2144923"/>
+                    <a:pt x="2482486" y="2046962"/>
+                  </a:cubicBezTo>
+                  <a:cubicBezTo>
+                    <a:pt x="2519334" y="2022376"/>
+                    <a:pt x="2556081" y="1997403"/>
+                    <a:pt x="2591908" y="1971371"/>
+                  </a:cubicBezTo>
+                  <a:cubicBezTo>
+                    <a:pt x="2610077" y="1958644"/>
+                    <a:pt x="2627838" y="1945434"/>
+                    <a:pt x="2645702" y="1932321"/>
+                  </a:cubicBezTo>
+                  <a:cubicBezTo>
+                    <a:pt x="2663666" y="1919305"/>
+                    <a:pt x="2681325" y="1905903"/>
+                    <a:pt x="2698779" y="1892309"/>
+                  </a:cubicBezTo>
+                  <a:cubicBezTo>
+                    <a:pt x="2768903" y="1838025"/>
+                    <a:pt x="2837496" y="1781717"/>
+                    <a:pt x="2903537" y="1722516"/>
+                  </a:cubicBezTo>
+                  <a:cubicBezTo>
+                    <a:pt x="3035926" y="1604501"/>
+                    <a:pt x="3158720" y="1475784"/>
+                    <a:pt x="3269061" y="1337327"/>
+                  </a:cubicBezTo>
+                  <a:cubicBezTo>
+                    <a:pt x="3324182" y="1268099"/>
+                    <a:pt x="3376341" y="1196461"/>
+                    <a:pt x="3424928" y="1122508"/>
+                  </a:cubicBezTo>
+                  <a:cubicBezTo>
+                    <a:pt x="3472697" y="1048170"/>
+                    <a:pt x="3517814" y="972000"/>
+                    <a:pt x="3557622" y="893226"/>
+                  </a:cubicBezTo>
+                  <a:cubicBezTo>
+                    <a:pt x="3567931" y="873654"/>
+                    <a:pt x="3577526" y="853791"/>
+                    <a:pt x="3587019" y="833929"/>
+                  </a:cubicBezTo>
+                  <a:lnTo>
+                    <a:pt x="3601310" y="804040"/>
+                  </a:lnTo>
+                  <a:lnTo>
+                    <a:pt x="3614885" y="773861"/>
+                  </a:lnTo>
+                  <a:cubicBezTo>
+                    <a:pt x="3623766" y="753709"/>
+                    <a:pt x="3632748" y="733559"/>
+                    <a:pt x="3640812" y="713022"/>
+                  </a:cubicBezTo>
+                  <a:cubicBezTo>
+                    <a:pt x="3648876" y="692485"/>
+                    <a:pt x="3657756" y="672236"/>
+                    <a:pt x="3665105" y="651506"/>
+                  </a:cubicBezTo>
+                  <a:cubicBezTo>
+                    <a:pt x="3696544" y="569166"/>
+                    <a:pt x="3723185" y="485089"/>
+                    <a:pt x="3744110" y="399567"/>
+                  </a:cubicBezTo>
+                  <a:cubicBezTo>
+                    <a:pt x="3765341" y="314238"/>
+                    <a:pt x="3781392" y="227654"/>
+                    <a:pt x="3792123" y="140444"/>
+                  </a:cubicBezTo>
+                  <a:close/>
+                </a:path>
+              </a:pathLst>
+            </a:custGeom>
+            <a:gradFill>
+              <a:gsLst>
+                <a:gs pos="2000">
+                  <a:schemeClr val="bg1">
+                    <a:alpha val="10000"/>
+                  </a:schemeClr>
+                </a:gs>
+                <a:gs pos="16000">
+                  <a:schemeClr val="accent6">
+                    <a:alpha val="10000"/>
+                  </a:schemeClr>
+                </a:gs>
+                <a:gs pos="100000">
+                  <a:schemeClr val="bg1">
+                    <a:alpha val="10000"/>
+                  </a:schemeClr>
+                </a:gs>
+                <a:gs pos="85000">
+                  <a:schemeClr val="accent1">
+                    <a:alpha val="10000"/>
+                  </a:schemeClr>
+                </a:gs>
+              </a:gsLst>
+              <a:lin ang="12000000" scaled="0"/>
+            </a:gradFill>
+            <a:ln>
+              <a:noFill/>
+            </a:ln>
+          </p:spPr>
+          <p:style>
+            <a:lnRef idx="2">
+              <a:schemeClr val="accent1">
+                <a:shade val="50000"/>
+              </a:schemeClr>
+            </a:lnRef>
+            <a:fillRef idx="1">
+              <a:schemeClr val="accent1"/>
+            </a:fillRef>
+            <a:effectRef idx="0">
+              <a:schemeClr val="accent1"/>
+            </a:effectRef>
+            <a:fontRef idx="minor">
+              <a:schemeClr val="lt1"/>
+            </a:fontRef>
+          </p:style>
+          <p:txBody>
+            <a:bodyPr rtlCol="0" anchor="ctr"/>
+            <a:lstStyle/>
+            <a:p>
+              <a:pPr algn="ctr"/>
+              <a:endParaRPr lang="en-US"/>
+            </a:p>
+          </p:txBody>
+        </p:sp>
+      </p:grpSp>
+      <p:pic>
+        <p:nvPicPr>
+          <p:cNvPr id="7" name="Picture 6" descr="Graphical user interface, application&#10;&#10;Description automatically generated">
+            <a:extLst>
+              <a:ext uri="{FF2B5EF4-FFF2-40B4-BE49-F238E27FC236}">
+                <a16:creationId xmlns:a16="http://schemas.microsoft.com/office/drawing/2014/main" id="{0F6E3AAC-6251-43A9-ACCD-AF059BCD2C17}"/>
+              </a:ext>
+            </a:extLst>
+          </p:cNvPr>
+          <p:cNvPicPr>
+            <a:picLocks noChangeAspect="1"/>
+          </p:cNvPicPr>
+          <p:nvPr/>
+        </p:nvPicPr>
+        <p:blipFill rotWithShape="1">
+          <a:blip r:embed="rId2">
+            <a:extLst>
+              <a:ext uri="{28A0092B-C50C-407E-A947-70E740481C1C}">
+                <a14:useLocalDpi xmlns:a14="http://schemas.microsoft.com/office/drawing/2010/main" val="0"/>
+              </a:ext>
+            </a:extLst>
+          </a:blip>
+          <a:srcRect l="2" t="49984" r="-2" b="16"/>
+          <a:stretch/>
+        </p:blipFill>
+        <p:spPr>
+          <a:xfrm>
+            <a:off x="2130099" y="713306"/>
+            <a:ext cx="7931495" cy="5976066"/>
+          </a:xfrm>
+          <a:prstGeom prst="rect">
+            <a:avLst/>
+          </a:prstGeom>
+        </p:spPr>
+      </p:pic>
+      <p:sp>
+        <p:nvSpPr>
+          <p:cNvPr id="2" name="TextBox 1">
+            <a:extLst>
+              <a:ext uri="{FF2B5EF4-FFF2-40B4-BE49-F238E27FC236}">
+                <a16:creationId xmlns:a16="http://schemas.microsoft.com/office/drawing/2014/main" id="{E12C137F-3AAB-458E-BAA6-B94EFB00F286}"/>
+              </a:ext>
+            </a:extLst>
+          </p:cNvPr>
+          <p:cNvSpPr txBox="1"/>
+          <p:nvPr/>
+        </p:nvSpPr>
+        <p:spPr>
+          <a:xfrm>
+            <a:off x="4568985" y="168628"/>
+            <a:ext cx="3053721" cy="707886"/>
+          </a:xfrm>
+          <a:prstGeom prst="rect">
+            <a:avLst/>
+          </a:prstGeom>
+          <a:noFill/>
+        </p:spPr>
+        <p:txBody>
+          <a:bodyPr wrap="none" rtlCol="0">
+            <a:spAutoFit/>
+          </a:bodyPr>
+          <a:lstStyle/>
+          <a:p>
+            <a:r>
+              <a:rPr lang="en-GB" sz="4000" dirty="0"/>
+              <a:t>MENU Screen</a:t>
+            </a:r>
+          </a:p>
+        </p:txBody>
+      </p:sp>
+    </p:spTree>
+    <p:extLst>
+      <p:ext uri="{BB962C8B-B14F-4D97-AF65-F5344CB8AC3E}">
+        <p14:creationId xmlns:p14="http://schemas.microsoft.com/office/powerpoint/2010/main" val="3638460732"/>
+      </p:ext>
+    </p:extLst>
+  </p:cSld>
+  <p:clrMapOvr>
+    <a:masterClrMapping/>
+  </p:clrMapOvr>
+</p:sld>
+</file>
+
+<file path=ppt/slides/slide15.xml><?xml version="1.0" encoding="utf-8"?>
+<p:sld xmlns:a="http://schemas.openxmlformats.org/drawingml/2006/main" xmlns:r="http://schemas.openxmlformats.org/officeDocument/2006/relationships" xmlns:p="http://schemas.openxmlformats.org/presentationml/2006/main">
+  <p:cSld>
+    <p:bg>
+      <p:bgPr>
+        <a:solidFill>
+          <a:schemeClr val="bg1"/>
+        </a:solidFill>
+        <a:effectLst/>
+      </p:bgPr>
+    </p:bg>
+    <p:spTree>
+      <p:nvGrpSpPr>
+        <p:cNvPr id="1" name=""/>
+        <p:cNvGrpSpPr/>
+        <p:nvPr/>
+      </p:nvGrpSpPr>
+      <p:grpSpPr>
+        <a:xfrm>
+          <a:off x="0" y="0"/>
+          <a:ext cx="0" cy="0"/>
+          <a:chOff x="0" y="0"/>
+          <a:chExt cx="0" cy="0"/>
+        </a:xfrm>
+      </p:grpSpPr>
+      <p:pic>
+        <p:nvPicPr>
+          <p:cNvPr id="1030" name="Picture 6">
+            <a:extLst>
+              <a:ext uri="{FF2B5EF4-FFF2-40B4-BE49-F238E27FC236}">
+                <a16:creationId xmlns:a16="http://schemas.microsoft.com/office/drawing/2014/main" id="{85518F6B-2153-4DC8-9181-1054B5DF6890}"/>
+              </a:ext>
+            </a:extLst>
+          </p:cNvPr>
+          <p:cNvPicPr>
+            <a:picLocks noChangeAspect="1" noChangeArrowheads="1"/>
+          </p:cNvPicPr>
+          <p:nvPr/>
+        </p:nvPicPr>
+        <p:blipFill>
+          <a:blip r:embed="rId2">
+            <a:extLst>
+              <a:ext uri="{28A0092B-C50C-407E-A947-70E740481C1C}">
+                <a14:useLocalDpi xmlns:a14="http://schemas.microsoft.com/office/drawing/2010/main" val="0"/>
+              </a:ext>
+            </a:extLst>
+          </a:blip>
+          <a:stretch>
+            <a:fillRect/>
+          </a:stretch>
+        </p:blipFill>
+        <p:spPr bwMode="auto">
+          <a:xfrm>
+            <a:off x="640587" y="321733"/>
+            <a:ext cx="2762772" cy="2748958"/>
+          </a:xfrm>
+          <a:prstGeom prst="roundRect">
+            <a:avLst>
+              <a:gd name="adj" fmla="val 16667"/>
+            </a:avLst>
+          </a:prstGeom>
+          <a:ln>
+            <a:noFill/>
+          </a:ln>
+          <a:effectLst>
+            <a:outerShdw blurRad="76200" dist="38100" dir="7800000" algn="tl" rotWithShape="0">
+              <a:srgbClr val="000000">
+                <a:alpha val="40000"/>
+              </a:srgbClr>
+            </a:outerShdw>
+          </a:effectLst>
+          <a:scene3d>
+            <a:camera prst="orthographicFront"/>
+            <a:lightRig rig="contrasting" dir="t">
+              <a:rot lat="0" lon="0" rev="4200000"/>
+            </a:lightRig>
+          </a:scene3d>
+          <a:sp3d prstMaterial="plastic">
+            <a:bevelT w="381000" h="114300" prst="relaxedInset"/>
+            <a:contourClr>
+              <a:srgbClr val="969696"/>
+            </a:contourClr>
+          </a:sp3d>
+          <a:extLst>
+            <a:ext uri="{909E8E84-426E-40DD-AFC4-6F175D3DCCD1}">
+              <a14:hiddenFill xmlns:a14="http://schemas.microsoft.com/office/drawing/2010/main">
+                <a:solidFill>
+                  <a:srgbClr val="FFFFFF"/>
+                </a:solidFill>
+              </a14:hiddenFill>
+            </a:ext>
+          </a:extLst>
+        </p:spPr>
+      </p:pic>
+      <p:sp>
+        <p:nvSpPr>
+          <p:cNvPr id="83" name="Rectangle 82">
+            <a:extLst>
+              <a:ext uri="{FF2B5EF4-FFF2-40B4-BE49-F238E27FC236}">
+                <a16:creationId xmlns:a16="http://schemas.microsoft.com/office/drawing/2014/main" id="{E3B4FF89-C45F-4E24-B963-61E855708F2A}"/>
+              </a:ext>
+              <a:ext uri="{C183D7F6-B498-43B3-948B-1728B52AA6E4}">
+                <adec:decorative xmlns:adec="http://schemas.microsoft.com/office/drawing/2017/decorative" val="1"/>
+              </a:ext>
+            </a:extLst>
+          </p:cNvPr>
+          <p:cNvSpPr>
+            <a:spLocks noGrp="1" noRot="1" noChangeAspect="1" noMove="1" noResize="1" noEditPoints="1" noAdjustHandles="1" noChangeArrowheads="1" noChangeShapeType="1" noTextEdit="1"/>
+          </p:cNvSpPr>
+          <p:nvPr>
+            <p:extLst>
+              <p:ext uri="{386F3935-93C4-4BCD-93E2-E3B085C9AB24}">
+                <p16:designElem xmlns:p16="http://schemas.microsoft.com/office/powerpoint/2015/main" val="1"/>
+              </p:ext>
+            </p:extLst>
+          </p:nvPr>
+        </p:nvSpPr>
+        <p:spPr>
+          <a:xfrm>
+            <a:off x="4023671" y="0"/>
+            <a:ext cx="73152" cy="6858000"/>
+          </a:xfrm>
+          <a:prstGeom prst="rect">
+            <a:avLst/>
+          </a:prstGeom>
+          <a:solidFill>
+            <a:schemeClr val="tx1">
+              <a:lumMod val="75000"/>
+              <a:lumOff val="25000"/>
+            </a:schemeClr>
+          </a:solidFill>
+          <a:ln>
+            <a:noFill/>
+          </a:ln>
+        </p:spPr>
+        <p:style>
+          <a:lnRef idx="2">
+            <a:schemeClr val="accent1">
+              <a:shade val="50000"/>
+            </a:schemeClr>
+          </a:lnRef>
+          <a:fillRef idx="1">
+            <a:schemeClr val="accent1"/>
+          </a:fillRef>
+          <a:effectRef idx="0">
+            <a:schemeClr val="accent1"/>
+          </a:effectRef>
+          <a:fontRef idx="minor">
+            <a:schemeClr val="lt1"/>
+          </a:fontRef>
+        </p:style>
+        <p:txBody>
+          <a:bodyPr rtlCol="0" anchor="ctr"/>
+          <a:lstStyle/>
+          <a:p>
+            <a:pPr algn="ctr"/>
+            <a:endParaRPr lang="en-US"/>
+          </a:p>
+        </p:txBody>
+      </p:sp>
+      <p:pic>
+        <p:nvPicPr>
+          <p:cNvPr id="1038" name="Picture 14" descr="image">
+            <a:extLst>
+              <a:ext uri="{FF2B5EF4-FFF2-40B4-BE49-F238E27FC236}">
+                <a16:creationId xmlns:a16="http://schemas.microsoft.com/office/drawing/2014/main" id="{93B70B03-0748-4659-96B7-FA586FB94460}"/>
+              </a:ext>
+            </a:extLst>
+          </p:cNvPr>
+          <p:cNvPicPr>
+            <a:picLocks noChangeAspect="1" noChangeArrowheads="1"/>
+          </p:cNvPicPr>
+          <p:nvPr/>
+        </p:nvPicPr>
+        <p:blipFill>
+          <a:blip r:embed="rId3">
+            <a:extLst>
+              <a:ext uri="{28A0092B-C50C-407E-A947-70E740481C1C}">
+                <a14:useLocalDpi xmlns:a14="http://schemas.microsoft.com/office/drawing/2010/main" val="0"/>
+              </a:ext>
+            </a:extLst>
+          </a:blip>
+          <a:stretch>
+            <a:fillRect/>
+          </a:stretch>
+        </p:blipFill>
+        <p:spPr bwMode="auto">
+          <a:xfrm>
+            <a:off x="4707637" y="321734"/>
+            <a:ext cx="2776725" cy="2748958"/>
+          </a:xfrm>
+          <a:prstGeom prst="roundRect">
+            <a:avLst>
+              <a:gd name="adj" fmla="val 16667"/>
+            </a:avLst>
+          </a:prstGeom>
+          <a:ln>
+            <a:noFill/>
+          </a:ln>
+          <a:effectLst>
+            <a:outerShdw blurRad="76200" dist="38100" dir="7800000" algn="tl" rotWithShape="0">
+              <a:srgbClr val="000000">
+                <a:alpha val="40000"/>
+              </a:srgbClr>
+            </a:outerShdw>
+          </a:effectLst>
+          <a:scene3d>
+            <a:camera prst="orthographicFront"/>
+            <a:lightRig rig="contrasting" dir="t">
+              <a:rot lat="0" lon="0" rev="4200000"/>
+            </a:lightRig>
+          </a:scene3d>
+          <a:sp3d prstMaterial="plastic">
+            <a:bevelT w="381000" h="114300" prst="relaxedInset"/>
+            <a:contourClr>
+              <a:srgbClr val="969696"/>
+            </a:contourClr>
+          </a:sp3d>
+          <a:extLst>
+            <a:ext uri="{909E8E84-426E-40DD-AFC4-6F175D3DCCD1}">
+              <a14:hiddenFill xmlns:a14="http://schemas.microsoft.com/office/drawing/2010/main">
+                <a:solidFill>
+                  <a:srgbClr val="FFFFFF"/>
+                </a:solidFill>
+              </a14:hiddenFill>
+            </a:ext>
+          </a:extLst>
+        </p:spPr>
+      </p:pic>
+      <p:sp>
+        <p:nvSpPr>
+          <p:cNvPr id="85" name="Rectangle 84">
+            <a:extLst>
+              <a:ext uri="{FF2B5EF4-FFF2-40B4-BE49-F238E27FC236}">
+                <a16:creationId xmlns:a16="http://schemas.microsoft.com/office/drawing/2014/main" id="{14F25C03-EF67-4344-8AEA-7B3FA0DED024}"/>
+              </a:ext>
+              <a:ext uri="{C183D7F6-B498-43B3-948B-1728B52AA6E4}">
+                <adec:decorative xmlns:adec="http://schemas.microsoft.com/office/drawing/2017/decorative" val="1"/>
+              </a:ext>
+            </a:extLst>
+          </p:cNvPr>
+          <p:cNvSpPr>
+            <a:spLocks noGrp="1" noRot="1" noChangeAspect="1" noMove="1" noResize="1" noEditPoints="1" noAdjustHandles="1" noChangeArrowheads="1" noChangeShapeType="1" noTextEdit="1"/>
+          </p:cNvSpPr>
+          <p:nvPr>
+            <p:extLst>
+              <p:ext uri="{386F3935-93C4-4BCD-93E2-E3B085C9AB24}">
+                <p16:designElem xmlns:p16="http://schemas.microsoft.com/office/powerpoint/2015/main" val="1"/>
+              </p:ext>
+            </p:extLst>
+          </p:nvPr>
+        </p:nvSpPr>
+        <p:spPr>
+          <a:xfrm>
+            <a:off x="8107836" y="0"/>
+            <a:ext cx="73152" cy="6858000"/>
+          </a:xfrm>
+          <a:prstGeom prst="rect">
+            <a:avLst/>
+          </a:prstGeom>
+          <a:solidFill>
+            <a:schemeClr val="tx1">
+              <a:lumMod val="75000"/>
+              <a:lumOff val="25000"/>
+            </a:schemeClr>
+          </a:solidFill>
+          <a:ln>
+            <a:noFill/>
+          </a:ln>
+        </p:spPr>
+        <p:style>
+          <a:lnRef idx="2">
+            <a:schemeClr val="accent1">
+              <a:shade val="50000"/>
+            </a:schemeClr>
+          </a:lnRef>
+          <a:fillRef idx="1">
+            <a:schemeClr val="accent1"/>
+          </a:fillRef>
+          <a:effectRef idx="0">
+            <a:schemeClr val="accent1"/>
+          </a:effectRef>
+          <a:fontRef idx="minor">
+            <a:schemeClr val="lt1"/>
+          </a:fontRef>
+        </p:style>
+        <p:txBody>
+          <a:bodyPr rtlCol="0" anchor="ctr"/>
+          <a:lstStyle/>
+          <a:p>
+            <a:pPr algn="ctr"/>
+            <a:endParaRPr lang="en-US"/>
+          </a:p>
+        </p:txBody>
+      </p:sp>
+      <p:pic>
+        <p:nvPicPr>
+          <p:cNvPr id="1032" name="Picture 8">
+            <a:extLst>
+              <a:ext uri="{FF2B5EF4-FFF2-40B4-BE49-F238E27FC236}">
+                <a16:creationId xmlns:a16="http://schemas.microsoft.com/office/drawing/2014/main" id="{D899F135-B3A5-4718-AF9C-29A5345B31D1}"/>
+              </a:ext>
+            </a:extLst>
+          </p:cNvPr>
+          <p:cNvPicPr>
+            <a:picLocks noChangeAspect="1" noChangeArrowheads="1"/>
+          </p:cNvPicPr>
+          <p:nvPr/>
+        </p:nvPicPr>
+        <p:blipFill>
+          <a:blip r:embed="rId4">
+            <a:extLst>
+              <a:ext uri="{28A0092B-C50C-407E-A947-70E740481C1C}">
+                <a14:useLocalDpi xmlns:a14="http://schemas.microsoft.com/office/drawing/2010/main" val="0"/>
+              </a:ext>
+            </a:extLst>
+          </a:blip>
+          <a:stretch>
+            <a:fillRect/>
+          </a:stretch>
+        </p:blipFill>
+        <p:spPr bwMode="auto">
+          <a:xfrm>
+            <a:off x="8816652" y="321733"/>
+            <a:ext cx="2752344" cy="2752344"/>
+          </a:xfrm>
+          <a:prstGeom prst="roundRect">
+            <a:avLst>
+              <a:gd name="adj" fmla="val 16667"/>
+            </a:avLst>
+          </a:prstGeom>
+          <a:ln>
+            <a:noFill/>
+          </a:ln>
+          <a:effectLst>
+            <a:outerShdw blurRad="76200" dist="38100" dir="7800000" algn="tl" rotWithShape="0">
+              <a:srgbClr val="000000">
+                <a:alpha val="40000"/>
+              </a:srgbClr>
+            </a:outerShdw>
+          </a:effectLst>
+          <a:scene3d>
+            <a:camera prst="orthographicFront"/>
+            <a:lightRig rig="contrasting" dir="t">
+              <a:rot lat="0" lon="0" rev="4200000"/>
+            </a:lightRig>
+          </a:scene3d>
+          <a:sp3d prstMaterial="plastic">
+            <a:bevelT w="381000" h="114300" prst="relaxedInset"/>
+            <a:contourClr>
+              <a:srgbClr val="969696"/>
+            </a:contourClr>
+          </a:sp3d>
+          <a:extLst>
+            <a:ext uri="{909E8E84-426E-40DD-AFC4-6F175D3DCCD1}">
+              <a14:hiddenFill xmlns:a14="http://schemas.microsoft.com/office/drawing/2010/main">
+                <a:solidFill>
+                  <a:srgbClr val="FFFFFF"/>
+                </a:solidFill>
+              </a14:hiddenFill>
+            </a:ext>
+          </a:extLst>
+        </p:spPr>
+      </p:pic>
+      <p:sp>
+        <p:nvSpPr>
+          <p:cNvPr id="87" name="Rectangle 86">
+            <a:extLst>
+              <a:ext uri="{FF2B5EF4-FFF2-40B4-BE49-F238E27FC236}">
+                <a16:creationId xmlns:a16="http://schemas.microsoft.com/office/drawing/2014/main" id="{F74793DE-3651-410B-B243-8F0B1468E6A4}"/>
+              </a:ext>
+              <a:ext uri="{C183D7F6-B498-43B3-948B-1728B52AA6E4}">
+                <adec:decorative xmlns:adec="http://schemas.microsoft.com/office/drawing/2017/decorative" val="1"/>
+              </a:ext>
+            </a:extLst>
+          </p:cNvPr>
+          <p:cNvSpPr>
+            <a:spLocks noGrp="1" noRot="1" noChangeAspect="1" noMove="1" noResize="1" noEditPoints="1" noAdjustHandles="1" noChangeArrowheads="1" noChangeShapeType="1" noTextEdit="1"/>
+          </p:cNvSpPr>
+          <p:nvPr>
+            <p:extLst>
+              <p:ext uri="{386F3935-93C4-4BCD-93E2-E3B085C9AB24}">
+                <p16:designElem xmlns:p16="http://schemas.microsoft.com/office/powerpoint/2015/main" val="1"/>
+              </p:ext>
+            </p:extLst>
+          </p:nvPr>
+        </p:nvSpPr>
+        <p:spPr>
+          <a:xfrm rot="5400000">
+            <a:off x="6059424" y="-2665476"/>
+            <a:ext cx="73152" cy="12188952"/>
+          </a:xfrm>
+          <a:prstGeom prst="rect">
+            <a:avLst/>
+          </a:prstGeom>
+          <a:solidFill>
+            <a:schemeClr val="tx1">
+              <a:lumMod val="75000"/>
+              <a:lumOff val="25000"/>
+            </a:schemeClr>
+          </a:solidFill>
+          <a:ln>
+            <a:noFill/>
+          </a:ln>
+        </p:spPr>
+        <p:style>
+          <a:lnRef idx="2">
+            <a:schemeClr val="accent1">
+              <a:shade val="50000"/>
+            </a:schemeClr>
+          </a:lnRef>
+          <a:fillRef idx="1">
+            <a:schemeClr val="accent1"/>
+          </a:fillRef>
+          <a:effectRef idx="0">
+            <a:schemeClr val="accent1"/>
+          </a:effectRef>
+          <a:fontRef idx="minor">
+            <a:schemeClr val="lt1"/>
+          </a:fontRef>
+        </p:style>
+        <p:txBody>
+          <a:bodyPr rtlCol="0" anchor="ctr"/>
+          <a:lstStyle/>
+          <a:p>
+            <a:pPr algn="ctr"/>
+            <a:endParaRPr lang="en-US"/>
+          </a:p>
+        </p:txBody>
+      </p:sp>
+      <p:pic>
+        <p:nvPicPr>
+          <p:cNvPr id="1034" name="Picture 10">
+            <a:extLst>
+              <a:ext uri="{FF2B5EF4-FFF2-40B4-BE49-F238E27FC236}">
+                <a16:creationId xmlns:a16="http://schemas.microsoft.com/office/drawing/2014/main" id="{4B9D84CE-2869-4542-98B2-8B003B8548F6}"/>
+              </a:ext>
+            </a:extLst>
+          </p:cNvPr>
+          <p:cNvPicPr>
+            <a:picLocks noChangeAspect="1" noChangeArrowheads="1"/>
+          </p:cNvPicPr>
+          <p:nvPr/>
+        </p:nvPicPr>
+        <p:blipFill>
+          <a:blip r:embed="rId5">
+            <a:extLst>
+              <a:ext uri="{28A0092B-C50C-407E-A947-70E740481C1C}">
+                <a14:useLocalDpi xmlns:a14="http://schemas.microsoft.com/office/drawing/2010/main" val="0"/>
+              </a:ext>
+            </a:extLst>
+          </a:blip>
+          <a:stretch>
+            <a:fillRect/>
+          </a:stretch>
+        </p:blipFill>
+        <p:spPr bwMode="auto">
+          <a:xfrm>
+            <a:off x="685229" y="3783923"/>
+            <a:ext cx="2759242" cy="2752344"/>
+          </a:xfrm>
+          <a:prstGeom prst="roundRect">
+            <a:avLst>
+              <a:gd name="adj" fmla="val 16667"/>
+            </a:avLst>
+          </a:prstGeom>
+          <a:ln>
+            <a:noFill/>
+          </a:ln>
+          <a:effectLst>
+            <a:outerShdw blurRad="76200" dist="38100" dir="7800000" algn="tl" rotWithShape="0">
+              <a:srgbClr val="000000">
+                <a:alpha val="40000"/>
+              </a:srgbClr>
+            </a:outerShdw>
+          </a:effectLst>
+          <a:scene3d>
+            <a:camera prst="orthographicFront"/>
+            <a:lightRig rig="contrasting" dir="t">
+              <a:rot lat="0" lon="0" rev="4200000"/>
+            </a:lightRig>
+          </a:scene3d>
+          <a:sp3d prstMaterial="plastic">
+            <a:bevelT w="381000" h="114300" prst="relaxedInset"/>
+            <a:contourClr>
+              <a:srgbClr val="969696"/>
+            </a:contourClr>
+          </a:sp3d>
+          <a:extLst>
+            <a:ext uri="{909E8E84-426E-40DD-AFC4-6F175D3DCCD1}">
+              <a14:hiddenFill xmlns:a14="http://schemas.microsoft.com/office/drawing/2010/main">
+                <a:solidFill>
+                  <a:srgbClr val="FFFFFF"/>
+                </a:solidFill>
+              </a14:hiddenFill>
+            </a:ext>
+          </a:extLst>
+        </p:spPr>
+      </p:pic>
+      <p:pic>
+        <p:nvPicPr>
+          <p:cNvPr id="1026" name="Picture 2" descr="image">
+            <a:extLst>
+              <a:ext uri="{FF2B5EF4-FFF2-40B4-BE49-F238E27FC236}">
+                <a16:creationId xmlns:a16="http://schemas.microsoft.com/office/drawing/2014/main" id="{01CEB983-D559-4CE1-BA33-7567ACB6C98F}"/>
+              </a:ext>
+            </a:extLst>
+          </p:cNvPr>
+          <p:cNvPicPr>
+            <a:picLocks noChangeAspect="1" noChangeArrowheads="1"/>
+          </p:cNvPicPr>
+          <p:nvPr/>
+        </p:nvPicPr>
+        <p:blipFill>
+          <a:blip r:embed="rId6">
+            <a:extLst>
+              <a:ext uri="{28A0092B-C50C-407E-A947-70E740481C1C}">
+                <a14:useLocalDpi xmlns:a14="http://schemas.microsoft.com/office/drawing/2010/main" val="0"/>
+              </a:ext>
+            </a:extLst>
+          </a:blip>
+          <a:stretch>
+            <a:fillRect/>
+          </a:stretch>
+        </p:blipFill>
+        <p:spPr bwMode="auto">
+          <a:xfrm>
+            <a:off x="4749258" y="3783923"/>
+            <a:ext cx="2759242" cy="2752344"/>
+          </a:xfrm>
+          <a:prstGeom prst="roundRect">
+            <a:avLst>
+              <a:gd name="adj" fmla="val 16667"/>
+            </a:avLst>
+          </a:prstGeom>
+          <a:ln>
+            <a:noFill/>
+          </a:ln>
+          <a:effectLst>
+            <a:outerShdw blurRad="76200" dist="38100" dir="7800000" algn="tl" rotWithShape="0">
+              <a:srgbClr val="000000">
+                <a:alpha val="40000"/>
+              </a:srgbClr>
+            </a:outerShdw>
+          </a:effectLst>
+          <a:scene3d>
+            <a:camera prst="orthographicFront"/>
+            <a:lightRig rig="contrasting" dir="t">
+              <a:rot lat="0" lon="0" rev="4200000"/>
+            </a:lightRig>
+          </a:scene3d>
+          <a:sp3d prstMaterial="plastic">
+            <a:bevelT w="381000" h="114300" prst="relaxedInset"/>
+            <a:contourClr>
+              <a:srgbClr val="969696"/>
+            </a:contourClr>
+          </a:sp3d>
+          <a:extLst>
+            <a:ext uri="{909E8E84-426E-40DD-AFC4-6F175D3DCCD1}">
+              <a14:hiddenFill xmlns:a14="http://schemas.microsoft.com/office/drawing/2010/main">
+                <a:solidFill>
+                  <a:srgbClr val="FFFFFF"/>
+                </a:solidFill>
+              </a14:hiddenFill>
+            </a:ext>
+          </a:extLst>
+        </p:spPr>
+      </p:pic>
+      <p:pic>
+        <p:nvPicPr>
+          <p:cNvPr id="1036" name="Picture 12">
+            <a:extLst>
+              <a:ext uri="{FF2B5EF4-FFF2-40B4-BE49-F238E27FC236}">
+                <a16:creationId xmlns:a16="http://schemas.microsoft.com/office/drawing/2014/main" id="{1AC47660-B81D-4F30-9DB8-02BC1CF90F6F}"/>
+              </a:ext>
+            </a:extLst>
+          </p:cNvPr>
+          <p:cNvPicPr>
+            <a:picLocks noChangeAspect="1" noChangeArrowheads="1"/>
+          </p:cNvPicPr>
+          <p:nvPr/>
+        </p:nvPicPr>
+        <p:blipFill>
+          <a:blip r:embed="rId7">
+            <a:extLst>
+              <a:ext uri="{28A0092B-C50C-407E-A947-70E740481C1C}">
+                <a14:useLocalDpi xmlns:a14="http://schemas.microsoft.com/office/drawing/2010/main" val="0"/>
+              </a:ext>
+            </a:extLst>
+          </a:blip>
+          <a:stretch>
+            <a:fillRect/>
+          </a:stretch>
+        </p:blipFill>
+        <p:spPr bwMode="auto">
+          <a:xfrm>
+            <a:off x="8809820" y="3783923"/>
+            <a:ext cx="2766175" cy="2752344"/>
+          </a:xfrm>
+          <a:prstGeom prst="roundRect">
+            <a:avLst>
+              <a:gd name="adj" fmla="val 16667"/>
+            </a:avLst>
+          </a:prstGeom>
+          <a:ln>
+            <a:noFill/>
+          </a:ln>
+          <a:effectLst>
+            <a:outerShdw blurRad="76200" dist="38100" dir="7800000" algn="tl" rotWithShape="0">
+              <a:srgbClr val="000000">
+                <a:alpha val="40000"/>
+              </a:srgbClr>
+            </a:outerShdw>
+          </a:effectLst>
+          <a:scene3d>
+            <a:camera prst="orthographicFront"/>
+            <a:lightRig rig="contrasting" dir="t">
+              <a:rot lat="0" lon="0" rev="4200000"/>
+            </a:lightRig>
+          </a:scene3d>
+          <a:sp3d prstMaterial="plastic">
+            <a:bevelT w="381000" h="114300" prst="relaxedInset"/>
+            <a:contourClr>
+              <a:srgbClr val="969696"/>
+            </a:contourClr>
+          </a:sp3d>
+          <a:extLst>
+            <a:ext uri="{909E8E84-426E-40DD-AFC4-6F175D3DCCD1}">
+              <a14:hiddenFill xmlns:a14="http://schemas.microsoft.com/office/drawing/2010/main">
+                <a:solidFill>
+                  <a:srgbClr val="FFFFFF"/>
+                </a:solidFill>
+              </a14:hiddenFill>
+            </a:ext>
+          </a:extLst>
+        </p:spPr>
+      </p:pic>
+    </p:spTree>
+    <p:extLst>
+      <p:ext uri="{BB962C8B-B14F-4D97-AF65-F5344CB8AC3E}">
+        <p14:creationId xmlns:p14="http://schemas.microsoft.com/office/powerpoint/2010/main" val="2900338054"/>
       </p:ext>
     </p:extLst>
   </p:cSld>
@@ -16398,10 +19961,10 @@
       </p:grpSp>
       <p:pic>
         <p:nvPicPr>
-          <p:cNvPr id="4" name="Picture 3" descr="Graphical user interface, application&#10;&#10;Description automatically generated">
+          <p:cNvPr id="3" name="Picture 2" descr="Graphical user interface, application&#10;&#10;Description automatically generated">
             <a:extLst>
               <a:ext uri="{FF2B5EF4-FFF2-40B4-BE49-F238E27FC236}">
-                <a16:creationId xmlns:a16="http://schemas.microsoft.com/office/drawing/2014/main" id="{74B6DDBA-D647-4810-854D-A7509FCF965E}"/>
+                <a16:creationId xmlns:a16="http://schemas.microsoft.com/office/drawing/2014/main" id="{91E37AF9-76BC-41E2-8F64-BA18FAF94C02}"/>
               </a:ext>
             </a:extLst>
           </p:cNvPr>
@@ -16418,13 +19981,80 @@
               </a:ext>
             </a:extLst>
           </a:blip>
-          <a:srcRect l="7805" r="-2610" b="-10"/>
+          <a:srcRect l="53594" t="50000" r="374" b="-3972"/>
           <a:stretch/>
         </p:blipFill>
         <p:spPr>
           <a:xfrm>
-            <a:off x="4397554" y="331259"/>
-            <a:ext cx="3396892" cy="6195481"/>
+            <a:off x="3862858" y="0"/>
+            <a:ext cx="3943150" cy="6966888"/>
+          </a:xfrm>
+          <a:prstGeom prst="rect">
+            <a:avLst/>
+          </a:prstGeom>
+        </p:spPr>
+      </p:pic>
+      <p:pic>
+        <p:nvPicPr>
+          <p:cNvPr id="10" name="Picture 9">
+            <a:hlinkClick r:id="rId3" action="ppaction://hlinksldjump"/>
+            <a:extLst>
+              <a:ext uri="{FF2B5EF4-FFF2-40B4-BE49-F238E27FC236}">
+                <a16:creationId xmlns:a16="http://schemas.microsoft.com/office/drawing/2014/main" id="{BF4BB4A0-F7BF-4740-ACB2-F92B0C8C3A55}"/>
+              </a:ext>
+            </a:extLst>
+          </p:cNvPr>
+          <p:cNvPicPr>
+            <a:picLocks noChangeAspect="1"/>
+          </p:cNvPicPr>
+          <p:nvPr/>
+        </p:nvPicPr>
+        <p:blipFill rotWithShape="1">
+          <a:blip r:embed="rId4">
+            <a:extLst>
+              <a:ext uri="{28A0092B-C50C-407E-A947-70E740481C1C}">
+                <a14:useLocalDpi xmlns:a14="http://schemas.microsoft.com/office/drawing/2010/main" val="0"/>
+              </a:ext>
+            </a:extLst>
+          </a:blip>
+          <a:srcRect l="2109" r="-2109"/>
+          <a:stretch/>
+        </p:blipFill>
+        <p:spPr>
+          <a:xfrm>
+            <a:off x="6804564" y="882785"/>
+            <a:ext cx="442542" cy="428685"/>
+          </a:xfrm>
+          <a:prstGeom prst="rect">
+            <a:avLst/>
+          </a:prstGeom>
+        </p:spPr>
+      </p:pic>
+      <p:pic>
+        <p:nvPicPr>
+          <p:cNvPr id="14" name="Picture 13">
+            <a:hlinkClick r:id="rId5" action="ppaction://hlinksldjump"/>
+            <a:extLst>
+              <a:ext uri="{FF2B5EF4-FFF2-40B4-BE49-F238E27FC236}">
+                <a16:creationId xmlns:a16="http://schemas.microsoft.com/office/drawing/2014/main" id="{F2DBCA3C-2CB5-4A62-9EEA-5BCB867E9707}"/>
+              </a:ext>
+            </a:extLst>
+          </p:cNvPr>
+          <p:cNvPicPr>
+            <a:picLocks noChangeAspect="1"/>
+          </p:cNvPicPr>
+          <p:nvPr/>
+        </p:nvPicPr>
+        <p:blipFill>
+          <a:blip r:embed="rId6"/>
+          <a:stretch>
+            <a:fillRect/>
+          </a:stretch>
+        </p:blipFill>
+        <p:spPr>
+          <a:xfrm>
+            <a:off x="4574886" y="939966"/>
+            <a:ext cx="276225" cy="314325"/>
           </a:xfrm>
           <a:prstGeom prst="rect">
             <a:avLst/>
@@ -16434,7 +20064,7 @@
       <p:pic>
         <p:nvPicPr>
           <p:cNvPr id="6" name="Picture 5">
-            <a:hlinkClick r:id="rId3" action="ppaction://hlinksldjump"/>
+            <a:hlinkClick r:id="rId7" action="ppaction://hlinksldjump"/>
             <a:extLst>
               <a:ext uri="{FF2B5EF4-FFF2-40B4-BE49-F238E27FC236}">
                 <a16:creationId xmlns:a16="http://schemas.microsoft.com/office/drawing/2014/main" id="{531D0E4B-1B76-4926-AECA-205DD171C7DD}"/>
@@ -16447,7 +20077,7 @@
           <p:nvPr/>
         </p:nvPicPr>
         <p:blipFill>
-          <a:blip r:embed="rId4">
+          <a:blip r:embed="rId8">
             <a:extLst>
               <a:ext uri="{28A0092B-C50C-407E-A947-70E740481C1C}">
                 <a14:useLocalDpi xmlns:a14="http://schemas.microsoft.com/office/drawing/2010/main" val="0"/>
@@ -16460,8 +20090,8 @@
         </p:blipFill>
         <p:spPr>
           <a:xfrm>
-            <a:off x="4616627" y="5262531"/>
-            <a:ext cx="928728" cy="682034"/>
+            <a:off x="4386747" y="5175115"/>
+            <a:ext cx="928728" cy="670593"/>
           </a:xfrm>
           <a:prstGeom prst="rect">
             <a:avLst/>
@@ -16471,83 +20101,10 @@
       <p:pic>
         <p:nvPicPr>
           <p:cNvPr id="8" name="Picture 7">
-            <a:hlinkClick r:id="rId5" action="ppaction://hlinksldjump"/>
+            <a:hlinkClick r:id="rId9" action="ppaction://hlinksldjump"/>
             <a:extLst>
               <a:ext uri="{FF2B5EF4-FFF2-40B4-BE49-F238E27FC236}">
                 <a16:creationId xmlns:a16="http://schemas.microsoft.com/office/drawing/2014/main" id="{A38AD789-7DCE-4AF9-B303-25AFF59476BE}"/>
-              </a:ext>
-            </a:extLst>
-          </p:cNvPr>
-          <p:cNvPicPr>
-            <a:picLocks noChangeAspect="1"/>
-          </p:cNvPicPr>
-          <p:nvPr/>
-        </p:nvPicPr>
-        <p:blipFill>
-          <a:blip r:embed="rId6">
-            <a:extLst>
-              <a:ext uri="{28A0092B-C50C-407E-A947-70E740481C1C}">
-                <a14:useLocalDpi xmlns:a14="http://schemas.microsoft.com/office/drawing/2010/main" val="0"/>
-              </a:ext>
-            </a:extLst>
-          </a:blip>
-          <a:stretch>
-            <a:fillRect/>
-          </a:stretch>
-        </p:blipFill>
-        <p:spPr>
-          <a:xfrm>
-            <a:off x="6646644" y="5262531"/>
-            <a:ext cx="859956" cy="682034"/>
-          </a:xfrm>
-          <a:prstGeom prst="rect">
-            <a:avLst/>
-          </a:prstGeom>
-        </p:spPr>
-      </p:pic>
-      <p:pic>
-        <p:nvPicPr>
-          <p:cNvPr id="10" name="Picture 9">
-            <a:hlinkClick r:id="rId7" action="ppaction://hlinksldjump"/>
-            <a:extLst>
-              <a:ext uri="{FF2B5EF4-FFF2-40B4-BE49-F238E27FC236}">
-                <a16:creationId xmlns:a16="http://schemas.microsoft.com/office/drawing/2014/main" id="{BF4BB4A0-F7BF-4740-ACB2-F92B0C8C3A55}"/>
-              </a:ext>
-            </a:extLst>
-          </p:cNvPr>
-          <p:cNvPicPr>
-            <a:picLocks noChangeAspect="1"/>
-          </p:cNvPicPr>
-          <p:nvPr/>
-        </p:nvPicPr>
-        <p:blipFill rotWithShape="1">
-          <a:blip r:embed="rId8">
-            <a:extLst>
-              <a:ext uri="{28A0092B-C50C-407E-A947-70E740481C1C}">
-                <a14:useLocalDpi xmlns:a14="http://schemas.microsoft.com/office/drawing/2010/main" val="0"/>
-              </a:ext>
-            </a:extLst>
-          </a:blip>
-          <a:srcRect l="2109" r="-2109"/>
-          <a:stretch/>
-        </p:blipFill>
-        <p:spPr>
-          <a:xfrm>
-            <a:off x="4716000" y="913435"/>
-            <a:ext cx="409632" cy="428685"/>
-          </a:xfrm>
-          <a:prstGeom prst="rect">
-            <a:avLst/>
-          </a:prstGeom>
-        </p:spPr>
-      </p:pic>
-      <p:pic>
-        <p:nvPicPr>
-          <p:cNvPr id="12" name="Picture 11">
-            <a:hlinkClick r:id="rId9" action="ppaction://hlinksldjump"/>
-            <a:extLst>
-              <a:ext uri="{FF2B5EF4-FFF2-40B4-BE49-F238E27FC236}">
-                <a16:creationId xmlns:a16="http://schemas.microsoft.com/office/drawing/2014/main" id="{185F92E0-6BF6-4360-9A25-8EC8677AF0E5}"/>
               </a:ext>
             </a:extLst>
           </p:cNvPr>
@@ -16570,8 +20127,8 @@
         </p:blipFill>
         <p:spPr>
           <a:xfrm>
-            <a:off x="5588101" y="5262531"/>
-            <a:ext cx="1015797" cy="682034"/>
+            <a:off x="6461672" y="5175115"/>
+            <a:ext cx="859956" cy="682034"/>
           </a:xfrm>
           <a:prstGeom prst="rect">
             <a:avLst/>
@@ -16580,11 +20137,11 @@
       </p:pic>
       <p:pic>
         <p:nvPicPr>
-          <p:cNvPr id="14" name="Picture 13">
+          <p:cNvPr id="12" name="Picture 11">
             <a:hlinkClick r:id="rId11" action="ppaction://hlinksldjump"/>
             <a:extLst>
               <a:ext uri="{FF2B5EF4-FFF2-40B4-BE49-F238E27FC236}">
-                <a16:creationId xmlns:a16="http://schemas.microsoft.com/office/drawing/2014/main" id="{F2DBCA3C-2CB5-4A62-9EEA-5BCB867E9707}"/>
+                <a16:creationId xmlns:a16="http://schemas.microsoft.com/office/drawing/2014/main" id="{185F92E0-6BF6-4360-9A25-8EC8677AF0E5}"/>
               </a:ext>
             </a:extLst>
           </p:cNvPr>
@@ -16594,15 +20151,21 @@
           <p:nvPr/>
         </p:nvPicPr>
         <p:blipFill>
-          <a:blip r:embed="rId12"/>
+          <a:blip r:embed="rId12">
+            <a:extLst>
+              <a:ext uri="{28A0092B-C50C-407E-A947-70E740481C1C}">
+                <a14:useLocalDpi xmlns:a14="http://schemas.microsoft.com/office/drawing/2010/main" val="0"/>
+              </a:ext>
+            </a:extLst>
+          </a:blip>
           <a:stretch>
             <a:fillRect/>
           </a:stretch>
         </p:blipFill>
         <p:spPr>
           <a:xfrm>
-            <a:off x="7164000" y="864000"/>
-            <a:ext cx="276225" cy="314325"/>
+            <a:off x="5386075" y="5175115"/>
+            <a:ext cx="1004997" cy="674783"/>
           </a:xfrm>
           <a:prstGeom prst="rect">
             <a:avLst/>
@@ -18028,10 +21591,10 @@
       </p:grpSp>
       <p:pic>
         <p:nvPicPr>
-          <p:cNvPr id="3" name="Picture 2" descr="A screen shot of a cell phone&#10;&#10;Description automatically generated with low confidence">
+          <p:cNvPr id="4" name="Picture 3" descr="A picture containing text, screenshot, electronics&#10;&#10;Description automatically generated">
             <a:extLst>
               <a:ext uri="{FF2B5EF4-FFF2-40B4-BE49-F238E27FC236}">
-                <a16:creationId xmlns:a16="http://schemas.microsoft.com/office/drawing/2014/main" id="{363252FC-D113-4F9B-8066-95CA649B2EDF}"/>
+                <a16:creationId xmlns:a16="http://schemas.microsoft.com/office/drawing/2014/main" id="{4FE7DC3A-F4C5-4AE0-84AB-5330F51B19FC}"/>
               </a:ext>
             </a:extLst>
           </p:cNvPr>
@@ -18054,8 +21617,8 @@
         </p:blipFill>
         <p:spPr>
           <a:xfrm>
-            <a:off x="4457975" y="308600"/>
-            <a:ext cx="3276049" cy="6240799"/>
+            <a:off x="3838903" y="156111"/>
+            <a:ext cx="3436145" cy="6545778"/>
           </a:xfrm>
           <a:prstGeom prst="rect">
             <a:avLst/>
@@ -18084,8 +21647,8 @@
         </p:blipFill>
         <p:spPr>
           <a:xfrm>
-            <a:off x="5238000" y="4077145"/>
-            <a:ext cx="1762125" cy="228600"/>
+            <a:off x="4675912" y="3619944"/>
+            <a:ext cx="1795833" cy="232973"/>
           </a:xfrm>
           <a:prstGeom prst="rect">
             <a:avLst/>
@@ -19536,7 +23099,7 @@
         </p:blipFill>
         <p:spPr>
           <a:xfrm>
-            <a:off x="4475847" y="327053"/>
+            <a:off x="3908288" y="327053"/>
             <a:ext cx="3240000" cy="6203893"/>
           </a:xfrm>
           <a:prstGeom prst="rect">
@@ -19567,7 +23130,7 @@
         </p:blipFill>
         <p:spPr>
           <a:xfrm>
-            <a:off x="4633759" y="1591842"/>
+            <a:off x="4050434" y="1583959"/>
             <a:ext cx="2924175" cy="819150"/>
           </a:xfrm>
           <a:prstGeom prst="rect">
@@ -19604,7 +23167,7 @@
         </p:blipFill>
         <p:spPr>
           <a:xfrm>
-            <a:off x="5585746" y="5247497"/>
+            <a:off x="5018187" y="5247497"/>
             <a:ext cx="1001666" cy="672547"/>
           </a:xfrm>
           <a:prstGeom prst="rect">
@@ -19641,7 +23204,7 @@
         </p:blipFill>
         <p:spPr>
           <a:xfrm>
-            <a:off x="4613047" y="5247497"/>
+            <a:off x="4045488" y="5247497"/>
             <a:ext cx="902433" cy="662724"/>
           </a:xfrm>
           <a:prstGeom prst="rect">
@@ -19677,7 +23240,7 @@
         </p:blipFill>
         <p:spPr>
           <a:xfrm>
-            <a:off x="6657678" y="5265162"/>
+            <a:off x="6090119" y="5265162"/>
             <a:ext cx="813725" cy="636221"/>
           </a:xfrm>
           <a:prstGeom prst="rect">
@@ -19714,7 +23277,7 @@
         </p:blipFill>
         <p:spPr>
           <a:xfrm>
-            <a:off x="4788000" y="882000"/>
+            <a:off x="4220441" y="882000"/>
             <a:ext cx="276264" cy="314369"/>
           </a:xfrm>
           <a:prstGeom prst="rect">
@@ -19751,7 +23314,7 @@
         </p:blipFill>
         <p:spPr>
           <a:xfrm>
-            <a:off x="7049145" y="845328"/>
+            <a:off x="6481586" y="845328"/>
             <a:ext cx="409632" cy="428685"/>
           </a:xfrm>
           <a:prstGeom prst="rect">
@@ -19782,7 +23345,7 @@
         </p:blipFill>
         <p:spPr>
           <a:xfrm>
-            <a:off x="4613047" y="4668030"/>
+            <a:off x="4045488" y="4668030"/>
             <a:ext cx="1457325" cy="504825"/>
           </a:xfrm>
           <a:prstGeom prst="rect">
@@ -19813,7 +23376,7 @@
         </p:blipFill>
         <p:spPr>
           <a:xfrm>
-            <a:off x="6086439" y="4672889"/>
+            <a:off x="5518880" y="4672889"/>
             <a:ext cx="1457325" cy="495300"/>
           </a:xfrm>
           <a:prstGeom prst="rect">
@@ -24514,10 +28077,82 @@
       </p:grpSp>
       <p:pic>
         <p:nvPicPr>
-          <p:cNvPr id="4" name="Picture 3" descr="A close - up of a cell phone&#10;&#10;Description automatically generated with medium confidence">
+          <p:cNvPr id="3" name="Picture 2" descr="Graphical user interface, application&#10;&#10;Description automatically generated">
             <a:extLst>
               <a:ext uri="{FF2B5EF4-FFF2-40B4-BE49-F238E27FC236}">
-                <a16:creationId xmlns:a16="http://schemas.microsoft.com/office/drawing/2014/main" id="{19C2932B-8D25-4C46-A6BF-7692D3C14444}"/>
+                <a16:creationId xmlns:a16="http://schemas.microsoft.com/office/drawing/2014/main" id="{C2F80117-3995-4A59-933A-D907571513A5}"/>
+              </a:ext>
+            </a:extLst>
+          </p:cNvPr>
+          <p:cNvPicPr>
+            <a:picLocks noChangeAspect="1"/>
+          </p:cNvPicPr>
+          <p:nvPr/>
+        </p:nvPicPr>
+        <p:blipFill rotWithShape="1">
+          <a:blip r:embed="rId2">
+            <a:extLst>
+              <a:ext uri="{28A0092B-C50C-407E-A947-70E740481C1C}">
+                <a14:useLocalDpi xmlns:a14="http://schemas.microsoft.com/office/drawing/2010/main" val="0"/>
+              </a:ext>
+            </a:extLst>
+          </a:blip>
+          <a:srcRect t="-695" r="52110" b="-1"/>
+          <a:stretch/>
+        </p:blipFill>
+        <p:spPr>
+          <a:xfrm>
+            <a:off x="4268275" y="199888"/>
+            <a:ext cx="3655143" cy="6458224"/>
+          </a:xfrm>
+          <a:prstGeom prst="rect">
+            <a:avLst/>
+          </a:prstGeom>
+        </p:spPr>
+      </p:pic>
+      <p:pic>
+        <p:nvPicPr>
+          <p:cNvPr id="10" name="Picture 9" descr="Graphical user interface, application&#10;&#10;Description automatically generated">
+            <a:hlinkClick r:id="rId3" action="ppaction://hlinksldjump"/>
+            <a:extLst>
+              <a:ext uri="{FF2B5EF4-FFF2-40B4-BE49-F238E27FC236}">
+                <a16:creationId xmlns:a16="http://schemas.microsoft.com/office/drawing/2014/main" id="{C1B912E2-B1B4-426B-8B55-9C5344AAA962}"/>
+              </a:ext>
+            </a:extLst>
+          </p:cNvPr>
+          <p:cNvPicPr>
+            <a:picLocks noChangeAspect="1"/>
+          </p:cNvPicPr>
+          <p:nvPr/>
+        </p:nvPicPr>
+        <p:blipFill rotWithShape="1">
+          <a:blip r:embed="rId2">
+            <a:extLst>
+              <a:ext uri="{28A0092B-C50C-407E-A947-70E740481C1C}">
+                <a14:useLocalDpi xmlns:a14="http://schemas.microsoft.com/office/drawing/2010/main" val="0"/>
+              </a:ext>
+            </a:extLst>
+          </a:blip>
+          <a:srcRect l="32334" t="8396" r="57678" b="78989"/>
+          <a:stretch/>
+        </p:blipFill>
+        <p:spPr>
+          <a:xfrm>
+            <a:off x="6741269" y="788932"/>
+            <a:ext cx="778212" cy="825859"/>
+          </a:xfrm>
+          <a:prstGeom prst="rect">
+            <a:avLst/>
+          </a:prstGeom>
+        </p:spPr>
+      </p:pic>
+      <p:pic>
+        <p:nvPicPr>
+          <p:cNvPr id="18" name="Picture 17">
+            <a:hlinkClick r:id="rId4" action="ppaction://hlinksldjump"/>
+            <a:extLst>
+              <a:ext uri="{FF2B5EF4-FFF2-40B4-BE49-F238E27FC236}">
+                <a16:creationId xmlns:a16="http://schemas.microsoft.com/office/drawing/2014/main" id="{F84B0236-D6A1-4C6E-832A-4E55160ED32A}"/>
               </a:ext>
             </a:extLst>
           </p:cNvPr>
@@ -24527,7 +28162,7 @@
           <p:nvPr/>
         </p:nvPicPr>
         <p:blipFill>
-          <a:blip r:embed="rId2">
+          <a:blip r:embed="rId5">
             <a:extLst>
               <a:ext uri="{28A0092B-C50C-407E-A947-70E740481C1C}">
                 <a14:useLocalDpi xmlns:a14="http://schemas.microsoft.com/office/drawing/2010/main" val="0"/>
@@ -24540,8 +28175,8 @@
         </p:blipFill>
         <p:spPr>
           <a:xfrm>
-            <a:off x="4475847" y="342937"/>
-            <a:ext cx="3240000" cy="6172126"/>
+            <a:off x="4427700" y="5344510"/>
+            <a:ext cx="982628" cy="721617"/>
           </a:xfrm>
           <a:prstGeom prst="rect">
             <a:avLst/>
@@ -24550,11 +28185,11 @@
       </p:pic>
       <p:pic>
         <p:nvPicPr>
-          <p:cNvPr id="6" name="Picture 5">
-            <a:hlinkClick r:id="rId3" action="ppaction://hlinksldjump"/>
+          <p:cNvPr id="19" name="Picture 18">
+            <a:hlinkClick r:id="rId6" action="ppaction://hlinksldjump"/>
             <a:extLst>
               <a:ext uri="{FF2B5EF4-FFF2-40B4-BE49-F238E27FC236}">
-                <a16:creationId xmlns:a16="http://schemas.microsoft.com/office/drawing/2014/main" id="{49807D83-36F3-4699-9CF7-0DFC805CC4AE}"/>
+                <a16:creationId xmlns:a16="http://schemas.microsoft.com/office/drawing/2014/main" id="{A97E95B7-1CB2-443B-9C35-9BA7DFFBD064}"/>
               </a:ext>
             </a:extLst>
           </p:cNvPr>
@@ -24564,15 +28199,21 @@
           <p:nvPr/>
         </p:nvPicPr>
         <p:blipFill>
-          <a:blip r:embed="rId4"/>
+          <a:blip r:embed="rId7">
+            <a:extLst>
+              <a:ext uri="{28A0092B-C50C-407E-A947-70E740481C1C}">
+                <a14:useLocalDpi xmlns:a14="http://schemas.microsoft.com/office/drawing/2010/main" val="0"/>
+              </a:ext>
+            </a:extLst>
+          </a:blip>
           <a:stretch>
             <a:fillRect/>
           </a:stretch>
         </p:blipFill>
         <p:spPr>
           <a:xfrm>
-            <a:off x="4643284" y="4204608"/>
-            <a:ext cx="2905125" cy="800100"/>
+            <a:off x="6580072" y="5344510"/>
+            <a:ext cx="909865" cy="721617"/>
           </a:xfrm>
           <a:prstGeom prst="rect">
             <a:avLst/>
@@ -24581,11 +28222,11 @@
       </p:pic>
       <p:pic>
         <p:nvPicPr>
-          <p:cNvPr id="8" name="Picture 7">
-            <a:hlinkClick r:id="rId5" action="ppaction://hlinksldjump"/>
+          <p:cNvPr id="20" name="Picture 19" descr="Graphical user interface, application&#10;&#10;Description automatically generated">
+            <a:hlinkClick r:id="rId8" action="ppaction://hlinksldjump"/>
             <a:extLst>
               <a:ext uri="{FF2B5EF4-FFF2-40B4-BE49-F238E27FC236}">
-                <a16:creationId xmlns:a16="http://schemas.microsoft.com/office/drawing/2014/main" id="{4A15E694-6211-4EC1-A1B8-C46098F829F1}"/>
+                <a16:creationId xmlns:a16="http://schemas.microsoft.com/office/drawing/2014/main" id="{989819DD-1F3D-4071-9120-CC41B4B0672A}"/>
               </a:ext>
             </a:extLst>
           </p:cNvPr>
@@ -24594,16 +28235,21 @@
           </p:cNvPicPr>
           <p:nvPr/>
         </p:nvPicPr>
-        <p:blipFill>
-          <a:blip r:embed="rId6"/>
-          <a:stretch>
-            <a:fillRect/>
-          </a:stretch>
+        <p:blipFill rotWithShape="1">
+          <a:blip r:embed="rId2">
+            <a:extLst>
+              <a:ext uri="{28A0092B-C50C-407E-A947-70E740481C1C}">
+                <a14:useLocalDpi xmlns:a14="http://schemas.microsoft.com/office/drawing/2010/main" val="0"/>
+              </a:ext>
+            </a:extLst>
+          </a:blip>
+          <a:srcRect l="1908" t="8467" r="87896" b="78657"/>
+          <a:stretch/>
         </p:blipFill>
         <p:spPr>
           <a:xfrm>
-            <a:off x="4633758" y="5067300"/>
-            <a:ext cx="2924175" cy="838200"/>
+            <a:off x="4419817" y="788931"/>
+            <a:ext cx="778212" cy="825860"/>
           </a:xfrm>
           <a:prstGeom prst="rect">
             <a:avLst/>

</xml_diff>